<commit_message>
added some info - still to be re-worded
</commit_message>
<xml_diff>
--- a/Determinants of the training corpus size for clinical.pptx
+++ b/Determinants of the training corpus size for clinical.pptx
@@ -5,7 +5,7 @@
     <p:sldMasterId id="2147483648" r:id="rId1"/>
   </p:sldMasterIdLst>
   <p:notesMasterIdLst>
-    <p:notesMasterId r:id="rId15"/>
+    <p:notesMasterId r:id="rId18"/>
   </p:notesMasterIdLst>
   <p:sldIdLst>
     <p:sldId id="256" r:id="rId2"/>
@@ -16,11 +16,14 @@
     <p:sldId id="261" r:id="rId7"/>
     <p:sldId id="260" r:id="rId8"/>
     <p:sldId id="262" r:id="rId9"/>
-    <p:sldId id="263" r:id="rId10"/>
-    <p:sldId id="264" r:id="rId11"/>
-    <p:sldId id="267" r:id="rId12"/>
-    <p:sldId id="265" r:id="rId13"/>
-    <p:sldId id="257" r:id="rId14"/>
+    <p:sldId id="269" r:id="rId10"/>
+    <p:sldId id="270" r:id="rId11"/>
+    <p:sldId id="263" r:id="rId12"/>
+    <p:sldId id="271" r:id="rId13"/>
+    <p:sldId id="264" r:id="rId14"/>
+    <p:sldId id="267" r:id="rId15"/>
+    <p:sldId id="265" r:id="rId16"/>
+    <p:sldId id="257" r:id="rId17"/>
   </p:sldIdLst>
   <p:sldSz cx="12192000" cy="6858000"/>
   <p:notesSz cx="6858000" cy="9144000"/>
@@ -119,6 +122,11 @@
       </a:defRPr>
     </a:lvl9pPr>
   </p:defaultTextStyle>
+  <p:extLst>
+    <p:ext uri="{EFAFB233-063F-42B5-8137-9DF3F51BA10A}">
+      <p15:sldGuideLst xmlns:p15="http://schemas.microsoft.com/office/powerpoint/2012/main"/>
+    </p:ext>
+  </p:extLst>
 </p:presentation>
 </file>
 
@@ -233,7 +241,7 @@
           <a:p>
             <a:fld id="{FA31796C-C60B-4B93-A308-B9C0DF3CF43B}" type="datetimeFigureOut">
               <a:rPr lang="en-GB" smtClean="0"/>
-              <a:t>18/09/2024</a:t>
+              <a:t>23/09/2024</a:t>
             </a:fld>
             <a:endParaRPr lang="en-GB"/>
           </a:p>
@@ -585,6 +593,282 @@
 </p:notes>
 </file>
 
+<file path=ppt/notesSlides/notesSlide10.xml><?xml version="1.0" encoding="utf-8"?>
+<p:notes xmlns:a="http://schemas.openxmlformats.org/drawingml/2006/main" xmlns:r="http://schemas.openxmlformats.org/officeDocument/2006/relationships" xmlns:p="http://schemas.openxmlformats.org/presentationml/2006/main">
+  <p:cSld>
+    <p:spTree>
+      <p:nvGrpSpPr>
+        <p:cNvPr id="1" name=""/>
+        <p:cNvGrpSpPr/>
+        <p:nvPr/>
+      </p:nvGrpSpPr>
+      <p:grpSpPr>
+        <a:xfrm>
+          <a:off x="0" y="0"/>
+          <a:ext cx="0" cy="0"/>
+          <a:chOff x="0" y="0"/>
+          <a:chExt cx="0" cy="0"/>
+        </a:xfrm>
+      </p:grpSpPr>
+      <p:sp>
+        <p:nvSpPr>
+          <p:cNvPr id="2" name="Slide Image Placeholder 1"/>
+          <p:cNvSpPr>
+            <a:spLocks noGrp="1" noRot="1" noChangeAspect="1"/>
+          </p:cNvSpPr>
+          <p:nvPr>
+            <p:ph type="sldImg"/>
+          </p:nvPr>
+        </p:nvSpPr>
+        <p:spPr/>
+      </p:sp>
+      <p:sp>
+        <p:nvSpPr>
+          <p:cNvPr id="3" name="Notes Placeholder 2"/>
+          <p:cNvSpPr>
+            <a:spLocks noGrp="1"/>
+          </p:cNvSpPr>
+          <p:nvPr>
+            <p:ph type="body" idx="1"/>
+          </p:nvPr>
+        </p:nvSpPr>
+        <p:spPr/>
+        <p:txBody>
+          <a:bodyPr/>
+          <a:lstStyle/>
+          <a:p>
+            <a:pPr rtl="0">
+              <a:spcBef>
+                <a:spcPts val="0"/>
+              </a:spcBef>
+              <a:spcAft>
+                <a:spcPts val="800"/>
+              </a:spcAft>
+            </a:pPr>
+            <a:endParaRPr lang="en-GB" dirty="0"/>
+          </a:p>
+        </p:txBody>
+      </p:sp>
+      <p:sp>
+        <p:nvSpPr>
+          <p:cNvPr id="4" name="Slide Number Placeholder 3"/>
+          <p:cNvSpPr>
+            <a:spLocks noGrp="1"/>
+          </p:cNvSpPr>
+          <p:nvPr>
+            <p:ph type="sldNum" sz="quarter" idx="5"/>
+          </p:nvPr>
+        </p:nvSpPr>
+        <p:spPr/>
+        <p:txBody>
+          <a:bodyPr/>
+          <a:lstStyle/>
+          <a:p>
+            <a:fld id="{F2A3CE22-8D3D-4252-8E02-370EBFAE3DD0}" type="slidenum">
+              <a:rPr lang="en-GB" smtClean="0"/>
+              <a:t>13</a:t>
+            </a:fld>
+            <a:endParaRPr lang="en-GB"/>
+          </a:p>
+        </p:txBody>
+      </p:sp>
+    </p:spTree>
+    <p:extLst>
+      <p:ext uri="{BB962C8B-B14F-4D97-AF65-F5344CB8AC3E}">
+        <p14:creationId xmlns:p14="http://schemas.microsoft.com/office/powerpoint/2010/main" val="4094821645"/>
+      </p:ext>
+    </p:extLst>
+  </p:cSld>
+  <p:clrMapOvr>
+    <a:masterClrMapping/>
+  </p:clrMapOvr>
+</p:notes>
+</file>
+
+<file path=ppt/notesSlides/notesSlide11.xml><?xml version="1.0" encoding="utf-8"?>
+<p:notes xmlns:a="http://schemas.openxmlformats.org/drawingml/2006/main" xmlns:r="http://schemas.openxmlformats.org/officeDocument/2006/relationships" xmlns:p="http://schemas.openxmlformats.org/presentationml/2006/main">
+  <p:cSld>
+    <p:spTree>
+      <p:nvGrpSpPr>
+        <p:cNvPr id="1" name=""/>
+        <p:cNvGrpSpPr/>
+        <p:nvPr/>
+      </p:nvGrpSpPr>
+      <p:grpSpPr>
+        <a:xfrm>
+          <a:off x="0" y="0"/>
+          <a:ext cx="0" cy="0"/>
+          <a:chOff x="0" y="0"/>
+          <a:chExt cx="0" cy="0"/>
+        </a:xfrm>
+      </p:grpSpPr>
+      <p:sp>
+        <p:nvSpPr>
+          <p:cNvPr id="2" name="Slide Image Placeholder 1"/>
+          <p:cNvSpPr>
+            <a:spLocks noGrp="1" noRot="1" noChangeAspect="1"/>
+          </p:cNvSpPr>
+          <p:nvPr>
+            <p:ph type="sldImg"/>
+          </p:nvPr>
+        </p:nvSpPr>
+        <p:spPr/>
+      </p:sp>
+      <p:sp>
+        <p:nvSpPr>
+          <p:cNvPr id="3" name="Notes Placeholder 2"/>
+          <p:cNvSpPr>
+            <a:spLocks noGrp="1"/>
+          </p:cNvSpPr>
+          <p:nvPr>
+            <p:ph type="body" idx="1"/>
+          </p:nvPr>
+        </p:nvSpPr>
+        <p:spPr/>
+        <p:txBody>
+          <a:bodyPr/>
+          <a:lstStyle/>
+          <a:p>
+            <a:pPr rtl="0">
+              <a:spcBef>
+                <a:spcPts val="0"/>
+              </a:spcBef>
+              <a:spcAft>
+                <a:spcPts val="800"/>
+              </a:spcAft>
+            </a:pPr>
+            <a:endParaRPr lang="en-GB" dirty="0"/>
+          </a:p>
+        </p:txBody>
+      </p:sp>
+      <p:sp>
+        <p:nvSpPr>
+          <p:cNvPr id="4" name="Slide Number Placeholder 3"/>
+          <p:cNvSpPr>
+            <a:spLocks noGrp="1"/>
+          </p:cNvSpPr>
+          <p:nvPr>
+            <p:ph type="sldNum" sz="quarter" idx="5"/>
+          </p:nvPr>
+        </p:nvSpPr>
+        <p:spPr/>
+        <p:txBody>
+          <a:bodyPr/>
+          <a:lstStyle/>
+          <a:p>
+            <a:fld id="{F2A3CE22-8D3D-4252-8E02-370EBFAE3DD0}" type="slidenum">
+              <a:rPr lang="en-GB" smtClean="0"/>
+              <a:t>14</a:t>
+            </a:fld>
+            <a:endParaRPr lang="en-GB"/>
+          </a:p>
+        </p:txBody>
+      </p:sp>
+    </p:spTree>
+    <p:extLst>
+      <p:ext uri="{BB962C8B-B14F-4D97-AF65-F5344CB8AC3E}">
+        <p14:creationId xmlns:p14="http://schemas.microsoft.com/office/powerpoint/2010/main" val="1393299959"/>
+      </p:ext>
+    </p:extLst>
+  </p:cSld>
+  <p:clrMapOvr>
+    <a:masterClrMapping/>
+  </p:clrMapOvr>
+</p:notes>
+</file>
+
+<file path=ppt/notesSlides/notesSlide12.xml><?xml version="1.0" encoding="utf-8"?>
+<p:notes xmlns:a="http://schemas.openxmlformats.org/drawingml/2006/main" xmlns:r="http://schemas.openxmlformats.org/officeDocument/2006/relationships" xmlns:p="http://schemas.openxmlformats.org/presentationml/2006/main">
+  <p:cSld>
+    <p:spTree>
+      <p:nvGrpSpPr>
+        <p:cNvPr id="1" name=""/>
+        <p:cNvGrpSpPr/>
+        <p:nvPr/>
+      </p:nvGrpSpPr>
+      <p:grpSpPr>
+        <a:xfrm>
+          <a:off x="0" y="0"/>
+          <a:ext cx="0" cy="0"/>
+          <a:chOff x="0" y="0"/>
+          <a:chExt cx="0" cy="0"/>
+        </a:xfrm>
+      </p:grpSpPr>
+      <p:sp>
+        <p:nvSpPr>
+          <p:cNvPr id="2" name="Slide Image Placeholder 1"/>
+          <p:cNvSpPr>
+            <a:spLocks noGrp="1" noRot="1" noChangeAspect="1"/>
+          </p:cNvSpPr>
+          <p:nvPr>
+            <p:ph type="sldImg"/>
+          </p:nvPr>
+        </p:nvSpPr>
+        <p:spPr/>
+      </p:sp>
+      <p:sp>
+        <p:nvSpPr>
+          <p:cNvPr id="3" name="Notes Placeholder 2"/>
+          <p:cNvSpPr>
+            <a:spLocks noGrp="1"/>
+          </p:cNvSpPr>
+          <p:nvPr>
+            <p:ph type="body" idx="1"/>
+          </p:nvPr>
+        </p:nvSpPr>
+        <p:spPr/>
+        <p:txBody>
+          <a:bodyPr/>
+          <a:lstStyle/>
+          <a:p>
+            <a:pPr rtl="0">
+              <a:spcBef>
+                <a:spcPts val="0"/>
+              </a:spcBef>
+              <a:spcAft>
+                <a:spcPts val="800"/>
+              </a:spcAft>
+            </a:pPr>
+            <a:endParaRPr lang="en-GB" dirty="0"/>
+          </a:p>
+        </p:txBody>
+      </p:sp>
+      <p:sp>
+        <p:nvSpPr>
+          <p:cNvPr id="4" name="Slide Number Placeholder 3"/>
+          <p:cNvSpPr>
+            <a:spLocks noGrp="1"/>
+          </p:cNvSpPr>
+          <p:nvPr>
+            <p:ph type="sldNum" sz="quarter" idx="5"/>
+          </p:nvPr>
+        </p:nvSpPr>
+        <p:spPr/>
+        <p:txBody>
+          <a:bodyPr/>
+          <a:lstStyle/>
+          <a:p>
+            <a:fld id="{F2A3CE22-8D3D-4252-8E02-370EBFAE3DD0}" type="slidenum">
+              <a:rPr lang="en-GB" smtClean="0"/>
+              <a:t>15</a:t>
+            </a:fld>
+            <a:endParaRPr lang="en-GB"/>
+          </a:p>
+        </p:txBody>
+      </p:sp>
+    </p:spTree>
+    <p:extLst>
+      <p:ext uri="{BB962C8B-B14F-4D97-AF65-F5344CB8AC3E}">
+        <p14:creationId xmlns:p14="http://schemas.microsoft.com/office/powerpoint/2010/main" val="3925099013"/>
+      </p:ext>
+    </p:extLst>
+  </p:cSld>
+  <p:clrMapOvr>
+    <a:masterClrMapping/>
+  </p:clrMapOvr>
+</p:notes>
+</file>
+
 <file path=ppt/notesSlides/notesSlide2.xml><?xml version="1.0" encoding="utf-8"?>
 <p:notes xmlns:a="http://schemas.openxmlformats.org/drawingml/2006/main" xmlns:r="http://schemas.openxmlformats.org/officeDocument/2006/relationships" xmlns:p="http://schemas.openxmlformats.org/presentationml/2006/main">
   <p:cSld>
@@ -2068,7 +2352,13 @@
   <p:cSld>
     <p:spTree>
       <p:nvGrpSpPr>
-        <p:cNvPr id="1" name=""/>
+        <p:cNvPr id="1" name="">
+          <a:extLst>
+            <a:ext uri="{FF2B5EF4-FFF2-40B4-BE49-F238E27FC236}">
+              <a16:creationId xmlns:a16="http://schemas.microsoft.com/office/drawing/2014/main" id="{48C89A8B-D65E-BEB2-5430-07C7AB21D570}"/>
+            </a:ext>
+          </a:extLst>
+        </p:cNvPr>
         <p:cNvGrpSpPr/>
         <p:nvPr/>
       </p:nvGrpSpPr>
@@ -2082,7 +2372,13 @@
       </p:grpSpPr>
       <p:sp>
         <p:nvSpPr>
-          <p:cNvPr id="2" name="Slide Image Placeholder 1"/>
+          <p:cNvPr id="2" name="Slide Image Placeholder 1">
+            <a:extLst>
+              <a:ext uri="{FF2B5EF4-FFF2-40B4-BE49-F238E27FC236}">
+                <a16:creationId xmlns:a16="http://schemas.microsoft.com/office/drawing/2014/main" id="{FC42AF78-CB5C-D3F8-8704-9D4A52E4F1D3}"/>
+              </a:ext>
+            </a:extLst>
+          </p:cNvPr>
           <p:cNvSpPr>
             <a:spLocks noGrp="1" noRot="1" noChangeAspect="1"/>
           </p:cNvSpPr>
@@ -2094,7 +2390,13 @@
       </p:sp>
       <p:sp>
         <p:nvSpPr>
-          <p:cNvPr id="3" name="Notes Placeholder 2"/>
+          <p:cNvPr id="3" name="Notes Placeholder 2">
+            <a:extLst>
+              <a:ext uri="{FF2B5EF4-FFF2-40B4-BE49-F238E27FC236}">
+                <a16:creationId xmlns:a16="http://schemas.microsoft.com/office/drawing/2014/main" id="{1FA31141-FDE6-991B-FF88-E5D0A2B05B9E}"/>
+              </a:ext>
+            </a:extLst>
+          </p:cNvPr>
           <p:cNvSpPr>
             <a:spLocks noGrp="1"/>
           </p:cNvSpPr>
@@ -2121,7 +2423,13 @@
       </p:sp>
       <p:sp>
         <p:nvSpPr>
-          <p:cNvPr id="4" name="Slide Number Placeholder 3"/>
+          <p:cNvPr id="4" name="Slide Number Placeholder 3">
+            <a:extLst>
+              <a:ext uri="{FF2B5EF4-FFF2-40B4-BE49-F238E27FC236}">
+                <a16:creationId xmlns:a16="http://schemas.microsoft.com/office/drawing/2014/main" id="{CB05BD2D-9D71-A0F1-10B0-3CC82B17B6EE}"/>
+              </a:ext>
+            </a:extLst>
+          </p:cNvPr>
           <p:cNvSpPr>
             <a:spLocks noGrp="1"/>
           </p:cNvSpPr>
@@ -2145,7 +2453,7 @@
     </p:spTree>
     <p:extLst>
       <p:ext uri="{BB962C8B-B14F-4D97-AF65-F5344CB8AC3E}">
-        <p14:creationId xmlns:p14="http://schemas.microsoft.com/office/powerpoint/2010/main" val="3151576291"/>
+        <p14:creationId xmlns:p14="http://schemas.microsoft.com/office/powerpoint/2010/main" val="2081709950"/>
       </p:ext>
     </p:extLst>
   </p:cSld>
@@ -2160,7 +2468,13 @@
   <p:cSld>
     <p:spTree>
       <p:nvGrpSpPr>
-        <p:cNvPr id="1" name=""/>
+        <p:cNvPr id="1" name="">
+          <a:extLst>
+            <a:ext uri="{FF2B5EF4-FFF2-40B4-BE49-F238E27FC236}">
+              <a16:creationId xmlns:a16="http://schemas.microsoft.com/office/drawing/2014/main" id="{EA9A2E9B-0DE1-5C57-91AF-F0FFBAFC8572}"/>
+            </a:ext>
+          </a:extLst>
+        </p:cNvPr>
         <p:cNvGrpSpPr/>
         <p:nvPr/>
       </p:nvGrpSpPr>
@@ -2174,7 +2488,13 @@
       </p:grpSpPr>
       <p:sp>
         <p:nvSpPr>
-          <p:cNvPr id="2" name="Slide Image Placeholder 1"/>
+          <p:cNvPr id="2" name="Slide Image Placeholder 1">
+            <a:extLst>
+              <a:ext uri="{FF2B5EF4-FFF2-40B4-BE49-F238E27FC236}">
+                <a16:creationId xmlns:a16="http://schemas.microsoft.com/office/drawing/2014/main" id="{66AD1171-30E7-6F7E-6766-38307542D6E4}"/>
+              </a:ext>
+            </a:extLst>
+          </p:cNvPr>
           <p:cNvSpPr>
             <a:spLocks noGrp="1" noRot="1" noChangeAspect="1"/>
           </p:cNvSpPr>
@@ -2186,7 +2506,13 @@
       </p:sp>
       <p:sp>
         <p:nvSpPr>
-          <p:cNvPr id="3" name="Notes Placeholder 2"/>
+          <p:cNvPr id="3" name="Notes Placeholder 2">
+            <a:extLst>
+              <a:ext uri="{FF2B5EF4-FFF2-40B4-BE49-F238E27FC236}">
+                <a16:creationId xmlns:a16="http://schemas.microsoft.com/office/drawing/2014/main" id="{751A0C10-D214-0B7D-0CD9-560BB78AD693}"/>
+              </a:ext>
+            </a:extLst>
+          </p:cNvPr>
           <p:cNvSpPr>
             <a:spLocks noGrp="1"/>
           </p:cNvSpPr>
@@ -2213,7 +2539,13 @@
       </p:sp>
       <p:sp>
         <p:nvSpPr>
-          <p:cNvPr id="4" name="Slide Number Placeholder 3"/>
+          <p:cNvPr id="4" name="Slide Number Placeholder 3">
+            <a:extLst>
+              <a:ext uri="{FF2B5EF4-FFF2-40B4-BE49-F238E27FC236}">
+                <a16:creationId xmlns:a16="http://schemas.microsoft.com/office/drawing/2014/main" id="{AF72A211-F16A-FA21-63AE-0E9C6148073C}"/>
+              </a:ext>
+            </a:extLst>
+          </p:cNvPr>
           <p:cNvSpPr>
             <a:spLocks noGrp="1"/>
           </p:cNvSpPr>
@@ -2237,7 +2569,7 @@
     </p:spTree>
     <p:extLst>
       <p:ext uri="{BB962C8B-B14F-4D97-AF65-F5344CB8AC3E}">
-        <p14:creationId xmlns:p14="http://schemas.microsoft.com/office/powerpoint/2010/main" val="4094821645"/>
+        <p14:creationId xmlns:p14="http://schemas.microsoft.com/office/powerpoint/2010/main" val="1901058048"/>
       </p:ext>
     </p:extLst>
   </p:cSld>
@@ -2329,7 +2661,7 @@
     </p:spTree>
     <p:extLst>
       <p:ext uri="{BB962C8B-B14F-4D97-AF65-F5344CB8AC3E}">
-        <p14:creationId xmlns:p14="http://schemas.microsoft.com/office/powerpoint/2010/main" val="1393299959"/>
+        <p14:creationId xmlns:p14="http://schemas.microsoft.com/office/powerpoint/2010/main" val="3151576291"/>
       </p:ext>
     </p:extLst>
   </p:cSld>
@@ -2344,7 +2676,13 @@
   <p:cSld>
     <p:spTree>
       <p:nvGrpSpPr>
-        <p:cNvPr id="1" name=""/>
+        <p:cNvPr id="1" name="">
+          <a:extLst>
+            <a:ext uri="{FF2B5EF4-FFF2-40B4-BE49-F238E27FC236}">
+              <a16:creationId xmlns:a16="http://schemas.microsoft.com/office/drawing/2014/main" id="{1E59FA1C-6BD1-BE5C-70C4-618C361754B8}"/>
+            </a:ext>
+          </a:extLst>
+        </p:cNvPr>
         <p:cNvGrpSpPr/>
         <p:nvPr/>
       </p:nvGrpSpPr>
@@ -2358,7 +2696,13 @@
       </p:grpSpPr>
       <p:sp>
         <p:nvSpPr>
-          <p:cNvPr id="2" name="Slide Image Placeholder 1"/>
+          <p:cNvPr id="2" name="Slide Image Placeholder 1">
+            <a:extLst>
+              <a:ext uri="{FF2B5EF4-FFF2-40B4-BE49-F238E27FC236}">
+                <a16:creationId xmlns:a16="http://schemas.microsoft.com/office/drawing/2014/main" id="{68005444-34AB-1F2D-063E-9FAB1BA2B02F}"/>
+              </a:ext>
+            </a:extLst>
+          </p:cNvPr>
           <p:cNvSpPr>
             <a:spLocks noGrp="1" noRot="1" noChangeAspect="1"/>
           </p:cNvSpPr>
@@ -2370,7 +2714,13 @@
       </p:sp>
       <p:sp>
         <p:nvSpPr>
-          <p:cNvPr id="3" name="Notes Placeholder 2"/>
+          <p:cNvPr id="3" name="Notes Placeholder 2">
+            <a:extLst>
+              <a:ext uri="{FF2B5EF4-FFF2-40B4-BE49-F238E27FC236}">
+                <a16:creationId xmlns:a16="http://schemas.microsoft.com/office/drawing/2014/main" id="{521FBA97-7FAE-D885-4021-830997ED6376}"/>
+              </a:ext>
+            </a:extLst>
+          </p:cNvPr>
           <p:cNvSpPr>
             <a:spLocks noGrp="1"/>
           </p:cNvSpPr>
@@ -2397,7 +2747,13 @@
       </p:sp>
       <p:sp>
         <p:nvSpPr>
-          <p:cNvPr id="4" name="Slide Number Placeholder 3"/>
+          <p:cNvPr id="4" name="Slide Number Placeholder 3">
+            <a:extLst>
+              <a:ext uri="{FF2B5EF4-FFF2-40B4-BE49-F238E27FC236}">
+                <a16:creationId xmlns:a16="http://schemas.microsoft.com/office/drawing/2014/main" id="{6CBD84FE-8ACB-A4E2-A5D0-CF2EF239FF91}"/>
+              </a:ext>
+            </a:extLst>
+          </p:cNvPr>
           <p:cNvSpPr>
             <a:spLocks noGrp="1"/>
           </p:cNvSpPr>
@@ -2421,7 +2777,7 @@
     </p:spTree>
     <p:extLst>
       <p:ext uri="{BB962C8B-B14F-4D97-AF65-F5344CB8AC3E}">
-        <p14:creationId xmlns:p14="http://schemas.microsoft.com/office/powerpoint/2010/main" val="3925099013"/>
+        <p14:creationId xmlns:p14="http://schemas.microsoft.com/office/powerpoint/2010/main" val="1079063691"/>
       </p:ext>
     </p:extLst>
   </p:cSld>
@@ -2580,7 +2936,7 @@
           <a:p>
             <a:fld id="{376A689A-ECC5-4A76-B621-CD95EE49D403}" type="datetimeFigureOut">
               <a:rPr lang="en-GB" smtClean="0"/>
-              <a:t>18/09/2024</a:t>
+              <a:t>23/09/2024</a:t>
             </a:fld>
             <a:endParaRPr lang="en-GB"/>
           </a:p>
@@ -2780,7 +3136,7 @@
           <a:p>
             <a:fld id="{376A689A-ECC5-4A76-B621-CD95EE49D403}" type="datetimeFigureOut">
               <a:rPr lang="en-GB" smtClean="0"/>
-              <a:t>18/09/2024</a:t>
+              <a:t>23/09/2024</a:t>
             </a:fld>
             <a:endParaRPr lang="en-GB"/>
           </a:p>
@@ -2990,7 +3346,7 @@
           <a:p>
             <a:fld id="{376A689A-ECC5-4A76-B621-CD95EE49D403}" type="datetimeFigureOut">
               <a:rPr lang="en-GB" smtClean="0"/>
-              <a:t>18/09/2024</a:t>
+              <a:t>23/09/2024</a:t>
             </a:fld>
             <a:endParaRPr lang="en-GB"/>
           </a:p>
@@ -3190,7 +3546,7 @@
           <a:p>
             <a:fld id="{376A689A-ECC5-4A76-B621-CD95EE49D403}" type="datetimeFigureOut">
               <a:rPr lang="en-GB" smtClean="0"/>
-              <a:t>18/09/2024</a:t>
+              <a:t>23/09/2024</a:t>
             </a:fld>
             <a:endParaRPr lang="en-GB"/>
           </a:p>
@@ -3466,7 +3822,7 @@
           <a:p>
             <a:fld id="{376A689A-ECC5-4A76-B621-CD95EE49D403}" type="datetimeFigureOut">
               <a:rPr lang="en-GB" smtClean="0"/>
-              <a:t>18/09/2024</a:t>
+              <a:t>23/09/2024</a:t>
             </a:fld>
             <a:endParaRPr lang="en-GB"/>
           </a:p>
@@ -3734,7 +4090,7 @@
           <a:p>
             <a:fld id="{376A689A-ECC5-4A76-B621-CD95EE49D403}" type="datetimeFigureOut">
               <a:rPr lang="en-GB" smtClean="0"/>
-              <a:t>18/09/2024</a:t>
+              <a:t>23/09/2024</a:t>
             </a:fld>
             <a:endParaRPr lang="en-GB"/>
           </a:p>
@@ -4149,7 +4505,7 @@
           <a:p>
             <a:fld id="{376A689A-ECC5-4A76-B621-CD95EE49D403}" type="datetimeFigureOut">
               <a:rPr lang="en-GB" smtClean="0"/>
-              <a:t>18/09/2024</a:t>
+              <a:t>23/09/2024</a:t>
             </a:fld>
             <a:endParaRPr lang="en-GB"/>
           </a:p>
@@ -4291,7 +4647,7 @@
           <a:p>
             <a:fld id="{376A689A-ECC5-4A76-B621-CD95EE49D403}" type="datetimeFigureOut">
               <a:rPr lang="en-GB" smtClean="0"/>
-              <a:t>18/09/2024</a:t>
+              <a:t>23/09/2024</a:t>
             </a:fld>
             <a:endParaRPr lang="en-GB"/>
           </a:p>
@@ -4404,7 +4760,7 @@
           <a:p>
             <a:fld id="{376A689A-ECC5-4A76-B621-CD95EE49D403}" type="datetimeFigureOut">
               <a:rPr lang="en-GB" smtClean="0"/>
-              <a:t>18/09/2024</a:t>
+              <a:t>23/09/2024</a:t>
             </a:fld>
             <a:endParaRPr lang="en-GB"/>
           </a:p>
@@ -4717,7 +5073,7 @@
           <a:p>
             <a:fld id="{376A689A-ECC5-4A76-B621-CD95EE49D403}" type="datetimeFigureOut">
               <a:rPr lang="en-GB" smtClean="0"/>
-              <a:t>18/09/2024</a:t>
+              <a:t>23/09/2024</a:t>
             </a:fld>
             <a:endParaRPr lang="en-GB"/>
           </a:p>
@@ -5006,7 +5362,7 @@
           <a:p>
             <a:fld id="{376A689A-ECC5-4A76-B621-CD95EE49D403}" type="datetimeFigureOut">
               <a:rPr lang="en-GB" smtClean="0"/>
-              <a:t>18/09/2024</a:t>
+              <a:t>23/09/2024</a:t>
             </a:fld>
             <a:endParaRPr lang="en-GB"/>
           </a:p>
@@ -5249,7 +5605,7 @@
           <a:p>
             <a:fld id="{376A689A-ECC5-4A76-B621-CD95EE49D403}" type="datetimeFigureOut">
               <a:rPr lang="en-GB" smtClean="0"/>
-              <a:t>18/09/2024</a:t>
+              <a:t>23/09/2024</a:t>
             </a:fld>
             <a:endParaRPr lang="en-GB"/>
           </a:p>
@@ -6176,7 +6532,13 @@
   <p:cSld>
     <p:spTree>
       <p:nvGrpSpPr>
-        <p:cNvPr id="1" name=""/>
+        <p:cNvPr id="1" name="">
+          <a:extLst>
+            <a:ext uri="{FF2B5EF4-FFF2-40B4-BE49-F238E27FC236}">
+              <a16:creationId xmlns:a16="http://schemas.microsoft.com/office/drawing/2014/main" id="{E1DA1596-C954-9883-C7FA-6CA2D5B4B003}"/>
+            </a:ext>
+          </a:extLst>
+        </p:cNvPr>
         <p:cNvGrpSpPr/>
         <p:nvPr/>
       </p:nvGrpSpPr>
@@ -6193,7 +6555,7 @@
           <p:cNvPr id="2" name="Title 1">
             <a:extLst>
               <a:ext uri="{FF2B5EF4-FFF2-40B4-BE49-F238E27FC236}">
-                <a16:creationId xmlns:a16="http://schemas.microsoft.com/office/drawing/2014/main" id="{355A15E5-8BCB-9CDA-A766-382FABDFE98F}"/>
+                <a16:creationId xmlns:a16="http://schemas.microsoft.com/office/drawing/2014/main" id="{55DC88A7-8B45-7E8B-3C34-1DA9CD1DBAF0}"/>
               </a:ext>
             </a:extLst>
           </p:cNvPr>
@@ -6211,7 +6573,7 @@
           <a:p>
             <a:r>
               <a:rPr lang="en-GB" dirty="0"/>
-              <a:t>Implications</a:t>
+              <a:t>Methods</a:t>
             </a:r>
           </a:p>
         </p:txBody>
@@ -6221,7 +6583,7 @@
           <p:cNvPr id="3" name="Content Placeholder 2">
             <a:extLst>
               <a:ext uri="{FF2B5EF4-FFF2-40B4-BE49-F238E27FC236}">
-                <a16:creationId xmlns:a16="http://schemas.microsoft.com/office/drawing/2014/main" id="{AA03AE5F-BDF5-D7CE-D99E-1D1ADC825F33}"/>
+                <a16:creationId xmlns:a16="http://schemas.microsoft.com/office/drawing/2014/main" id="{DF35B0C2-FFEE-65A0-B108-03C72D8B5446}"/>
               </a:ext>
             </a:extLst>
           </p:cNvPr>
@@ -6234,9 +6596,54 @@
         </p:nvSpPr>
         <p:spPr/>
         <p:txBody>
-          <a:bodyPr/>
-          <a:lstStyle/>
-          <a:p>
+          <a:bodyPr>
+            <a:normAutofit fontScale="92500" lnSpcReduction="20000"/>
+          </a:bodyPr>
+          <a:lstStyle/>
+          <a:p>
+            <a:r>
+              <a:rPr lang="en-US" dirty="0"/>
+              <a:t>Tested question-answering with LLMs</a:t>
+            </a:r>
+          </a:p>
+          <a:p>
+            <a:r>
+              <a:rPr lang="en-US" dirty="0"/>
+              <a:t>Compared vocabulary sizes for each class (0 and 1)</a:t>
+            </a:r>
+          </a:p>
+          <a:p>
+            <a:r>
+              <a:rPr lang="en-US" dirty="0"/>
+              <a:t>Analyzed n-grams and TF-IDF conversion</a:t>
+            </a:r>
+          </a:p>
+          <a:p>
+            <a:r>
+              <a:rPr lang="en-US" dirty="0"/>
+              <a:t>Ran logistic lasso regression to identify predictive words</a:t>
+            </a:r>
+          </a:p>
+          <a:p>
+            <a:pPr lvl="1"/>
+            <a:r>
+              <a:rPr lang="en-US" dirty="0"/>
+              <a:t>Extracted feature names and coefficients</a:t>
+            </a:r>
+          </a:p>
+          <a:p>
+            <a:pPr lvl="1"/>
+            <a:r>
+              <a:rPr lang="en-US" dirty="0"/>
+              <a:t>Plotted model coefficients</a:t>
+            </a:r>
+          </a:p>
+          <a:p>
+            <a:pPr lvl="1"/>
+            <a:r>
+              <a:rPr lang="en-US" dirty="0"/>
+              <a:t>Applied SHAP for model interpretation</a:t>
+            </a:r>
             <a:endParaRPr lang="en-GB" dirty="0"/>
           </a:p>
         </p:txBody>
@@ -6246,7 +6653,7 @@
           <p:cNvPr id="4" name="Content Placeholder 3">
             <a:extLst>
               <a:ext uri="{FF2B5EF4-FFF2-40B4-BE49-F238E27FC236}">
-                <a16:creationId xmlns:a16="http://schemas.microsoft.com/office/drawing/2014/main" id="{352B026B-36D8-C7F5-EF24-AB17CD257FE1}"/>
+                <a16:creationId xmlns:a16="http://schemas.microsoft.com/office/drawing/2014/main" id="{01CAE330-7559-FEB7-3B3C-4601AE515B11}"/>
               </a:ext>
             </a:extLst>
           </p:cNvPr>
@@ -6259,7 +6666,9 @@
         </p:nvSpPr>
         <p:spPr/>
         <p:txBody>
-          <a:bodyPr/>
+          <a:bodyPr>
+            <a:normAutofit fontScale="92500" lnSpcReduction="20000"/>
+          </a:bodyPr>
           <a:lstStyle/>
           <a:p>
             <a:r>
@@ -6272,7 +6681,7 @@
     </p:spTree>
     <p:extLst>
       <p:ext uri="{BB962C8B-B14F-4D97-AF65-F5344CB8AC3E}">
-        <p14:creationId xmlns:p14="http://schemas.microsoft.com/office/powerpoint/2010/main" val="4144772600"/>
+        <p14:creationId xmlns:p14="http://schemas.microsoft.com/office/powerpoint/2010/main" val="428903400"/>
       </p:ext>
     </p:extLst>
   </p:cSld>
@@ -6322,7 +6731,7 @@
           <a:p>
             <a:r>
               <a:rPr lang="en-GB" dirty="0"/>
-              <a:t>Future work and limitations</a:t>
+              <a:t>Results</a:t>
             </a:r>
           </a:p>
         </p:txBody>
@@ -6345,9 +6754,39 @@
         </p:nvSpPr>
         <p:spPr/>
         <p:txBody>
-          <a:bodyPr/>
-          <a:lstStyle/>
-          <a:p>
+          <a:bodyPr>
+            <a:normAutofit fontScale="92500" lnSpcReduction="20000"/>
+          </a:bodyPr>
+          <a:lstStyle/>
+          <a:p>
+            <a:r>
+              <a:rPr lang="en-US" b="0" i="0" dirty="0">
+                <a:solidFill>
+                  <a:srgbClr val="3D3929"/>
+                </a:solidFill>
+                <a:effectLst/>
+                <a:latin typeface="__styreneB_5d855b"/>
+              </a:rPr>
+              <a:t>learning curves of the classification models of different diagnoses varied significantly, despite them using the same underlying preprocessing methods and models. </a:t>
+            </a:r>
+          </a:p>
+          <a:p>
+            <a:r>
+              <a:rPr lang="en-US" dirty="0"/>
+              <a:t>Vocabulary complexity analysis inconclusive in explaining differences</a:t>
+            </a:r>
+          </a:p>
+          <a:p>
+            <a:r>
+              <a:rPr lang="en-US" b="0" i="0" dirty="0">
+                <a:solidFill>
+                  <a:srgbClr val="3D3929"/>
+                </a:solidFill>
+                <a:effectLst/>
+                <a:latin typeface="__styreneB_5d855b"/>
+              </a:rPr>
+              <a:t>Half of the modelled outcomes did not reach accuracy of 0.70 or above even with the 10,800 documents (the maximum training size in the experiments).</a:t>
+            </a:r>
             <a:endParaRPr lang="en-GB" dirty="0"/>
           </a:p>
         </p:txBody>
@@ -6370,20 +6809,29 @@
         </p:nvSpPr>
         <p:spPr/>
         <p:txBody>
-          <a:bodyPr/>
-          <a:lstStyle/>
-          <a:p>
-            <a:r>
-              <a:rPr lang="en-GB" dirty="0"/>
-              <a:t>Pics / diagrams</a:t>
-            </a:r>
+          <a:bodyPr>
+            <a:normAutofit fontScale="92500" lnSpcReduction="20000"/>
+          </a:bodyPr>
+          <a:lstStyle/>
+          <a:p>
+            <a:r>
+              <a:rPr lang="en-US" dirty="0"/>
+              <a:t>Performance plateaued at sample sizes between 1,000-5,000 documents</a:t>
+            </a:r>
+          </a:p>
+          <a:p>
+            <a:r>
+              <a:rPr lang="en-US" dirty="0"/>
+              <a:t>For 10 out of 11 diagnoses, n=600 achieved 95% of performance possible with n=10,000</a:t>
+            </a:r>
+            <a:endParaRPr lang="en-GB" dirty="0"/>
           </a:p>
         </p:txBody>
       </p:sp>
     </p:spTree>
     <p:extLst>
       <p:ext uri="{BB962C8B-B14F-4D97-AF65-F5344CB8AC3E}">
-        <p14:creationId xmlns:p14="http://schemas.microsoft.com/office/powerpoint/2010/main" val="3954035274"/>
+        <p14:creationId xmlns:p14="http://schemas.microsoft.com/office/powerpoint/2010/main" val="1109732945"/>
       </p:ext>
     </p:extLst>
   </p:cSld>
@@ -6394,6 +6842,162 @@
 </file>
 
 <file path=ppt/slides/slide12.xml><?xml version="1.0" encoding="utf-8"?>
+<p:sld xmlns:a="http://schemas.openxmlformats.org/drawingml/2006/main" xmlns:r="http://schemas.openxmlformats.org/officeDocument/2006/relationships" xmlns:p="http://schemas.openxmlformats.org/presentationml/2006/main">
+  <p:cSld>
+    <p:spTree>
+      <p:nvGrpSpPr>
+        <p:cNvPr id="1" name="">
+          <a:extLst>
+            <a:ext uri="{FF2B5EF4-FFF2-40B4-BE49-F238E27FC236}">
+              <a16:creationId xmlns:a16="http://schemas.microsoft.com/office/drawing/2014/main" id="{2DF6B459-295B-34CD-9FDA-730841D070E8}"/>
+            </a:ext>
+          </a:extLst>
+        </p:cNvPr>
+        <p:cNvGrpSpPr/>
+        <p:nvPr/>
+      </p:nvGrpSpPr>
+      <p:grpSpPr>
+        <a:xfrm>
+          <a:off x="0" y="0"/>
+          <a:ext cx="0" cy="0"/>
+          <a:chOff x="0" y="0"/>
+          <a:chExt cx="0" cy="0"/>
+        </a:xfrm>
+      </p:grpSpPr>
+      <p:sp>
+        <p:nvSpPr>
+          <p:cNvPr id="2" name="Title 1">
+            <a:extLst>
+              <a:ext uri="{FF2B5EF4-FFF2-40B4-BE49-F238E27FC236}">
+                <a16:creationId xmlns:a16="http://schemas.microsoft.com/office/drawing/2014/main" id="{E5975903-F488-20CB-D9E8-958BA7370BD5}"/>
+              </a:ext>
+            </a:extLst>
+          </p:cNvPr>
+          <p:cNvSpPr>
+            <a:spLocks noGrp="1"/>
+          </p:cNvSpPr>
+          <p:nvPr>
+            <p:ph type="title"/>
+          </p:nvPr>
+        </p:nvSpPr>
+        <p:spPr/>
+        <p:txBody>
+          <a:bodyPr/>
+          <a:lstStyle/>
+          <a:p>
+            <a:r>
+              <a:rPr lang="en-GB" dirty="0"/>
+              <a:t>Results</a:t>
+            </a:r>
+          </a:p>
+        </p:txBody>
+      </p:sp>
+      <p:sp>
+        <p:nvSpPr>
+          <p:cNvPr id="3" name="Content Placeholder 2">
+            <a:extLst>
+              <a:ext uri="{FF2B5EF4-FFF2-40B4-BE49-F238E27FC236}">
+                <a16:creationId xmlns:a16="http://schemas.microsoft.com/office/drawing/2014/main" id="{DBF7124B-5027-42F1-D078-0A80DA5882BC}"/>
+              </a:ext>
+            </a:extLst>
+          </p:cNvPr>
+          <p:cNvSpPr>
+            <a:spLocks noGrp="1"/>
+          </p:cNvSpPr>
+          <p:nvPr>
+            <p:ph sz="half" idx="1"/>
+          </p:nvPr>
+        </p:nvSpPr>
+        <p:spPr/>
+        <p:txBody>
+          <a:bodyPr>
+            <a:normAutofit/>
+          </a:bodyPr>
+          <a:lstStyle/>
+          <a:p>
+            <a:r>
+              <a:rPr lang="en-US" dirty="0"/>
+              <a:t>'Original' dataset showed unusually steep learning curve (outlier)</a:t>
+            </a:r>
+          </a:p>
+          <a:p>
+            <a:r>
+              <a:rPr lang="en-US" dirty="0"/>
+              <a:t>Less noisy texts consistently showed strong predictors</a:t>
+            </a:r>
+          </a:p>
+          <a:p>
+            <a:r>
+              <a:rPr lang="en-US" dirty="0"/>
+              <a:t>Clear pattern of more strong predictors and fewer noisy predictors associated with higher AUC-max</a:t>
+            </a:r>
+            <a:endParaRPr lang="en-GB" dirty="0"/>
+          </a:p>
+        </p:txBody>
+      </p:sp>
+      <p:sp>
+        <p:nvSpPr>
+          <p:cNvPr id="4" name="Content Placeholder 3">
+            <a:extLst>
+              <a:ext uri="{FF2B5EF4-FFF2-40B4-BE49-F238E27FC236}">
+                <a16:creationId xmlns:a16="http://schemas.microsoft.com/office/drawing/2014/main" id="{A235880F-D127-C926-F762-CB0554BE6B91}"/>
+              </a:ext>
+            </a:extLst>
+          </p:cNvPr>
+          <p:cNvSpPr>
+            <a:spLocks noGrp="1"/>
+          </p:cNvSpPr>
+          <p:nvPr>
+            <p:ph sz="half" idx="2"/>
+          </p:nvPr>
+        </p:nvSpPr>
+        <p:spPr/>
+        <p:txBody>
+          <a:bodyPr>
+            <a:normAutofit/>
+          </a:bodyPr>
+          <a:lstStyle/>
+          <a:p>
+            <a:r>
+              <a:rPr lang="en-US" b="0" i="0" dirty="0">
+                <a:solidFill>
+                  <a:srgbClr val="3D3929"/>
+                </a:solidFill>
+                <a:effectLst/>
+                <a:latin typeface="__styreneB_5d855b"/>
+              </a:rPr>
+              <a:t>an increase of 100 noisy words corresponds to a decrease of approximately 0.02 in AUC-max</a:t>
+            </a:r>
+          </a:p>
+          <a:p>
+            <a:r>
+              <a:rPr lang="en-US" b="0" i="0" dirty="0">
+                <a:solidFill>
+                  <a:srgbClr val="3D3929"/>
+                </a:solidFill>
+                <a:effectLst/>
+                <a:latin typeface="__styreneB_5d855b"/>
+              </a:rPr>
+              <a:t>an increase of 100 strong predictors corresponds to an increase of approximately 0.04 in AUC-max.</a:t>
+            </a:r>
+            <a:endParaRPr lang="en-GB" dirty="0"/>
+          </a:p>
+        </p:txBody>
+      </p:sp>
+    </p:spTree>
+    <p:extLst>
+      <p:ext uri="{BB962C8B-B14F-4D97-AF65-F5344CB8AC3E}">
+        <p14:creationId xmlns:p14="http://schemas.microsoft.com/office/powerpoint/2010/main" val="4198482480"/>
+      </p:ext>
+    </p:extLst>
+  </p:cSld>
+  <p:clrMapOvr>
+    <a:masterClrMapping/>
+  </p:clrMapOvr>
+</p:sld>
+</file>
+
+<file path=ppt/slides/slide13.xml><?xml version="1.0" encoding="utf-8"?>
 <p:sld xmlns:a="http://schemas.openxmlformats.org/drawingml/2006/main" xmlns:r="http://schemas.openxmlformats.org/officeDocument/2006/relationships" xmlns:p="http://schemas.openxmlformats.org/presentationml/2006/main">
   <p:cSld>
     <p:spTree>
@@ -6433,6 +7037,274 @@
           <a:p>
             <a:r>
               <a:rPr lang="en-GB" dirty="0"/>
+              <a:t>Implications</a:t>
+            </a:r>
+          </a:p>
+        </p:txBody>
+      </p:sp>
+      <p:sp>
+        <p:nvSpPr>
+          <p:cNvPr id="3" name="Content Placeholder 2">
+            <a:extLst>
+              <a:ext uri="{FF2B5EF4-FFF2-40B4-BE49-F238E27FC236}">
+                <a16:creationId xmlns:a16="http://schemas.microsoft.com/office/drawing/2014/main" id="{AA03AE5F-BDF5-D7CE-D99E-1D1ADC825F33}"/>
+              </a:ext>
+            </a:extLst>
+          </p:cNvPr>
+          <p:cNvSpPr>
+            <a:spLocks noGrp="1"/>
+          </p:cNvSpPr>
+          <p:nvPr>
+            <p:ph sz="half" idx="1"/>
+          </p:nvPr>
+        </p:nvSpPr>
+        <p:spPr/>
+        <p:txBody>
+          <a:bodyPr>
+            <a:normAutofit fontScale="85000" lnSpcReduction="10000"/>
+          </a:bodyPr>
+          <a:lstStyle/>
+          <a:p>
+            <a:r>
+              <a:rPr lang="en-US" dirty="0"/>
+              <a:t>Simple keyword analysis can indicate learning curve steepness </a:t>
+            </a:r>
+          </a:p>
+          <a:p>
+            <a:r>
+              <a:rPr lang="en-US" dirty="0"/>
+              <a:t>Data cleaning techniques focusing on relevant document parts can significantly impact performance </a:t>
+            </a:r>
+          </a:p>
+          <a:p>
+            <a:r>
+              <a:rPr lang="en-US" dirty="0"/>
+              <a:t>Understanding predictor-noise-AUC relationship can guide optimal sample size decisions </a:t>
+            </a:r>
+          </a:p>
+          <a:p>
+            <a:r>
+              <a:rPr lang="en-US" dirty="0"/>
+              <a:t>Quantitative guidelines can estimate potential improvements from data cleaning or additional data</a:t>
+            </a:r>
+            <a:endParaRPr lang="en-GB" dirty="0"/>
+          </a:p>
+        </p:txBody>
+      </p:sp>
+      <p:sp>
+        <p:nvSpPr>
+          <p:cNvPr id="4" name="Content Placeholder 3">
+            <a:extLst>
+              <a:ext uri="{FF2B5EF4-FFF2-40B4-BE49-F238E27FC236}">
+                <a16:creationId xmlns:a16="http://schemas.microsoft.com/office/drawing/2014/main" id="{352B026B-36D8-C7F5-EF24-AB17CD257FE1}"/>
+              </a:ext>
+            </a:extLst>
+          </p:cNvPr>
+          <p:cNvSpPr>
+            <a:spLocks noGrp="1"/>
+          </p:cNvSpPr>
+          <p:nvPr>
+            <p:ph sz="half" idx="2"/>
+          </p:nvPr>
+        </p:nvSpPr>
+        <p:spPr/>
+        <p:txBody>
+          <a:bodyPr>
+            <a:normAutofit fontScale="85000" lnSpcReduction="10000"/>
+          </a:bodyPr>
+          <a:lstStyle/>
+          <a:p>
+            <a:r>
+              <a:rPr lang="en-GB" dirty="0"/>
+              <a:t>Pics / diagrams</a:t>
+            </a:r>
+          </a:p>
+        </p:txBody>
+      </p:sp>
+    </p:spTree>
+    <p:extLst>
+      <p:ext uri="{BB962C8B-B14F-4D97-AF65-F5344CB8AC3E}">
+        <p14:creationId xmlns:p14="http://schemas.microsoft.com/office/powerpoint/2010/main" val="4144772600"/>
+      </p:ext>
+    </p:extLst>
+  </p:cSld>
+  <p:clrMapOvr>
+    <a:masterClrMapping/>
+  </p:clrMapOvr>
+</p:sld>
+</file>
+
+<file path=ppt/slides/slide14.xml><?xml version="1.0" encoding="utf-8"?>
+<p:sld xmlns:a="http://schemas.openxmlformats.org/drawingml/2006/main" xmlns:r="http://schemas.openxmlformats.org/officeDocument/2006/relationships" xmlns:p="http://schemas.openxmlformats.org/presentationml/2006/main">
+  <p:cSld>
+    <p:spTree>
+      <p:nvGrpSpPr>
+        <p:cNvPr id="1" name=""/>
+        <p:cNvGrpSpPr/>
+        <p:nvPr/>
+      </p:nvGrpSpPr>
+      <p:grpSpPr>
+        <a:xfrm>
+          <a:off x="0" y="0"/>
+          <a:ext cx="0" cy="0"/>
+          <a:chOff x="0" y="0"/>
+          <a:chExt cx="0" cy="0"/>
+        </a:xfrm>
+      </p:grpSpPr>
+      <p:sp>
+        <p:nvSpPr>
+          <p:cNvPr id="2" name="Title 1">
+            <a:extLst>
+              <a:ext uri="{FF2B5EF4-FFF2-40B4-BE49-F238E27FC236}">
+                <a16:creationId xmlns:a16="http://schemas.microsoft.com/office/drawing/2014/main" id="{355A15E5-8BCB-9CDA-A766-382FABDFE98F}"/>
+              </a:ext>
+            </a:extLst>
+          </p:cNvPr>
+          <p:cNvSpPr>
+            <a:spLocks noGrp="1"/>
+          </p:cNvSpPr>
+          <p:nvPr>
+            <p:ph type="title"/>
+          </p:nvPr>
+        </p:nvSpPr>
+        <p:spPr/>
+        <p:txBody>
+          <a:bodyPr/>
+          <a:lstStyle/>
+          <a:p>
+            <a:r>
+              <a:rPr lang="en-GB" dirty="0"/>
+              <a:t>Future work and limitations</a:t>
+            </a:r>
+          </a:p>
+        </p:txBody>
+      </p:sp>
+      <p:sp>
+        <p:nvSpPr>
+          <p:cNvPr id="3" name="Content Placeholder 2">
+            <a:extLst>
+              <a:ext uri="{FF2B5EF4-FFF2-40B4-BE49-F238E27FC236}">
+                <a16:creationId xmlns:a16="http://schemas.microsoft.com/office/drawing/2014/main" id="{AA03AE5F-BDF5-D7CE-D99E-1D1ADC825F33}"/>
+              </a:ext>
+            </a:extLst>
+          </p:cNvPr>
+          <p:cNvSpPr>
+            <a:spLocks noGrp="1"/>
+          </p:cNvSpPr>
+          <p:nvPr>
+            <p:ph sz="half" idx="1"/>
+          </p:nvPr>
+        </p:nvSpPr>
+        <p:spPr/>
+        <p:txBody>
+          <a:bodyPr/>
+          <a:lstStyle/>
+          <a:p>
+            <a:r>
+              <a:rPr lang="en-US" dirty="0"/>
+              <a:t>Ongoing analysis of text properties underlying learning curve differences </a:t>
+            </a:r>
+          </a:p>
+          <a:p>
+            <a:r>
+              <a:rPr lang="en-US" dirty="0"/>
+              <a:t>Exploring key word frequencies and distances in LLM document representations </a:t>
+            </a:r>
+          </a:p>
+          <a:p>
+            <a:r>
+              <a:rPr lang="en-US" dirty="0"/>
+              <a:t>Modern generative methods for increasing training data not explored (out of scope)</a:t>
+            </a:r>
+            <a:endParaRPr lang="en-GB" dirty="0"/>
+          </a:p>
+        </p:txBody>
+      </p:sp>
+      <p:sp>
+        <p:nvSpPr>
+          <p:cNvPr id="4" name="Content Placeholder 3">
+            <a:extLst>
+              <a:ext uri="{FF2B5EF4-FFF2-40B4-BE49-F238E27FC236}">
+                <a16:creationId xmlns:a16="http://schemas.microsoft.com/office/drawing/2014/main" id="{352B026B-36D8-C7F5-EF24-AB17CD257FE1}"/>
+              </a:ext>
+            </a:extLst>
+          </p:cNvPr>
+          <p:cNvSpPr>
+            <a:spLocks noGrp="1"/>
+          </p:cNvSpPr>
+          <p:nvPr>
+            <p:ph sz="half" idx="2"/>
+          </p:nvPr>
+        </p:nvSpPr>
+        <p:spPr/>
+        <p:txBody>
+          <a:bodyPr/>
+          <a:lstStyle/>
+          <a:p>
+            <a:pPr>
+              <a:buFont typeface="Arial" panose="020B0604020202020204" pitchFamily="34" charset="0"/>
+              <a:buChar char="•"/>
+            </a:pPr>
+            <a:r>
+              <a:rPr lang="en-US" dirty="0"/>
+              <a:t>Future directions to investigate more sophisticated text analysis techniques</a:t>
+            </a:r>
+          </a:p>
+        </p:txBody>
+      </p:sp>
+    </p:spTree>
+    <p:extLst>
+      <p:ext uri="{BB962C8B-B14F-4D97-AF65-F5344CB8AC3E}">
+        <p14:creationId xmlns:p14="http://schemas.microsoft.com/office/powerpoint/2010/main" val="3954035274"/>
+      </p:ext>
+    </p:extLst>
+  </p:cSld>
+  <p:clrMapOvr>
+    <a:masterClrMapping/>
+  </p:clrMapOvr>
+</p:sld>
+</file>
+
+<file path=ppt/slides/slide15.xml><?xml version="1.0" encoding="utf-8"?>
+<p:sld xmlns:a="http://schemas.openxmlformats.org/drawingml/2006/main" xmlns:r="http://schemas.openxmlformats.org/officeDocument/2006/relationships" xmlns:p="http://schemas.openxmlformats.org/presentationml/2006/main">
+  <p:cSld>
+    <p:spTree>
+      <p:nvGrpSpPr>
+        <p:cNvPr id="1" name=""/>
+        <p:cNvGrpSpPr/>
+        <p:nvPr/>
+      </p:nvGrpSpPr>
+      <p:grpSpPr>
+        <a:xfrm>
+          <a:off x="0" y="0"/>
+          <a:ext cx="0" cy="0"/>
+          <a:chOff x="0" y="0"/>
+          <a:chExt cx="0" cy="0"/>
+        </a:xfrm>
+      </p:grpSpPr>
+      <p:sp>
+        <p:nvSpPr>
+          <p:cNvPr id="2" name="Title 1">
+            <a:extLst>
+              <a:ext uri="{FF2B5EF4-FFF2-40B4-BE49-F238E27FC236}">
+                <a16:creationId xmlns:a16="http://schemas.microsoft.com/office/drawing/2014/main" id="{355A15E5-8BCB-9CDA-A766-382FABDFE98F}"/>
+              </a:ext>
+            </a:extLst>
+          </p:cNvPr>
+          <p:cNvSpPr>
+            <a:spLocks noGrp="1"/>
+          </p:cNvSpPr>
+          <p:nvPr>
+            <p:ph type="title"/>
+          </p:nvPr>
+        </p:nvSpPr>
+        <p:spPr/>
+        <p:txBody>
+          <a:bodyPr/>
+          <a:lstStyle/>
+          <a:p>
+            <a:r>
+              <a:rPr lang="en-GB" dirty="0"/>
               <a:t>Conclusions  </a:t>
             </a:r>
           </a:p>
@@ -6504,7 +7376,7 @@
 </p:sld>
 </file>
 
-<file path=ppt/slides/slide13.xml><?xml version="1.0" encoding="utf-8"?>
+<file path=ppt/slides/slide16.xml><?xml version="1.0" encoding="utf-8"?>
 <p:sld xmlns:a="http://schemas.openxmlformats.org/drawingml/2006/main" xmlns:r="http://schemas.openxmlformats.org/officeDocument/2006/relationships" xmlns:p="http://schemas.openxmlformats.org/presentationml/2006/main">
   <p:cSld>
     <p:spTree>
@@ -7462,7 +8334,13 @@
   <p:cSld>
     <p:spTree>
       <p:nvGrpSpPr>
-        <p:cNvPr id="1" name=""/>
+        <p:cNvPr id="1" name="">
+          <a:extLst>
+            <a:ext uri="{FF2B5EF4-FFF2-40B4-BE49-F238E27FC236}">
+              <a16:creationId xmlns:a16="http://schemas.microsoft.com/office/drawing/2014/main" id="{A10494C8-86C2-EF8B-F521-D60B46877395}"/>
+            </a:ext>
+          </a:extLst>
+        </p:cNvPr>
         <p:cNvGrpSpPr/>
         <p:nvPr/>
       </p:nvGrpSpPr>
@@ -7479,7 +8357,7 @@
           <p:cNvPr id="2" name="Title 1">
             <a:extLst>
               <a:ext uri="{FF2B5EF4-FFF2-40B4-BE49-F238E27FC236}">
-                <a16:creationId xmlns:a16="http://schemas.microsoft.com/office/drawing/2014/main" id="{355A15E5-8BCB-9CDA-A766-382FABDFE98F}"/>
+                <a16:creationId xmlns:a16="http://schemas.microsoft.com/office/drawing/2014/main" id="{E3BFB698-0DC4-59B4-A40D-7D303F52090A}"/>
               </a:ext>
             </a:extLst>
           </p:cNvPr>
@@ -7497,7 +8375,7 @@
           <a:p>
             <a:r>
               <a:rPr lang="en-GB" dirty="0"/>
-              <a:t>Results</a:t>
+              <a:t>Methods</a:t>
             </a:r>
           </a:p>
         </p:txBody>
@@ -7507,7 +8385,7 @@
           <p:cNvPr id="3" name="Content Placeholder 2">
             <a:extLst>
               <a:ext uri="{FF2B5EF4-FFF2-40B4-BE49-F238E27FC236}">
-                <a16:creationId xmlns:a16="http://schemas.microsoft.com/office/drawing/2014/main" id="{AA03AE5F-BDF5-D7CE-D99E-1D1ADC825F33}"/>
+                <a16:creationId xmlns:a16="http://schemas.microsoft.com/office/drawing/2014/main" id="{3B3772B0-CF75-670C-5447-4B5102D13026}"/>
               </a:ext>
             </a:extLst>
           </p:cNvPr>
@@ -7520,11 +8398,42 @@
         </p:nvSpPr>
         <p:spPr/>
         <p:txBody>
-          <a:bodyPr/>
-          <a:lstStyle/>
-          <a:p>
+          <a:bodyPr>
+            <a:normAutofit fontScale="92500"/>
+          </a:bodyPr>
+          <a:lstStyle/>
+          <a:p>
+            <a:r>
+              <a:rPr lang="en-GB" dirty="0"/>
+              <a:t>Dataset used: publicly available MIMIC-III dataset</a:t>
+            </a:r>
+          </a:p>
+          <a:p>
+            <a:r>
+              <a:rPr lang="en-GB" dirty="0"/>
+              <a:t>Pre-processing: lowercasing, remove symbols</a:t>
+            </a:r>
+          </a:p>
+          <a:p>
+            <a:r>
+              <a:rPr lang="en-GB" dirty="0"/>
+              <a:t>Training: binary classification task to identify diagnosis code</a:t>
+            </a:r>
+          </a:p>
+          <a:p>
+            <a:r>
+              <a:rPr lang="en-US" dirty="0"/>
+              <a:t>Varied training corpus size to investigate learning curves</a:t>
+            </a:r>
             <a:endParaRPr lang="en-GB" dirty="0"/>
           </a:p>
+          <a:p>
+            <a:r>
+              <a:rPr lang="en-US" dirty="0"/>
+              <a:t>Examined impact of vocabulary properties on learning curves</a:t>
+            </a:r>
+            <a:endParaRPr lang="en-GB" dirty="0"/>
+          </a:p>
         </p:txBody>
       </p:sp>
       <p:sp>
@@ -7532,7 +8441,7 @@
           <p:cNvPr id="4" name="Content Placeholder 3">
             <a:extLst>
               <a:ext uri="{FF2B5EF4-FFF2-40B4-BE49-F238E27FC236}">
-                <a16:creationId xmlns:a16="http://schemas.microsoft.com/office/drawing/2014/main" id="{352B026B-36D8-C7F5-EF24-AB17CD257FE1}"/>
+                <a16:creationId xmlns:a16="http://schemas.microsoft.com/office/drawing/2014/main" id="{2A8C713A-956C-F5FC-4912-C2DA0C2F0FD4}"/>
               </a:ext>
             </a:extLst>
           </p:cNvPr>
@@ -7545,7 +8454,9 @@
         </p:nvSpPr>
         <p:spPr/>
         <p:txBody>
-          <a:bodyPr/>
+          <a:bodyPr>
+            <a:normAutofit fontScale="92500"/>
+          </a:bodyPr>
           <a:lstStyle/>
           <a:p>
             <a:r>
@@ -7558,7 +8469,7 @@
     </p:spTree>
     <p:extLst>
       <p:ext uri="{BB962C8B-B14F-4D97-AF65-F5344CB8AC3E}">
-        <p14:creationId xmlns:p14="http://schemas.microsoft.com/office/powerpoint/2010/main" val="1109732945"/>
+        <p14:creationId xmlns:p14="http://schemas.microsoft.com/office/powerpoint/2010/main" val="1576291092"/>
       </p:ext>
     </p:extLst>
   </p:cSld>

</xml_diff>

<commit_message>
added more text and images needs rewording
</commit_message>
<xml_diff>
--- a/Determinants of the training corpus size for clinical.pptx
+++ b/Determinants of the training corpus size for clinical.pptx
@@ -5,7 +5,7 @@
     <p:sldMasterId id="2147483648" r:id="rId1"/>
   </p:sldMasterIdLst>
   <p:notesMasterIdLst>
-    <p:notesMasterId r:id="rId18"/>
+    <p:notesMasterId r:id="rId21"/>
   </p:notesMasterIdLst>
   <p:sldIdLst>
     <p:sldId id="256" r:id="rId2"/>
@@ -15,15 +15,18 @@
     <p:sldId id="259" r:id="rId6"/>
     <p:sldId id="261" r:id="rId7"/>
     <p:sldId id="260" r:id="rId8"/>
-    <p:sldId id="262" r:id="rId9"/>
-    <p:sldId id="269" r:id="rId10"/>
-    <p:sldId id="270" r:id="rId11"/>
-    <p:sldId id="263" r:id="rId12"/>
-    <p:sldId id="271" r:id="rId13"/>
-    <p:sldId id="264" r:id="rId14"/>
-    <p:sldId id="267" r:id="rId15"/>
-    <p:sldId id="265" r:id="rId16"/>
-    <p:sldId id="257" r:id="rId17"/>
+    <p:sldId id="269" r:id="rId9"/>
+    <p:sldId id="270" r:id="rId10"/>
+    <p:sldId id="272" r:id="rId11"/>
+    <p:sldId id="273" r:id="rId12"/>
+    <p:sldId id="274" r:id="rId13"/>
+    <p:sldId id="275" r:id="rId14"/>
+    <p:sldId id="263" r:id="rId15"/>
+    <p:sldId id="271" r:id="rId16"/>
+    <p:sldId id="264" r:id="rId17"/>
+    <p:sldId id="267" r:id="rId18"/>
+    <p:sldId id="265" r:id="rId19"/>
+    <p:sldId id="257" r:id="rId20"/>
   </p:sldIdLst>
   <p:sldSz cx="12192000" cy="6858000"/>
   <p:notesSz cx="6858000" cy="9144000"/>
@@ -241,7 +244,7 @@
           <a:p>
             <a:fld id="{FA31796C-C60B-4B93-A308-B9C0DF3CF43B}" type="datetimeFigureOut">
               <a:rPr lang="en-GB" smtClean="0"/>
-              <a:t>23/09/2024</a:t>
+              <a:t>25/09/2024</a:t>
             </a:fld>
             <a:endParaRPr lang="en-GB"/>
           </a:p>
@@ -666,7 +669,7 @@
           <a:p>
             <a:fld id="{F2A3CE22-8D3D-4252-8E02-370EBFAE3DD0}" type="slidenum">
               <a:rPr lang="en-GB" smtClean="0"/>
-              <a:t>13</a:t>
+              <a:t>16</a:t>
             </a:fld>
             <a:endParaRPr lang="en-GB"/>
           </a:p>
@@ -758,7 +761,7 @@
           <a:p>
             <a:fld id="{F2A3CE22-8D3D-4252-8E02-370EBFAE3DD0}" type="slidenum">
               <a:rPr lang="en-GB" smtClean="0"/>
-              <a:t>14</a:t>
+              <a:t>17</a:t>
             </a:fld>
             <a:endParaRPr lang="en-GB"/>
           </a:p>
@@ -850,7 +853,7 @@
           <a:p>
             <a:fld id="{F2A3CE22-8D3D-4252-8E02-370EBFAE3DD0}" type="slidenum">
               <a:rPr lang="en-GB" smtClean="0"/>
-              <a:t>15</a:t>
+              <a:t>18</a:t>
             </a:fld>
             <a:endParaRPr lang="en-GB"/>
           </a:p>
@@ -2260,98 +2263,6 @@
   <p:cSld>
     <p:spTree>
       <p:nvGrpSpPr>
-        <p:cNvPr id="1" name=""/>
-        <p:cNvGrpSpPr/>
-        <p:nvPr/>
-      </p:nvGrpSpPr>
-      <p:grpSpPr>
-        <a:xfrm>
-          <a:off x="0" y="0"/>
-          <a:ext cx="0" cy="0"/>
-          <a:chOff x="0" y="0"/>
-          <a:chExt cx="0" cy="0"/>
-        </a:xfrm>
-      </p:grpSpPr>
-      <p:sp>
-        <p:nvSpPr>
-          <p:cNvPr id="2" name="Slide Image Placeholder 1"/>
-          <p:cNvSpPr>
-            <a:spLocks noGrp="1" noRot="1" noChangeAspect="1"/>
-          </p:cNvSpPr>
-          <p:nvPr>
-            <p:ph type="sldImg"/>
-          </p:nvPr>
-        </p:nvSpPr>
-        <p:spPr/>
-      </p:sp>
-      <p:sp>
-        <p:nvSpPr>
-          <p:cNvPr id="3" name="Notes Placeholder 2"/>
-          <p:cNvSpPr>
-            <a:spLocks noGrp="1"/>
-          </p:cNvSpPr>
-          <p:nvPr>
-            <p:ph type="body" idx="1"/>
-          </p:nvPr>
-        </p:nvSpPr>
-        <p:spPr/>
-        <p:txBody>
-          <a:bodyPr/>
-          <a:lstStyle/>
-          <a:p>
-            <a:pPr rtl="0">
-              <a:spcBef>
-                <a:spcPts val="0"/>
-              </a:spcBef>
-              <a:spcAft>
-                <a:spcPts val="800"/>
-              </a:spcAft>
-            </a:pPr>
-            <a:endParaRPr lang="en-GB" dirty="0"/>
-          </a:p>
-        </p:txBody>
-      </p:sp>
-      <p:sp>
-        <p:nvSpPr>
-          <p:cNvPr id="4" name="Slide Number Placeholder 3"/>
-          <p:cNvSpPr>
-            <a:spLocks noGrp="1"/>
-          </p:cNvSpPr>
-          <p:nvPr>
-            <p:ph type="sldNum" sz="quarter" idx="5"/>
-          </p:nvPr>
-        </p:nvSpPr>
-        <p:spPr/>
-        <p:txBody>
-          <a:bodyPr/>
-          <a:lstStyle/>
-          <a:p>
-            <a:fld id="{F2A3CE22-8D3D-4252-8E02-370EBFAE3DD0}" type="slidenum">
-              <a:rPr lang="en-GB" smtClean="0"/>
-              <a:t>8</a:t>
-            </a:fld>
-            <a:endParaRPr lang="en-GB"/>
-          </a:p>
-        </p:txBody>
-      </p:sp>
-    </p:spTree>
-    <p:extLst>
-      <p:ext uri="{BB962C8B-B14F-4D97-AF65-F5344CB8AC3E}">
-        <p14:creationId xmlns:p14="http://schemas.microsoft.com/office/powerpoint/2010/main" val="3425697119"/>
-      </p:ext>
-    </p:extLst>
-  </p:cSld>
-  <p:clrMapOvr>
-    <a:masterClrMapping/>
-  </p:clrMapOvr>
-</p:notes>
-</file>
-
-<file path=ppt/notesSlides/notesSlide6.xml><?xml version="1.0" encoding="utf-8"?>
-<p:notes xmlns:a="http://schemas.openxmlformats.org/drawingml/2006/main" xmlns:r="http://schemas.openxmlformats.org/officeDocument/2006/relationships" xmlns:p="http://schemas.openxmlformats.org/presentationml/2006/main">
-  <p:cSld>
-    <p:spTree>
-      <p:nvGrpSpPr>
         <p:cNvPr id="1" name="">
           <a:extLst>
             <a:ext uri="{FF2B5EF4-FFF2-40B4-BE49-F238E27FC236}">
@@ -2444,7 +2355,7 @@
           <a:p>
             <a:fld id="{F2A3CE22-8D3D-4252-8E02-370EBFAE3DD0}" type="slidenum">
               <a:rPr lang="en-GB" smtClean="0"/>
-              <a:t>9</a:t>
+              <a:t>8</a:t>
             </a:fld>
             <a:endParaRPr lang="en-GB"/>
           </a:p>
@@ -2463,7 +2374,7 @@
 </p:notes>
 </file>
 
-<file path=ppt/notesSlides/notesSlide7.xml><?xml version="1.0" encoding="utf-8"?>
+<file path=ppt/notesSlides/notesSlide6.xml><?xml version="1.0" encoding="utf-8"?>
 <p:notes xmlns:a="http://schemas.openxmlformats.org/drawingml/2006/main" xmlns:r="http://schemas.openxmlformats.org/officeDocument/2006/relationships" xmlns:p="http://schemas.openxmlformats.org/presentationml/2006/main">
   <p:cSld>
     <p:spTree>
@@ -2560,7 +2471,7 @@
           <a:p>
             <a:fld id="{F2A3CE22-8D3D-4252-8E02-370EBFAE3DD0}" type="slidenum">
               <a:rPr lang="en-GB" smtClean="0"/>
-              <a:t>10</a:t>
+              <a:t>9</a:t>
             </a:fld>
             <a:endParaRPr lang="en-GB"/>
           </a:p>
@@ -2570,6 +2481,90 @@
     <p:extLst>
       <p:ext uri="{BB962C8B-B14F-4D97-AF65-F5344CB8AC3E}">
         <p14:creationId xmlns:p14="http://schemas.microsoft.com/office/powerpoint/2010/main" val="1901058048"/>
+      </p:ext>
+    </p:extLst>
+  </p:cSld>
+  <p:clrMapOvr>
+    <a:masterClrMapping/>
+  </p:clrMapOvr>
+</p:notes>
+</file>
+
+<file path=ppt/notesSlides/notesSlide7.xml><?xml version="1.0" encoding="utf-8"?>
+<p:notes xmlns:a="http://schemas.openxmlformats.org/drawingml/2006/main" xmlns:r="http://schemas.openxmlformats.org/officeDocument/2006/relationships" xmlns:p="http://schemas.openxmlformats.org/presentationml/2006/main">
+  <p:cSld>
+    <p:spTree>
+      <p:nvGrpSpPr>
+        <p:cNvPr id="1" name=""/>
+        <p:cNvGrpSpPr/>
+        <p:nvPr/>
+      </p:nvGrpSpPr>
+      <p:grpSpPr>
+        <a:xfrm>
+          <a:off x="0" y="0"/>
+          <a:ext cx="0" cy="0"/>
+          <a:chOff x="0" y="0"/>
+          <a:chExt cx="0" cy="0"/>
+        </a:xfrm>
+      </p:grpSpPr>
+      <p:sp>
+        <p:nvSpPr>
+          <p:cNvPr id="2" name="Slide Image Placeholder 1"/>
+          <p:cNvSpPr>
+            <a:spLocks noGrp="1" noRot="1" noChangeAspect="1"/>
+          </p:cNvSpPr>
+          <p:nvPr>
+            <p:ph type="sldImg"/>
+          </p:nvPr>
+        </p:nvSpPr>
+        <p:spPr/>
+      </p:sp>
+      <p:sp>
+        <p:nvSpPr>
+          <p:cNvPr id="3" name="Notes Placeholder 2"/>
+          <p:cNvSpPr>
+            <a:spLocks noGrp="1"/>
+          </p:cNvSpPr>
+          <p:nvPr>
+            <p:ph type="body" idx="1"/>
+          </p:nvPr>
+        </p:nvSpPr>
+        <p:spPr/>
+        <p:txBody>
+          <a:bodyPr/>
+          <a:lstStyle/>
+          <a:p>
+            <a:endParaRPr lang="en-US" dirty="0"/>
+          </a:p>
+        </p:txBody>
+      </p:sp>
+      <p:sp>
+        <p:nvSpPr>
+          <p:cNvPr id="4" name="Slide Number Placeholder 3"/>
+          <p:cNvSpPr>
+            <a:spLocks noGrp="1"/>
+          </p:cNvSpPr>
+          <p:nvPr>
+            <p:ph type="sldNum" sz="quarter" idx="5"/>
+          </p:nvPr>
+        </p:nvSpPr>
+        <p:spPr/>
+        <p:txBody>
+          <a:bodyPr/>
+          <a:lstStyle/>
+          <a:p>
+            <a:fld id="{F2A3CE22-8D3D-4252-8E02-370EBFAE3DD0}" type="slidenum">
+              <a:rPr lang="en-GB" smtClean="0"/>
+              <a:t>11</a:t>
+            </a:fld>
+            <a:endParaRPr lang="en-GB"/>
+          </a:p>
+        </p:txBody>
+      </p:sp>
+    </p:spTree>
+    <p:extLst>
+      <p:ext uri="{BB962C8B-B14F-4D97-AF65-F5344CB8AC3E}">
+        <p14:creationId xmlns:p14="http://schemas.microsoft.com/office/powerpoint/2010/main" val="2736651633"/>
       </p:ext>
     </p:extLst>
   </p:cSld>
@@ -2652,7 +2647,7 @@
           <a:p>
             <a:fld id="{F2A3CE22-8D3D-4252-8E02-370EBFAE3DD0}" type="slidenum">
               <a:rPr lang="en-GB" smtClean="0"/>
-              <a:t>11</a:t>
+              <a:t>14</a:t>
             </a:fld>
             <a:endParaRPr lang="en-GB"/>
           </a:p>
@@ -2768,7 +2763,7 @@
           <a:p>
             <a:fld id="{F2A3CE22-8D3D-4252-8E02-370EBFAE3DD0}" type="slidenum">
               <a:rPr lang="en-GB" smtClean="0"/>
-              <a:t>12</a:t>
+              <a:t>15</a:t>
             </a:fld>
             <a:endParaRPr lang="en-GB"/>
           </a:p>
@@ -2936,7 +2931,7 @@
           <a:p>
             <a:fld id="{376A689A-ECC5-4A76-B621-CD95EE49D403}" type="datetimeFigureOut">
               <a:rPr lang="en-GB" smtClean="0"/>
-              <a:t>23/09/2024</a:t>
+              <a:t>25/09/2024</a:t>
             </a:fld>
             <a:endParaRPr lang="en-GB"/>
           </a:p>
@@ -3136,7 +3131,7 @@
           <a:p>
             <a:fld id="{376A689A-ECC5-4A76-B621-CD95EE49D403}" type="datetimeFigureOut">
               <a:rPr lang="en-GB" smtClean="0"/>
-              <a:t>23/09/2024</a:t>
+              <a:t>25/09/2024</a:t>
             </a:fld>
             <a:endParaRPr lang="en-GB"/>
           </a:p>
@@ -3346,7 +3341,7 @@
           <a:p>
             <a:fld id="{376A689A-ECC5-4A76-B621-CD95EE49D403}" type="datetimeFigureOut">
               <a:rPr lang="en-GB" smtClean="0"/>
-              <a:t>23/09/2024</a:t>
+              <a:t>25/09/2024</a:t>
             </a:fld>
             <a:endParaRPr lang="en-GB"/>
           </a:p>
@@ -3546,7 +3541,7 @@
           <a:p>
             <a:fld id="{376A689A-ECC5-4A76-B621-CD95EE49D403}" type="datetimeFigureOut">
               <a:rPr lang="en-GB" smtClean="0"/>
-              <a:t>23/09/2024</a:t>
+              <a:t>25/09/2024</a:t>
             </a:fld>
             <a:endParaRPr lang="en-GB"/>
           </a:p>
@@ -3822,7 +3817,7 @@
           <a:p>
             <a:fld id="{376A689A-ECC5-4A76-B621-CD95EE49D403}" type="datetimeFigureOut">
               <a:rPr lang="en-GB" smtClean="0"/>
-              <a:t>23/09/2024</a:t>
+              <a:t>25/09/2024</a:t>
             </a:fld>
             <a:endParaRPr lang="en-GB"/>
           </a:p>
@@ -4090,7 +4085,7 @@
           <a:p>
             <a:fld id="{376A689A-ECC5-4A76-B621-CD95EE49D403}" type="datetimeFigureOut">
               <a:rPr lang="en-GB" smtClean="0"/>
-              <a:t>23/09/2024</a:t>
+              <a:t>25/09/2024</a:t>
             </a:fld>
             <a:endParaRPr lang="en-GB"/>
           </a:p>
@@ -4505,7 +4500,7 @@
           <a:p>
             <a:fld id="{376A689A-ECC5-4A76-B621-CD95EE49D403}" type="datetimeFigureOut">
               <a:rPr lang="en-GB" smtClean="0"/>
-              <a:t>23/09/2024</a:t>
+              <a:t>25/09/2024</a:t>
             </a:fld>
             <a:endParaRPr lang="en-GB"/>
           </a:p>
@@ -4647,7 +4642,7 @@
           <a:p>
             <a:fld id="{376A689A-ECC5-4A76-B621-CD95EE49D403}" type="datetimeFigureOut">
               <a:rPr lang="en-GB" smtClean="0"/>
-              <a:t>23/09/2024</a:t>
+              <a:t>25/09/2024</a:t>
             </a:fld>
             <a:endParaRPr lang="en-GB"/>
           </a:p>
@@ -4760,7 +4755,7 @@
           <a:p>
             <a:fld id="{376A689A-ECC5-4A76-B621-CD95EE49D403}" type="datetimeFigureOut">
               <a:rPr lang="en-GB" smtClean="0"/>
-              <a:t>23/09/2024</a:t>
+              <a:t>25/09/2024</a:t>
             </a:fld>
             <a:endParaRPr lang="en-GB"/>
           </a:p>
@@ -5073,7 +5068,7 @@
           <a:p>
             <a:fld id="{376A689A-ECC5-4A76-B621-CD95EE49D403}" type="datetimeFigureOut">
               <a:rPr lang="en-GB" smtClean="0"/>
-              <a:t>23/09/2024</a:t>
+              <a:t>25/09/2024</a:t>
             </a:fld>
             <a:endParaRPr lang="en-GB"/>
           </a:p>
@@ -5362,7 +5357,7 @@
           <a:p>
             <a:fld id="{376A689A-ECC5-4A76-B621-CD95EE49D403}" type="datetimeFigureOut">
               <a:rPr lang="en-GB" smtClean="0"/>
-              <a:t>23/09/2024</a:t>
+              <a:t>25/09/2024</a:t>
             </a:fld>
             <a:endParaRPr lang="en-GB"/>
           </a:p>
@@ -5605,7 +5600,7 @@
           <a:p>
             <a:fld id="{376A689A-ECC5-4A76-B621-CD95EE49D403}" type="datetimeFigureOut">
               <a:rPr lang="en-GB" smtClean="0"/>
-              <a:t>23/09/2024</a:t>
+              <a:t>25/09/2024</a:t>
             </a:fld>
             <a:endParaRPr lang="en-GB"/>
           </a:p>
@@ -6530,170 +6525,14 @@
 <file path=ppt/slides/slide10.xml><?xml version="1.0" encoding="utf-8"?>
 <p:sld xmlns:a="http://schemas.openxmlformats.org/drawingml/2006/main" xmlns:r="http://schemas.openxmlformats.org/officeDocument/2006/relationships" xmlns:p="http://schemas.openxmlformats.org/presentationml/2006/main">
   <p:cSld>
-    <p:spTree>
-      <p:nvGrpSpPr>
-        <p:cNvPr id="1" name="">
-          <a:extLst>
-            <a:ext uri="{FF2B5EF4-FFF2-40B4-BE49-F238E27FC236}">
-              <a16:creationId xmlns:a16="http://schemas.microsoft.com/office/drawing/2014/main" id="{E1DA1596-C954-9883-C7FA-6CA2D5B4B003}"/>
-            </a:ext>
-          </a:extLst>
-        </p:cNvPr>
-        <p:cNvGrpSpPr/>
-        <p:nvPr/>
-      </p:nvGrpSpPr>
-      <p:grpSpPr>
-        <a:xfrm>
-          <a:off x="0" y="0"/>
-          <a:ext cx="0" cy="0"/>
-          <a:chOff x="0" y="0"/>
-          <a:chExt cx="0" cy="0"/>
-        </a:xfrm>
-      </p:grpSpPr>
-      <p:sp>
-        <p:nvSpPr>
-          <p:cNvPr id="2" name="Title 1">
-            <a:extLst>
-              <a:ext uri="{FF2B5EF4-FFF2-40B4-BE49-F238E27FC236}">
-                <a16:creationId xmlns:a16="http://schemas.microsoft.com/office/drawing/2014/main" id="{55DC88A7-8B45-7E8B-3C34-1DA9CD1DBAF0}"/>
-              </a:ext>
-            </a:extLst>
-          </p:cNvPr>
-          <p:cNvSpPr>
-            <a:spLocks noGrp="1"/>
-          </p:cNvSpPr>
-          <p:nvPr>
-            <p:ph type="title"/>
-          </p:nvPr>
-        </p:nvSpPr>
-        <p:spPr/>
-        <p:txBody>
-          <a:bodyPr/>
-          <a:lstStyle/>
-          <a:p>
-            <a:r>
-              <a:rPr lang="en-GB" dirty="0"/>
-              <a:t>Methods</a:t>
-            </a:r>
-          </a:p>
-        </p:txBody>
-      </p:sp>
-      <p:sp>
-        <p:nvSpPr>
-          <p:cNvPr id="3" name="Content Placeholder 2">
-            <a:extLst>
-              <a:ext uri="{FF2B5EF4-FFF2-40B4-BE49-F238E27FC236}">
-                <a16:creationId xmlns:a16="http://schemas.microsoft.com/office/drawing/2014/main" id="{DF35B0C2-FFEE-65A0-B108-03C72D8B5446}"/>
-              </a:ext>
-            </a:extLst>
-          </p:cNvPr>
-          <p:cNvSpPr>
-            <a:spLocks noGrp="1"/>
-          </p:cNvSpPr>
-          <p:nvPr>
-            <p:ph sz="half" idx="1"/>
-          </p:nvPr>
-        </p:nvSpPr>
-        <p:spPr/>
-        <p:txBody>
-          <a:bodyPr>
-            <a:normAutofit fontScale="92500" lnSpcReduction="20000"/>
-          </a:bodyPr>
-          <a:lstStyle/>
-          <a:p>
-            <a:r>
-              <a:rPr lang="en-US" dirty="0"/>
-              <a:t>Tested question-answering with LLMs</a:t>
-            </a:r>
-          </a:p>
-          <a:p>
-            <a:r>
-              <a:rPr lang="en-US" dirty="0"/>
-              <a:t>Compared vocabulary sizes for each class (0 and 1)</a:t>
-            </a:r>
-          </a:p>
-          <a:p>
-            <a:r>
-              <a:rPr lang="en-US" dirty="0"/>
-              <a:t>Analyzed n-grams and TF-IDF conversion</a:t>
-            </a:r>
-          </a:p>
-          <a:p>
-            <a:r>
-              <a:rPr lang="en-US" dirty="0"/>
-              <a:t>Ran logistic lasso regression to identify predictive words</a:t>
-            </a:r>
-          </a:p>
-          <a:p>
-            <a:pPr lvl="1"/>
-            <a:r>
-              <a:rPr lang="en-US" dirty="0"/>
-              <a:t>Extracted feature names and coefficients</a:t>
-            </a:r>
-          </a:p>
-          <a:p>
-            <a:pPr lvl="1"/>
-            <a:r>
-              <a:rPr lang="en-US" dirty="0"/>
-              <a:t>Plotted model coefficients</a:t>
-            </a:r>
-          </a:p>
-          <a:p>
-            <a:pPr lvl="1"/>
-            <a:r>
-              <a:rPr lang="en-US" dirty="0"/>
-              <a:t>Applied SHAP for model interpretation</a:t>
-            </a:r>
-            <a:endParaRPr lang="en-GB" dirty="0"/>
-          </a:p>
-        </p:txBody>
-      </p:sp>
-      <p:sp>
-        <p:nvSpPr>
-          <p:cNvPr id="4" name="Content Placeholder 3">
-            <a:extLst>
-              <a:ext uri="{FF2B5EF4-FFF2-40B4-BE49-F238E27FC236}">
-                <a16:creationId xmlns:a16="http://schemas.microsoft.com/office/drawing/2014/main" id="{01CAE330-7559-FEB7-3B3C-4601AE515B11}"/>
-              </a:ext>
-            </a:extLst>
-          </p:cNvPr>
-          <p:cNvSpPr>
-            <a:spLocks noGrp="1"/>
-          </p:cNvSpPr>
-          <p:nvPr>
-            <p:ph sz="half" idx="2"/>
-          </p:nvPr>
-        </p:nvSpPr>
-        <p:spPr/>
-        <p:txBody>
-          <a:bodyPr>
-            <a:normAutofit fontScale="92500" lnSpcReduction="20000"/>
-          </a:bodyPr>
-          <a:lstStyle/>
-          <a:p>
-            <a:r>
-              <a:rPr lang="en-GB" dirty="0"/>
-              <a:t>Pics / diagrams</a:t>
-            </a:r>
-          </a:p>
-        </p:txBody>
-      </p:sp>
-    </p:spTree>
-    <p:extLst>
-      <p:ext uri="{BB962C8B-B14F-4D97-AF65-F5344CB8AC3E}">
-        <p14:creationId xmlns:p14="http://schemas.microsoft.com/office/powerpoint/2010/main" val="428903400"/>
-      </p:ext>
-    </p:extLst>
-  </p:cSld>
-  <p:clrMapOvr>
-    <a:masterClrMapping/>
-  </p:clrMapOvr>
-</p:sld>
-</file>
-
-<file path=ppt/slides/slide11.xml><?xml version="1.0" encoding="utf-8"?>
-<p:sld xmlns:a="http://schemas.openxmlformats.org/drawingml/2006/main" xmlns:r="http://schemas.openxmlformats.org/officeDocument/2006/relationships" xmlns:p="http://schemas.openxmlformats.org/presentationml/2006/main">
-  <p:cSld>
+    <p:bg>
+      <p:bgPr>
+        <a:solidFill>
+          <a:schemeClr val="bg1"/>
+        </a:solidFill>
+        <a:effectLst/>
+      </p:bgPr>
+    </p:bg>
     <p:spTree>
       <p:nvGrpSpPr>
         <p:cNvPr id="1" name=""/>
@@ -6708,12 +6547,72 @@
           <a:chExt cx="0" cy="0"/>
         </a:xfrm>
       </p:grpSpPr>
+      <p:sp useBgFill="1">
+        <p:nvSpPr>
+          <p:cNvPr id="2066" name="Rectangle 2065">
+            <a:extLst>
+              <a:ext uri="{FF2B5EF4-FFF2-40B4-BE49-F238E27FC236}">
+                <a16:creationId xmlns:a16="http://schemas.microsoft.com/office/drawing/2014/main" id="{5EBC18B6-E5C3-4AD1-97A4-E6A3477A0BB9}"/>
+              </a:ext>
+              <a:ext uri="{C183D7F6-B498-43B3-948B-1728B52AA6E4}">
+                <adec:decorative xmlns:adec="http://schemas.microsoft.com/office/drawing/2017/decorative" val="1"/>
+              </a:ext>
+            </a:extLst>
+          </p:cNvPr>
+          <p:cNvSpPr>
+            <a:spLocks noGrp="1" noRot="1" noChangeAspect="1" noMove="1" noResize="1" noEditPoints="1" noAdjustHandles="1" noChangeArrowheads="1" noChangeShapeType="1" noTextEdit="1"/>
+          </p:cNvSpPr>
+          <p:nvPr>
+            <p:extLst>
+              <p:ext uri="{386F3935-93C4-4BCD-93E2-E3B085C9AB24}">
+                <p16:designElem xmlns:p16="http://schemas.microsoft.com/office/powerpoint/2015/main" val="1"/>
+              </p:ext>
+            </p:extLst>
+          </p:nvPr>
+        </p:nvSpPr>
+        <p:spPr>
+          <a:xfrm>
+            <a:off x="0" y="0"/>
+            <a:ext cx="12192000" cy="6858000"/>
+          </a:xfrm>
+          <a:prstGeom prst="rect">
+            <a:avLst/>
+          </a:prstGeom>
+          <a:ln>
+            <a:noFill/>
+          </a:ln>
+        </p:spPr>
+        <p:style>
+          <a:lnRef idx="2">
+            <a:schemeClr val="accent1">
+              <a:shade val="50000"/>
+            </a:schemeClr>
+          </a:lnRef>
+          <a:fillRef idx="1">
+            <a:schemeClr val="accent1"/>
+          </a:fillRef>
+          <a:effectRef idx="0">
+            <a:schemeClr val="accent1"/>
+          </a:effectRef>
+          <a:fontRef idx="minor">
+            <a:schemeClr val="lt1"/>
+          </a:fontRef>
+        </p:style>
+        <p:txBody>
+          <a:bodyPr rtlCol="0" anchor="ctr"/>
+          <a:lstStyle/>
+          <a:p>
+            <a:pPr algn="ctr"/>
+            <a:endParaRPr lang="en-US"/>
+          </a:p>
+        </p:txBody>
+      </p:sp>
       <p:sp>
         <p:nvSpPr>
           <p:cNvPr id="2" name="Title 1">
             <a:extLst>
               <a:ext uri="{FF2B5EF4-FFF2-40B4-BE49-F238E27FC236}">
-                <a16:creationId xmlns:a16="http://schemas.microsoft.com/office/drawing/2014/main" id="{355A15E5-8BCB-9CDA-A766-382FABDFE98F}"/>
+                <a16:creationId xmlns:a16="http://schemas.microsoft.com/office/drawing/2014/main" id="{C7C6B695-668B-7E73-82B2-97E2C2667E00}"/>
               </a:ext>
             </a:extLst>
           </p:cNvPr>
@@ -6724,15 +6623,259 @@
             <p:ph type="title"/>
           </p:nvPr>
         </p:nvSpPr>
-        <p:spPr/>
-        <p:txBody>
-          <a:bodyPr/>
-          <a:lstStyle/>
-          <a:p>
-            <a:r>
-              <a:rPr lang="en-GB" dirty="0"/>
-              <a:t>Results</a:t>
-            </a:r>
+        <p:spPr>
+          <a:xfrm>
+            <a:off x="612648" y="1078992"/>
+            <a:ext cx="6272784" cy="1545336"/>
+          </a:xfrm>
+        </p:spPr>
+        <p:txBody>
+          <a:bodyPr vert="horz" lIns="91440" tIns="45720" rIns="91440" bIns="45720" rtlCol="0" anchor="b">
+            <a:normAutofit/>
+          </a:bodyPr>
+          <a:lstStyle/>
+          <a:p>
+            <a:r>
+              <a:rPr lang="en-US" sz="5200" kern="1200">
+                <a:solidFill>
+                  <a:schemeClr val="tx1"/>
+                </a:solidFill>
+                <a:latin typeface="+mj-lt"/>
+                <a:ea typeface="+mj-ea"/>
+                <a:cs typeface="+mj-cs"/>
+              </a:rPr>
+              <a:t>Question Answering</a:t>
+            </a:r>
+          </a:p>
+        </p:txBody>
+      </p:sp>
+      <p:sp>
+        <p:nvSpPr>
+          <p:cNvPr id="2068" name="Rectangle 2067">
+            <a:extLst>
+              <a:ext uri="{FF2B5EF4-FFF2-40B4-BE49-F238E27FC236}">
+                <a16:creationId xmlns:a16="http://schemas.microsoft.com/office/drawing/2014/main" id="{136A4AB6-B72B-4CC6-ADCF-BE807B6C3D71}"/>
+              </a:ext>
+              <a:ext uri="{C183D7F6-B498-43B3-948B-1728B52AA6E4}">
+                <adec:decorative xmlns:adec="http://schemas.microsoft.com/office/drawing/2017/decorative" val="1"/>
+              </a:ext>
+            </a:extLst>
+          </p:cNvPr>
+          <p:cNvSpPr>
+            <a:spLocks noGrp="1" noRot="1" noChangeAspect="1" noMove="1" noResize="1" noEditPoints="1" noAdjustHandles="1" noChangeArrowheads="1" noChangeShapeType="1" noTextEdit="1"/>
+          </p:cNvSpPr>
+          <p:nvPr>
+            <p:extLst>
+              <p:ext uri="{386F3935-93C4-4BCD-93E2-E3B085C9AB24}">
+                <p16:designElem xmlns:p16="http://schemas.microsoft.com/office/powerpoint/2015/main" val="1"/>
+              </p:ext>
+            </p:extLst>
+          </p:nvPr>
+        </p:nvSpPr>
+        <p:spPr>
+          <a:xfrm rot="5400000">
+            <a:off x="850392" y="363389"/>
+            <a:ext cx="73152" cy="548640"/>
+          </a:xfrm>
+          <a:prstGeom prst="rect">
+            <a:avLst/>
+          </a:prstGeom>
+          <a:solidFill>
+            <a:schemeClr val="accent2"/>
+          </a:solidFill>
+          <a:ln>
+            <a:noFill/>
+          </a:ln>
+        </p:spPr>
+        <p:style>
+          <a:lnRef idx="2">
+            <a:schemeClr val="accent1">
+              <a:shade val="50000"/>
+            </a:schemeClr>
+          </a:lnRef>
+          <a:fillRef idx="1">
+            <a:schemeClr val="accent1"/>
+          </a:fillRef>
+          <a:effectRef idx="0">
+            <a:schemeClr val="accent1"/>
+          </a:effectRef>
+          <a:fontRef idx="minor">
+            <a:schemeClr val="lt1"/>
+          </a:fontRef>
+        </p:style>
+        <p:txBody>
+          <a:bodyPr rtlCol="0" anchor="ctr"/>
+          <a:lstStyle/>
+          <a:p>
+            <a:pPr marL="0" marR="0" lvl="0" indent="0" algn="ctr" defTabSz="914400" rtl="0" eaLnBrk="1" fontAlgn="auto" latinLnBrk="0" hangingPunct="1">
+              <a:lnSpc>
+                <a:spcPct val="100000"/>
+              </a:lnSpc>
+              <a:spcBef>
+                <a:spcPts val="0"/>
+              </a:spcBef>
+              <a:spcAft>
+                <a:spcPts val="0"/>
+              </a:spcAft>
+              <a:buClrTx/>
+              <a:buSzTx/>
+              <a:buFontTx/>
+              <a:buNone/>
+              <a:tabLst/>
+              <a:defRPr/>
+            </a:pPr>
+            <a:endParaRPr kumimoji="0" lang="en-US" sz="1800" b="0" i="0" u="none" strike="noStrike" kern="1200" cap="none" spc="0" normalizeH="0" baseline="0" noProof="0">
+              <a:ln>
+                <a:noFill/>
+              </a:ln>
+              <a:solidFill>
+                <a:prstClr val="white"/>
+              </a:solidFill>
+              <a:effectLst/>
+              <a:uLnTx/>
+              <a:uFillTx/>
+              <a:latin typeface="Calibri" panose="020F0502020204030204"/>
+              <a:ea typeface="+mn-ea"/>
+              <a:cs typeface="+mn-cs"/>
+            </a:endParaRPr>
+          </a:p>
+        </p:txBody>
+      </p:sp>
+      <p:pic>
+        <p:nvPicPr>
+          <p:cNvPr id="2054" name="Picture 6" descr="What is BERT? How it is trained ? A High Level Overview">
+            <a:extLst>
+              <a:ext uri="{FF2B5EF4-FFF2-40B4-BE49-F238E27FC236}">
+                <a16:creationId xmlns:a16="http://schemas.microsoft.com/office/drawing/2014/main" id="{F10E9C5F-65C2-F5A3-4318-CB712EA3A305}"/>
+              </a:ext>
+            </a:extLst>
+          </p:cNvPr>
+          <p:cNvPicPr>
+            <a:picLocks noChangeAspect="1" noChangeArrowheads="1"/>
+          </p:cNvPicPr>
+          <p:nvPr/>
+        </p:nvPicPr>
+        <p:blipFill>
+          <a:blip r:embed="rId2">
+            <a:extLst>
+              <a:ext uri="{28A0092B-C50C-407E-A947-70E740481C1C}">
+                <a14:useLocalDpi xmlns:a14="http://schemas.microsoft.com/office/drawing/2010/main" val="0"/>
+              </a:ext>
+            </a:extLst>
+          </a:blip>
+          <a:srcRect t="4889"/>
+          <a:stretch/>
+        </p:blipFill>
+        <p:spPr bwMode="auto">
+          <a:xfrm>
+            <a:off x="7684008" y="1"/>
+            <a:ext cx="4507992" cy="2240280"/>
+          </a:xfrm>
+          <a:prstGeom prst="rect">
+            <a:avLst/>
+          </a:prstGeom>
+          <a:noFill/>
+          <a:extLst>
+            <a:ext uri="{909E8E84-426E-40DD-AFC4-6F175D3DCCD1}">
+              <a14:hiddenFill xmlns:a14="http://schemas.microsoft.com/office/drawing/2010/main">
+                <a:solidFill>
+                  <a:srgbClr val="FFFFFF"/>
+                </a:solidFill>
+              </a14:hiddenFill>
+            </a:ext>
+          </a:extLst>
+        </p:spPr>
+      </p:pic>
+      <p:sp>
+        <p:nvSpPr>
+          <p:cNvPr id="2070" name="Rectangle 2069">
+            <a:extLst>
+              <a:ext uri="{FF2B5EF4-FFF2-40B4-BE49-F238E27FC236}">
+                <a16:creationId xmlns:a16="http://schemas.microsoft.com/office/drawing/2014/main" id="{B35D540D-9486-4236-952A-F72DC52D79BF}"/>
+              </a:ext>
+              <a:ext uri="{C183D7F6-B498-43B3-948B-1728B52AA6E4}">
+                <adec:decorative xmlns:adec="http://schemas.microsoft.com/office/drawing/2017/decorative" val="1"/>
+              </a:ext>
+            </a:extLst>
+          </p:cNvPr>
+          <p:cNvSpPr>
+            <a:spLocks noGrp="1" noRot="1" noChangeAspect="1" noMove="1" noResize="1" noEditPoints="1" noAdjustHandles="1" noChangeArrowheads="1" noChangeShapeType="1" noTextEdit="1"/>
+          </p:cNvSpPr>
+          <p:nvPr>
+            <p:extLst>
+              <p:ext uri="{386F3935-93C4-4BCD-93E2-E3B085C9AB24}">
+                <p16:designElem xmlns:p16="http://schemas.microsoft.com/office/powerpoint/2015/main" val="1"/>
+              </p:ext>
+            </p:extLst>
+          </p:nvPr>
+        </p:nvSpPr>
+        <p:spPr>
+          <a:xfrm>
+            <a:off x="621792" y="2935541"/>
+            <a:ext cx="6217920" cy="18288"/>
+          </a:xfrm>
+          <a:prstGeom prst="rect">
+            <a:avLst/>
+          </a:prstGeom>
+          <a:solidFill>
+            <a:srgbClr val="D5D5D5"/>
+          </a:solidFill>
+          <a:ln w="3175">
+            <a:noFill/>
+          </a:ln>
+          <a:effectLst/>
+        </p:spPr>
+        <p:style>
+          <a:lnRef idx="2">
+            <a:schemeClr val="accent1">
+              <a:shade val="50000"/>
+            </a:schemeClr>
+          </a:lnRef>
+          <a:fillRef idx="1">
+            <a:schemeClr val="accent1"/>
+          </a:fillRef>
+          <a:effectRef idx="0">
+            <a:schemeClr val="accent1"/>
+          </a:effectRef>
+          <a:fontRef idx="minor">
+            <a:schemeClr val="lt1"/>
+          </a:fontRef>
+        </p:style>
+        <p:txBody>
+          <a:bodyPr rtlCol="0" anchor="ctr"/>
+          <a:lstStyle/>
+          <a:p>
+            <a:pPr marL="0" marR="0" lvl="0" indent="0" algn="ctr" defTabSz="914400" rtl="0" eaLnBrk="1" fontAlgn="auto" latinLnBrk="0" hangingPunct="1">
+              <a:lnSpc>
+                <a:spcPct val="100000"/>
+              </a:lnSpc>
+              <a:spcBef>
+                <a:spcPts val="0"/>
+              </a:spcBef>
+              <a:spcAft>
+                <a:spcPts val="0"/>
+              </a:spcAft>
+              <a:buClrTx/>
+              <a:buSzTx/>
+              <a:buFontTx/>
+              <a:buNone/>
+              <a:tabLst/>
+              <a:defRPr/>
+            </a:pPr>
+            <a:endParaRPr kumimoji="0" lang="en-US" sz="1800" b="0" i="0" u="none" strike="noStrike" kern="1200" cap="none" spc="0" normalizeH="0" baseline="0" noProof="0">
+              <a:ln>
+                <a:noFill/>
+              </a:ln>
+              <a:solidFill>
+                <a:prstClr val="white"/>
+              </a:solidFill>
+              <a:effectLst/>
+              <a:uLnTx/>
+              <a:uFillTx/>
+              <a:latin typeface="Calibri" panose="020F0502020204030204"/>
+              <a:ea typeface="+mn-ea"/>
+              <a:cs typeface="+mn-cs"/>
+            </a:endParaRPr>
           </a:p>
         </p:txBody>
       </p:sp>
@@ -6741,7 +6884,7 @@
           <p:cNvPr id="3" name="Content Placeholder 2">
             <a:extLst>
               <a:ext uri="{FF2B5EF4-FFF2-40B4-BE49-F238E27FC236}">
-                <a16:creationId xmlns:a16="http://schemas.microsoft.com/office/drawing/2014/main" id="{AA03AE5F-BDF5-D7CE-D99E-1D1ADC825F33}"/>
+                <a16:creationId xmlns:a16="http://schemas.microsoft.com/office/drawing/2014/main" id="{E7FF07CB-A701-4AC1-DB17-32B492F3ADE3}"/>
               </a:ext>
             </a:extLst>
           </p:cNvPr>
@@ -6752,86 +6895,128 @@
             <p:ph sz="half" idx="1"/>
           </p:nvPr>
         </p:nvSpPr>
-        <p:spPr/>
-        <p:txBody>
-          <a:bodyPr>
-            <a:normAutofit fontScale="92500" lnSpcReduction="20000"/>
+        <p:spPr>
+          <a:xfrm>
+            <a:off x="612648" y="3355848"/>
+            <a:ext cx="6272784" cy="2825496"/>
+          </a:xfrm>
+        </p:spPr>
+        <p:txBody>
+          <a:bodyPr vert="horz" lIns="91440" tIns="45720" rIns="91440" bIns="45720" rtlCol="0">
+            <a:normAutofit/>
           </a:bodyPr>
           <a:lstStyle/>
           <a:p>
             <a:r>
-              <a:rPr lang="en-US" b="0" i="0" dirty="0">
-                <a:solidFill>
-                  <a:srgbClr val="3D3929"/>
-                </a:solidFill>
-                <a:effectLst/>
-                <a:latin typeface="__styreneB_5d855b"/>
-              </a:rPr>
-              <a:t>learning curves of the classification models of different diagnoses varied significantly, despite them using the same underlying preprocessing methods and models. </a:t>
-            </a:r>
-          </a:p>
-          <a:p>
-            <a:r>
-              <a:rPr lang="en-US" dirty="0"/>
-              <a:t>Vocabulary complexity analysis inconclusive in explaining differences</a:t>
-            </a:r>
-          </a:p>
-          <a:p>
-            <a:r>
-              <a:rPr lang="en-US" b="0" i="0" dirty="0">
-                <a:solidFill>
-                  <a:srgbClr val="3D3929"/>
-                </a:solidFill>
-                <a:effectLst/>
-                <a:latin typeface="__styreneB_5d855b"/>
-              </a:rPr>
-              <a:t>Half of the modelled outcomes did not reach accuracy of 0.70 or above even with the 10,800 documents (the maximum training size in the experiments).</a:t>
-            </a:r>
-            <a:endParaRPr lang="en-GB" dirty="0"/>
-          </a:p>
-        </p:txBody>
-      </p:sp>
-      <p:sp>
-        <p:nvSpPr>
-          <p:cNvPr id="4" name="Content Placeholder 3">
-            <a:extLst>
-              <a:ext uri="{FF2B5EF4-FFF2-40B4-BE49-F238E27FC236}">
-                <a16:creationId xmlns:a16="http://schemas.microsoft.com/office/drawing/2014/main" id="{352B026B-36D8-C7F5-EF24-AB17CD257FE1}"/>
-              </a:ext>
-            </a:extLst>
-          </p:cNvPr>
-          <p:cNvSpPr>
-            <a:spLocks noGrp="1"/>
-          </p:cNvSpPr>
-          <p:nvPr>
-            <p:ph sz="half" idx="2"/>
-          </p:nvPr>
-        </p:nvSpPr>
-        <p:spPr/>
-        <p:txBody>
-          <a:bodyPr>
-            <a:normAutofit fontScale="92500" lnSpcReduction="20000"/>
-          </a:bodyPr>
-          <a:lstStyle/>
-          <a:p>
-            <a:r>
-              <a:rPr lang="en-US" dirty="0"/>
-              <a:t>Performance plateaued at sample sizes between 1,000-5,000 documents</a:t>
-            </a:r>
-          </a:p>
-          <a:p>
-            <a:r>
-              <a:rPr lang="en-US" dirty="0"/>
-              <a:t>For 10 out of 11 diagnoses, n=600 achieved 95% of performance possible with n=10,000</a:t>
-            </a:r>
-            <a:endParaRPr lang="en-GB" dirty="0"/>
-          </a:p>
-        </p:txBody>
-      </p:sp>
+              <a:rPr lang="en-US" sz="2200"/>
+              <a:t>Models used..</a:t>
+            </a:r>
+          </a:p>
+          <a:p>
+            <a:r>
+              <a:rPr lang="en-US" sz="2200"/>
+              <a:t>Example prompt…</a:t>
+            </a:r>
+          </a:p>
+          <a:p>
+            <a:endParaRPr lang="en-US" sz="2200"/>
+          </a:p>
+        </p:txBody>
+      </p:sp>
+      <p:pic>
+        <p:nvPicPr>
+          <p:cNvPr id="2052" name="Picture 4" descr="LLaMA: Meta's Open-Source Rival to Google and OpenAI">
+            <a:extLst>
+              <a:ext uri="{FF2B5EF4-FFF2-40B4-BE49-F238E27FC236}">
+                <a16:creationId xmlns:a16="http://schemas.microsoft.com/office/drawing/2014/main" id="{F5C20D4F-9FAF-F0D3-B3E6-996F9BF29AD6}"/>
+              </a:ext>
+            </a:extLst>
+          </p:cNvPr>
+          <p:cNvPicPr>
+            <a:picLocks noChangeAspect="1" noChangeArrowheads="1"/>
+          </p:cNvPicPr>
+          <p:nvPr/>
+        </p:nvPicPr>
+        <p:blipFill>
+          <a:blip r:embed="rId3">
+            <a:extLst>
+              <a:ext uri="{28A0092B-C50C-407E-A947-70E740481C1C}">
+                <a14:useLocalDpi xmlns:a14="http://schemas.microsoft.com/office/drawing/2010/main" val="0"/>
+              </a:ext>
+            </a:extLst>
+          </a:blip>
+          <a:srcRect l="4418"/>
+          <a:stretch/>
+        </p:blipFill>
+        <p:spPr bwMode="auto">
+          <a:xfrm>
+            <a:off x="7684008" y="2308860"/>
+            <a:ext cx="4507992" cy="2240280"/>
+          </a:xfrm>
+          <a:prstGeom prst="rect">
+            <a:avLst/>
+          </a:prstGeom>
+          <a:noFill/>
+          <a:extLst>
+            <a:ext uri="{909E8E84-426E-40DD-AFC4-6F175D3DCCD1}">
+              <a14:hiddenFill xmlns:a14="http://schemas.microsoft.com/office/drawing/2010/main">
+                <a:solidFill>
+                  <a:srgbClr val="FFFFFF"/>
+                </a:solidFill>
+              </a14:hiddenFill>
+            </a:ext>
+          </a:extLst>
+        </p:spPr>
+      </p:pic>
+      <p:pic>
+        <p:nvPicPr>
+          <p:cNvPr id="2050" name="Picture 2" descr="ChatGPT course - learn essential skills for business">
+            <a:extLst>
+              <a:ext uri="{FF2B5EF4-FFF2-40B4-BE49-F238E27FC236}">
+                <a16:creationId xmlns:a16="http://schemas.microsoft.com/office/drawing/2014/main" id="{128CA3EA-4BF5-FB19-AEEE-ED8C22F3A148}"/>
+              </a:ext>
+            </a:extLst>
+          </p:cNvPr>
+          <p:cNvPicPr>
+            <a:picLocks noChangeAspect="1" noChangeArrowheads="1"/>
+          </p:cNvPicPr>
+          <p:nvPr/>
+        </p:nvPicPr>
+        <p:blipFill>
+          <a:blip r:embed="rId4">
+            <a:extLst>
+              <a:ext uri="{28A0092B-C50C-407E-A947-70E740481C1C}">
+                <a14:useLocalDpi xmlns:a14="http://schemas.microsoft.com/office/drawing/2010/main" val="0"/>
+              </a:ext>
+            </a:extLst>
+          </a:blip>
+          <a:srcRect t="25152" b="25152"/>
+          <a:stretch/>
+        </p:blipFill>
+        <p:spPr bwMode="auto">
+          <a:xfrm>
+            <a:off x="7684008" y="4617720"/>
+            <a:ext cx="4507992" cy="2240280"/>
+          </a:xfrm>
+          <a:prstGeom prst="rect">
+            <a:avLst/>
+          </a:prstGeom>
+          <a:noFill/>
+          <a:extLst>
+            <a:ext uri="{909E8E84-426E-40DD-AFC4-6F175D3DCCD1}">
+              <a14:hiddenFill xmlns:a14="http://schemas.microsoft.com/office/drawing/2010/main">
+                <a:solidFill>
+                  <a:srgbClr val="FFFFFF"/>
+                </a:solidFill>
+              </a14:hiddenFill>
+            </a:ext>
+          </a:extLst>
+        </p:spPr>
+      </p:pic>
     </p:spTree>
     <p:extLst>
       <p:ext uri="{BB962C8B-B14F-4D97-AF65-F5344CB8AC3E}">
-        <p14:creationId xmlns:p14="http://schemas.microsoft.com/office/powerpoint/2010/main" val="1109732945"/>
+        <p14:creationId xmlns:p14="http://schemas.microsoft.com/office/powerpoint/2010/main" val="2076345570"/>
       </p:ext>
     </p:extLst>
   </p:cSld>
@@ -6841,165 +7026,17 @@
 </p:sld>
 </file>
 
-<file path=ppt/slides/slide12.xml><?xml version="1.0" encoding="utf-8"?>
+<file path=ppt/slides/slide11.xml><?xml version="1.0" encoding="utf-8"?>
 <p:sld xmlns:a="http://schemas.openxmlformats.org/drawingml/2006/main" xmlns:r="http://schemas.openxmlformats.org/officeDocument/2006/relationships" xmlns:p="http://schemas.openxmlformats.org/presentationml/2006/main">
   <p:cSld>
-    <p:spTree>
-      <p:nvGrpSpPr>
-        <p:cNvPr id="1" name="">
-          <a:extLst>
-            <a:ext uri="{FF2B5EF4-FFF2-40B4-BE49-F238E27FC236}">
-              <a16:creationId xmlns:a16="http://schemas.microsoft.com/office/drawing/2014/main" id="{2DF6B459-295B-34CD-9FDA-730841D070E8}"/>
-            </a:ext>
-          </a:extLst>
-        </p:cNvPr>
-        <p:cNvGrpSpPr/>
-        <p:nvPr/>
-      </p:nvGrpSpPr>
-      <p:grpSpPr>
-        <a:xfrm>
-          <a:off x="0" y="0"/>
-          <a:ext cx="0" cy="0"/>
-          <a:chOff x="0" y="0"/>
-          <a:chExt cx="0" cy="0"/>
-        </a:xfrm>
-      </p:grpSpPr>
-      <p:sp>
-        <p:nvSpPr>
-          <p:cNvPr id="2" name="Title 1">
-            <a:extLst>
-              <a:ext uri="{FF2B5EF4-FFF2-40B4-BE49-F238E27FC236}">
-                <a16:creationId xmlns:a16="http://schemas.microsoft.com/office/drawing/2014/main" id="{E5975903-F488-20CB-D9E8-958BA7370BD5}"/>
-              </a:ext>
-            </a:extLst>
-          </p:cNvPr>
-          <p:cNvSpPr>
-            <a:spLocks noGrp="1"/>
-          </p:cNvSpPr>
-          <p:nvPr>
-            <p:ph type="title"/>
-          </p:nvPr>
-        </p:nvSpPr>
-        <p:spPr/>
-        <p:txBody>
-          <a:bodyPr/>
-          <a:lstStyle/>
-          <a:p>
-            <a:r>
-              <a:rPr lang="en-GB" dirty="0"/>
-              <a:t>Results</a:t>
-            </a:r>
-          </a:p>
-        </p:txBody>
-      </p:sp>
-      <p:sp>
-        <p:nvSpPr>
-          <p:cNvPr id="3" name="Content Placeholder 2">
-            <a:extLst>
-              <a:ext uri="{FF2B5EF4-FFF2-40B4-BE49-F238E27FC236}">
-                <a16:creationId xmlns:a16="http://schemas.microsoft.com/office/drawing/2014/main" id="{DBF7124B-5027-42F1-D078-0A80DA5882BC}"/>
-              </a:ext>
-            </a:extLst>
-          </p:cNvPr>
-          <p:cNvSpPr>
-            <a:spLocks noGrp="1"/>
-          </p:cNvSpPr>
-          <p:nvPr>
-            <p:ph sz="half" idx="1"/>
-          </p:nvPr>
-        </p:nvSpPr>
-        <p:spPr/>
-        <p:txBody>
-          <a:bodyPr>
-            <a:normAutofit/>
-          </a:bodyPr>
-          <a:lstStyle/>
-          <a:p>
-            <a:r>
-              <a:rPr lang="en-US" dirty="0"/>
-              <a:t>'Original' dataset showed unusually steep learning curve (outlier)</a:t>
-            </a:r>
-          </a:p>
-          <a:p>
-            <a:r>
-              <a:rPr lang="en-US" dirty="0"/>
-              <a:t>Less noisy texts consistently showed strong predictors</a:t>
-            </a:r>
-          </a:p>
-          <a:p>
-            <a:r>
-              <a:rPr lang="en-US" dirty="0"/>
-              <a:t>Clear pattern of more strong predictors and fewer noisy predictors associated with higher AUC-max</a:t>
-            </a:r>
-            <a:endParaRPr lang="en-GB" dirty="0"/>
-          </a:p>
-        </p:txBody>
-      </p:sp>
-      <p:sp>
-        <p:nvSpPr>
-          <p:cNvPr id="4" name="Content Placeholder 3">
-            <a:extLst>
-              <a:ext uri="{FF2B5EF4-FFF2-40B4-BE49-F238E27FC236}">
-                <a16:creationId xmlns:a16="http://schemas.microsoft.com/office/drawing/2014/main" id="{A235880F-D127-C926-F762-CB0554BE6B91}"/>
-              </a:ext>
-            </a:extLst>
-          </p:cNvPr>
-          <p:cNvSpPr>
-            <a:spLocks noGrp="1"/>
-          </p:cNvSpPr>
-          <p:nvPr>
-            <p:ph sz="half" idx="2"/>
-          </p:nvPr>
-        </p:nvSpPr>
-        <p:spPr/>
-        <p:txBody>
-          <a:bodyPr>
-            <a:normAutofit/>
-          </a:bodyPr>
-          <a:lstStyle/>
-          <a:p>
-            <a:r>
-              <a:rPr lang="en-US" b="0" i="0" dirty="0">
-                <a:solidFill>
-                  <a:srgbClr val="3D3929"/>
-                </a:solidFill>
-                <a:effectLst/>
-                <a:latin typeface="__styreneB_5d855b"/>
-              </a:rPr>
-              <a:t>an increase of 100 noisy words corresponds to a decrease of approximately 0.02 in AUC-max</a:t>
-            </a:r>
-          </a:p>
-          <a:p>
-            <a:r>
-              <a:rPr lang="en-US" b="0" i="0" dirty="0">
-                <a:solidFill>
-                  <a:srgbClr val="3D3929"/>
-                </a:solidFill>
-                <a:effectLst/>
-                <a:latin typeface="__styreneB_5d855b"/>
-              </a:rPr>
-              <a:t>an increase of 100 strong predictors corresponds to an increase of approximately 0.04 in AUC-max.</a:t>
-            </a:r>
-            <a:endParaRPr lang="en-GB" dirty="0"/>
-          </a:p>
-        </p:txBody>
-      </p:sp>
-    </p:spTree>
-    <p:extLst>
-      <p:ext uri="{BB962C8B-B14F-4D97-AF65-F5344CB8AC3E}">
-        <p14:creationId xmlns:p14="http://schemas.microsoft.com/office/powerpoint/2010/main" val="4198482480"/>
-      </p:ext>
-    </p:extLst>
-  </p:cSld>
-  <p:clrMapOvr>
-    <a:masterClrMapping/>
-  </p:clrMapOvr>
-</p:sld>
-</file>
-
-<file path=ppt/slides/slide13.xml><?xml version="1.0" encoding="utf-8"?>
-<p:sld xmlns:a="http://schemas.openxmlformats.org/drawingml/2006/main" xmlns:r="http://schemas.openxmlformats.org/officeDocument/2006/relationships" xmlns:p="http://schemas.openxmlformats.org/presentationml/2006/main">
-  <p:cSld>
+    <p:bg>
+      <p:bgPr>
+        <a:solidFill>
+          <a:schemeClr val="bg1"/>
+        </a:solidFill>
+        <a:effectLst/>
+      </p:bgPr>
+    </p:bg>
     <p:spTree>
       <p:nvGrpSpPr>
         <p:cNvPr id="1" name=""/>
@@ -7014,12 +7051,260 @@
           <a:chExt cx="0" cy="0"/>
         </a:xfrm>
       </p:grpSpPr>
+      <p:sp useBgFill="1">
+        <p:nvSpPr>
+          <p:cNvPr id="3095" name="Rectangle 3094">
+            <a:extLst>
+              <a:ext uri="{FF2B5EF4-FFF2-40B4-BE49-F238E27FC236}">
+                <a16:creationId xmlns:a16="http://schemas.microsoft.com/office/drawing/2014/main" id="{2EB492CD-616E-47F8-933B-5E2D952A0593}"/>
+              </a:ext>
+              <a:ext uri="{C183D7F6-B498-43B3-948B-1728B52AA6E4}">
+                <adec:decorative xmlns:adec="http://schemas.microsoft.com/office/drawing/2017/decorative" val="1"/>
+              </a:ext>
+            </a:extLst>
+          </p:cNvPr>
+          <p:cNvSpPr>
+            <a:spLocks noGrp="1" noRot="1" noChangeAspect="1" noMove="1" noResize="1" noEditPoints="1" noAdjustHandles="1" noChangeArrowheads="1" noChangeShapeType="1" noTextEdit="1"/>
+          </p:cNvSpPr>
+          <p:nvPr>
+            <p:extLst>
+              <p:ext uri="{386F3935-93C4-4BCD-93E2-E3B085C9AB24}">
+                <p16:designElem xmlns:p16="http://schemas.microsoft.com/office/powerpoint/2015/main" val="1"/>
+              </p:ext>
+            </p:extLst>
+          </p:nvPr>
+        </p:nvSpPr>
+        <p:spPr bwMode="white">
+          <a:xfrm>
+            <a:off x="0" y="0"/>
+            <a:ext cx="12192000" cy="6858000"/>
+          </a:xfrm>
+          <a:prstGeom prst="rect">
+            <a:avLst/>
+          </a:prstGeom>
+          <a:ln>
+            <a:noFill/>
+          </a:ln>
+        </p:spPr>
+        <p:style>
+          <a:lnRef idx="2">
+            <a:schemeClr val="accent1">
+              <a:shade val="50000"/>
+            </a:schemeClr>
+          </a:lnRef>
+          <a:fillRef idx="1">
+            <a:schemeClr val="accent1"/>
+          </a:fillRef>
+          <a:effectRef idx="0">
+            <a:schemeClr val="accent1"/>
+          </a:effectRef>
+          <a:fontRef idx="minor">
+            <a:schemeClr val="lt1"/>
+          </a:fontRef>
+        </p:style>
+        <p:txBody>
+          <a:bodyPr rtlCol="0" anchor="ctr"/>
+          <a:lstStyle>
+            <a:defPPr>
+              <a:defRPr lang="en-US"/>
+            </a:defPPr>
+            <a:lvl1pPr marL="0" algn="l" defTabSz="914400" rtl="0" eaLnBrk="1" latinLnBrk="0" hangingPunct="1">
+              <a:defRPr sz="1800" kern="1200">
+                <a:solidFill>
+                  <a:schemeClr val="lt1"/>
+                </a:solidFill>
+                <a:latin typeface="+mn-lt"/>
+                <a:ea typeface="+mn-ea"/>
+                <a:cs typeface="+mn-cs"/>
+              </a:defRPr>
+            </a:lvl1pPr>
+            <a:lvl2pPr marL="457200" algn="l" defTabSz="914400" rtl="0" eaLnBrk="1" latinLnBrk="0" hangingPunct="1">
+              <a:defRPr sz="1800" kern="1200">
+                <a:solidFill>
+                  <a:schemeClr val="lt1"/>
+                </a:solidFill>
+                <a:latin typeface="+mn-lt"/>
+                <a:ea typeface="+mn-ea"/>
+                <a:cs typeface="+mn-cs"/>
+              </a:defRPr>
+            </a:lvl2pPr>
+            <a:lvl3pPr marL="914400" algn="l" defTabSz="914400" rtl="0" eaLnBrk="1" latinLnBrk="0" hangingPunct="1">
+              <a:defRPr sz="1800" kern="1200">
+                <a:solidFill>
+                  <a:schemeClr val="lt1"/>
+                </a:solidFill>
+                <a:latin typeface="+mn-lt"/>
+                <a:ea typeface="+mn-ea"/>
+                <a:cs typeface="+mn-cs"/>
+              </a:defRPr>
+            </a:lvl3pPr>
+            <a:lvl4pPr marL="1371600" algn="l" defTabSz="914400" rtl="0" eaLnBrk="1" latinLnBrk="0" hangingPunct="1">
+              <a:defRPr sz="1800" kern="1200">
+                <a:solidFill>
+                  <a:schemeClr val="lt1"/>
+                </a:solidFill>
+                <a:latin typeface="+mn-lt"/>
+                <a:ea typeface="+mn-ea"/>
+                <a:cs typeface="+mn-cs"/>
+              </a:defRPr>
+            </a:lvl4pPr>
+            <a:lvl5pPr marL="1828800" algn="l" defTabSz="914400" rtl="0" eaLnBrk="1" latinLnBrk="0" hangingPunct="1">
+              <a:defRPr sz="1800" kern="1200">
+                <a:solidFill>
+                  <a:schemeClr val="lt1"/>
+                </a:solidFill>
+                <a:latin typeface="+mn-lt"/>
+                <a:ea typeface="+mn-ea"/>
+                <a:cs typeface="+mn-cs"/>
+              </a:defRPr>
+            </a:lvl5pPr>
+            <a:lvl6pPr marL="2286000" algn="l" defTabSz="914400" rtl="0" eaLnBrk="1" latinLnBrk="0" hangingPunct="1">
+              <a:defRPr sz="1800" kern="1200">
+                <a:solidFill>
+                  <a:schemeClr val="lt1"/>
+                </a:solidFill>
+                <a:latin typeface="+mn-lt"/>
+                <a:ea typeface="+mn-ea"/>
+                <a:cs typeface="+mn-cs"/>
+              </a:defRPr>
+            </a:lvl6pPr>
+            <a:lvl7pPr marL="2743200" algn="l" defTabSz="914400" rtl="0" eaLnBrk="1" latinLnBrk="0" hangingPunct="1">
+              <a:defRPr sz="1800" kern="1200">
+                <a:solidFill>
+                  <a:schemeClr val="lt1"/>
+                </a:solidFill>
+                <a:latin typeface="+mn-lt"/>
+                <a:ea typeface="+mn-ea"/>
+                <a:cs typeface="+mn-cs"/>
+              </a:defRPr>
+            </a:lvl7pPr>
+            <a:lvl8pPr marL="3200400" algn="l" defTabSz="914400" rtl="0" eaLnBrk="1" latinLnBrk="0" hangingPunct="1">
+              <a:defRPr sz="1800" kern="1200">
+                <a:solidFill>
+                  <a:schemeClr val="lt1"/>
+                </a:solidFill>
+                <a:latin typeface="+mn-lt"/>
+                <a:ea typeface="+mn-ea"/>
+                <a:cs typeface="+mn-cs"/>
+              </a:defRPr>
+            </a:lvl8pPr>
+            <a:lvl9pPr marL="3657600" algn="l" defTabSz="914400" rtl="0" eaLnBrk="1" latinLnBrk="0" hangingPunct="1">
+              <a:defRPr sz="1800" kern="1200">
+                <a:solidFill>
+                  <a:schemeClr val="lt1"/>
+                </a:solidFill>
+                <a:latin typeface="+mn-lt"/>
+                <a:ea typeface="+mn-ea"/>
+                <a:cs typeface="+mn-cs"/>
+              </a:defRPr>
+            </a:lvl9pPr>
+          </a:lstStyle>
+          <a:p>
+            <a:pPr algn="ctr"/>
+            <a:endParaRPr lang="en-US"/>
+          </a:p>
+        </p:txBody>
+      </p:sp>
+      <p:sp>
+        <p:nvSpPr>
+          <p:cNvPr id="3097" name="Arc 3096">
+            <a:extLst>
+              <a:ext uri="{FF2B5EF4-FFF2-40B4-BE49-F238E27FC236}">
+                <a16:creationId xmlns:a16="http://schemas.microsoft.com/office/drawing/2014/main" id="{59383CF9-23B5-4335-9B21-1791C4CF1C75}"/>
+              </a:ext>
+              <a:ext uri="{C183D7F6-B498-43B3-948B-1728B52AA6E4}">
+                <adec:decorative xmlns:adec="http://schemas.microsoft.com/office/drawing/2017/decorative" val="1"/>
+              </a:ext>
+            </a:extLst>
+          </p:cNvPr>
+          <p:cNvSpPr>
+            <a:spLocks noGrp="1" noRot="1" noChangeAspect="1" noMove="1" noResize="1" noEditPoints="1" noAdjustHandles="1" noChangeArrowheads="1" noChangeShapeType="1" noTextEdit="1"/>
+          </p:cNvSpPr>
+          <p:nvPr>
+            <p:extLst>
+              <p:ext uri="{386F3935-93C4-4BCD-93E2-E3B085C9AB24}">
+                <p16:designElem xmlns:p16="http://schemas.microsoft.com/office/powerpoint/2015/main" val="1"/>
+              </p:ext>
+            </p:extLst>
+          </p:nvPr>
+        </p:nvSpPr>
+        <p:spPr>
+          <a:xfrm rot="3967198" flipH="1">
+            <a:off x="8631348" y="490493"/>
+            <a:ext cx="2987899" cy="2987899"/>
+          </a:xfrm>
+          <a:prstGeom prst="arc">
+            <a:avLst>
+              <a:gd name="adj1" fmla="val 14441841"/>
+              <a:gd name="adj2" fmla="val 0"/>
+            </a:avLst>
+          </a:prstGeom>
+          <a:ln w="127000" cap="rnd">
+            <a:solidFill>
+              <a:schemeClr val="accent4"/>
+            </a:solidFill>
+            <a:prstDash val="dash"/>
+            <a:miter lim="800000"/>
+          </a:ln>
+        </p:spPr>
+        <p:style>
+          <a:lnRef idx="1">
+            <a:schemeClr val="accent1"/>
+          </a:lnRef>
+          <a:fillRef idx="0">
+            <a:schemeClr val="accent1"/>
+          </a:fillRef>
+          <a:effectRef idx="0">
+            <a:schemeClr val="accent1"/>
+          </a:effectRef>
+          <a:fontRef idx="minor">
+            <a:schemeClr val="tx1"/>
+          </a:fontRef>
+        </p:style>
+        <p:txBody>
+          <a:bodyPr rtlCol="0" anchor="ctr"/>
+          <a:lstStyle/>
+          <a:p>
+            <a:pPr marL="0" marR="0" lvl="0" indent="0" algn="ctr" defTabSz="914400" rtl="0" eaLnBrk="1" fontAlgn="auto" latinLnBrk="0" hangingPunct="1">
+              <a:lnSpc>
+                <a:spcPct val="100000"/>
+              </a:lnSpc>
+              <a:spcBef>
+                <a:spcPts val="0"/>
+              </a:spcBef>
+              <a:spcAft>
+                <a:spcPts val="0"/>
+              </a:spcAft>
+              <a:buClrTx/>
+              <a:buSzTx/>
+              <a:buFontTx/>
+              <a:buNone/>
+              <a:tabLst/>
+              <a:defRPr/>
+            </a:pPr>
+            <a:endParaRPr kumimoji="0" lang="en-US" sz="1800" b="0" i="0" u="none" strike="noStrike" kern="1200" cap="none" spc="0" normalizeH="0" baseline="0" noProof="0">
+              <a:ln>
+                <a:noFill/>
+              </a:ln>
+              <a:solidFill>
+                <a:srgbClr val="000000"/>
+              </a:solidFill>
+              <a:effectLst/>
+              <a:uLnTx/>
+              <a:uFillTx/>
+              <a:latin typeface="Calibri" panose="020F0502020204030204"/>
+              <a:ea typeface="+mn-ea"/>
+              <a:cs typeface="+mn-cs"/>
+            </a:endParaRPr>
+          </a:p>
+        </p:txBody>
+      </p:sp>
       <p:sp>
         <p:nvSpPr>
           <p:cNvPr id="2" name="Title 1">
             <a:extLst>
               <a:ext uri="{FF2B5EF4-FFF2-40B4-BE49-F238E27FC236}">
-                <a16:creationId xmlns:a16="http://schemas.microsoft.com/office/drawing/2014/main" id="{355A15E5-8BCB-9CDA-A766-382FABDFE98F}"/>
+                <a16:creationId xmlns:a16="http://schemas.microsoft.com/office/drawing/2014/main" id="{44A8FF15-0E87-0C37-9B92-3F0FB0B810C9}"/>
               </a:ext>
             </a:extLst>
           </p:cNvPr>
@@ -7030,24 +7315,263 @@
             <p:ph type="title"/>
           </p:nvPr>
         </p:nvSpPr>
-        <p:spPr/>
-        <p:txBody>
-          <a:bodyPr/>
-          <a:lstStyle/>
-          <a:p>
-            <a:r>
-              <a:rPr lang="en-GB" dirty="0"/>
-              <a:t>Implications</a:t>
-            </a:r>
-          </a:p>
-        </p:txBody>
-      </p:sp>
+        <p:spPr>
+          <a:xfrm>
+            <a:off x="5894962" y="479493"/>
+            <a:ext cx="5458838" cy="1325563"/>
+          </a:xfrm>
+        </p:spPr>
+        <p:txBody>
+          <a:bodyPr vert="horz" lIns="91440" tIns="45720" rIns="91440" bIns="45720" rtlCol="0" anchor="ctr">
+            <a:normAutofit/>
+          </a:bodyPr>
+          <a:lstStyle/>
+          <a:p>
+            <a:r>
+              <a:rPr lang="en-US" kern="1200">
+                <a:solidFill>
+                  <a:schemeClr val="tx1"/>
+                </a:solidFill>
+                <a:latin typeface="+mj-lt"/>
+                <a:ea typeface="+mj-ea"/>
+                <a:cs typeface="+mj-cs"/>
+              </a:rPr>
+              <a:t>Logistic Regression </a:t>
+            </a:r>
+          </a:p>
+        </p:txBody>
+      </p:sp>
+      <p:sp>
+        <p:nvSpPr>
+          <p:cNvPr id="3099" name="Freeform: Shape 3098">
+            <a:extLst>
+              <a:ext uri="{FF2B5EF4-FFF2-40B4-BE49-F238E27FC236}">
+                <a16:creationId xmlns:a16="http://schemas.microsoft.com/office/drawing/2014/main" id="{0007FE00-9498-4706-B255-6437B0252C02}"/>
+              </a:ext>
+              <a:ext uri="{C183D7F6-B498-43B3-948B-1728B52AA6E4}">
+                <adec:decorative xmlns:adec="http://schemas.microsoft.com/office/drawing/2017/decorative" val="1"/>
+              </a:ext>
+            </a:extLst>
+          </p:cNvPr>
+          <p:cNvSpPr>
+            <a:spLocks noGrp="1" noRot="1" noChangeAspect="1" noMove="1" noResize="1" noEditPoints="1" noAdjustHandles="1" noChangeArrowheads="1" noChangeShapeType="1" noTextEdit="1"/>
+          </p:cNvSpPr>
+          <p:nvPr>
+            <p:extLst>
+              <p:ext uri="{386F3935-93C4-4BCD-93E2-E3B085C9AB24}">
+                <p16:designElem xmlns:p16="http://schemas.microsoft.com/office/powerpoint/2015/main" val="1"/>
+              </p:ext>
+            </p:extLst>
+          </p:nvPr>
+        </p:nvSpPr>
+        <p:spPr>
+          <a:xfrm flipH="1">
+            <a:off x="0" y="5486400"/>
+            <a:ext cx="2672863" cy="1371600"/>
+          </a:xfrm>
+          <a:custGeom>
+            <a:avLst/>
+            <a:gdLst>
+              <a:gd name="connsiteX0" fmla="*/ 1721734 w 2672863"/>
+              <a:gd name="connsiteY0" fmla="*/ 0 h 1371600"/>
+              <a:gd name="connsiteX1" fmla="*/ 2564444 w 2672863"/>
+              <a:gd name="connsiteY1" fmla="*/ 213382 h 1371600"/>
+              <a:gd name="connsiteX2" fmla="*/ 2672863 w 2672863"/>
+              <a:gd name="connsiteY2" fmla="*/ 279248 h 1371600"/>
+              <a:gd name="connsiteX3" fmla="*/ 2672863 w 2672863"/>
+              <a:gd name="connsiteY3" fmla="*/ 1371600 h 1371600"/>
+              <a:gd name="connsiteX4" fmla="*/ 0 w 2672863"/>
+              <a:gd name="connsiteY4" fmla="*/ 1371600 h 1371600"/>
+              <a:gd name="connsiteX5" fmla="*/ 33268 w 2672863"/>
+              <a:gd name="connsiteY5" fmla="*/ 1242216 h 1371600"/>
+              <a:gd name="connsiteX6" fmla="*/ 1721734 w 2672863"/>
+              <a:gd name="connsiteY6" fmla="*/ 0 h 1371600"/>
+            </a:gdLst>
+            <a:ahLst/>
+            <a:cxnLst>
+              <a:cxn ang="0">
+                <a:pos x="connsiteX0" y="connsiteY0"/>
+              </a:cxn>
+              <a:cxn ang="0">
+                <a:pos x="connsiteX1" y="connsiteY1"/>
+              </a:cxn>
+              <a:cxn ang="0">
+                <a:pos x="connsiteX2" y="connsiteY2"/>
+              </a:cxn>
+              <a:cxn ang="0">
+                <a:pos x="connsiteX3" y="connsiteY3"/>
+              </a:cxn>
+              <a:cxn ang="0">
+                <a:pos x="connsiteX4" y="connsiteY4"/>
+              </a:cxn>
+              <a:cxn ang="0">
+                <a:pos x="connsiteX5" y="connsiteY5"/>
+              </a:cxn>
+              <a:cxn ang="0">
+                <a:pos x="connsiteX6" y="connsiteY6"/>
+              </a:cxn>
+            </a:cxnLst>
+            <a:rect l="l" t="t" r="r" b="b"/>
+            <a:pathLst>
+              <a:path w="2672863" h="1371600">
+                <a:moveTo>
+                  <a:pt x="1721734" y="0"/>
+                </a:moveTo>
+                <a:cubicBezTo>
+                  <a:pt x="2026863" y="0"/>
+                  <a:pt x="2313937" y="77299"/>
+                  <a:pt x="2564444" y="213382"/>
+                </a:cubicBezTo>
+                <a:lnTo>
+                  <a:pt x="2672863" y="279248"/>
+                </a:lnTo>
+                <a:lnTo>
+                  <a:pt x="2672863" y="1371600"/>
+                </a:lnTo>
+                <a:lnTo>
+                  <a:pt x="0" y="1371600"/>
+                </a:lnTo>
+                <a:lnTo>
+                  <a:pt x="33268" y="1242216"/>
+                </a:lnTo>
+                <a:cubicBezTo>
+                  <a:pt x="257110" y="522539"/>
+                  <a:pt x="928399" y="0"/>
+                  <a:pt x="1721734" y="0"/>
+                </a:cubicBezTo>
+                <a:close/>
+              </a:path>
+            </a:pathLst>
+          </a:custGeom>
+          <a:solidFill>
+            <a:schemeClr val="accent4"/>
+          </a:solidFill>
+          <a:ln>
+            <a:noFill/>
+          </a:ln>
+        </p:spPr>
+        <p:style>
+          <a:lnRef idx="2">
+            <a:schemeClr val="accent1">
+              <a:shade val="50000"/>
+            </a:schemeClr>
+          </a:lnRef>
+          <a:fillRef idx="1">
+            <a:schemeClr val="accent1"/>
+          </a:fillRef>
+          <a:effectRef idx="0">
+            <a:schemeClr val="accent1"/>
+          </a:effectRef>
+          <a:fontRef idx="minor">
+            <a:schemeClr val="lt1"/>
+          </a:fontRef>
+        </p:style>
+        <p:txBody>
+          <a:bodyPr wrap="square" rtlCol="0" anchor="ctr">
+            <a:noAutofit/>
+          </a:bodyPr>
+          <a:lstStyle/>
+          <a:p>
+            <a:pPr algn="ctr"/>
+            <a:endParaRPr lang="en-US"/>
+          </a:p>
+        </p:txBody>
+      </p:sp>
+      <p:pic>
+        <p:nvPicPr>
+          <p:cNvPr id="3074" name="Picture 2" descr="Text Vectorization and Word Embedding | Guide to Master NLP (Part 5)">
+            <a:extLst>
+              <a:ext uri="{FF2B5EF4-FFF2-40B4-BE49-F238E27FC236}">
+                <a16:creationId xmlns:a16="http://schemas.microsoft.com/office/drawing/2014/main" id="{FE180A3D-34AF-F556-0C4F-33B7D1D3FB8C}"/>
+              </a:ext>
+            </a:extLst>
+          </p:cNvPr>
+          <p:cNvPicPr>
+            <a:picLocks noChangeAspect="1" noChangeArrowheads="1"/>
+          </p:cNvPicPr>
+          <p:nvPr/>
+        </p:nvPicPr>
+        <p:blipFill rotWithShape="1">
+          <a:blip r:embed="rId3">
+            <a:extLst>
+              <a:ext uri="{28A0092B-C50C-407E-A947-70E740481C1C}">
+                <a14:useLocalDpi xmlns:a14="http://schemas.microsoft.com/office/drawing/2010/main" val="0"/>
+              </a:ext>
+            </a:extLst>
+          </a:blip>
+          <a:srcRect t="25742" r="61610" b="2"/>
+          <a:stretch/>
+        </p:blipFill>
+        <p:spPr bwMode="auto">
+          <a:xfrm>
+            <a:off x="703182" y="595028"/>
+            <a:ext cx="4777381" cy="5498199"/>
+          </a:xfrm>
+          <a:custGeom>
+            <a:avLst/>
+            <a:gdLst/>
+            <a:ahLst/>
+            <a:cxnLst/>
+            <a:rect l="l" t="t" r="r" b="b"/>
+            <a:pathLst>
+              <a:path w="4777381" h="5643794">
+                <a:moveTo>
+                  <a:pt x="143704" y="0"/>
+                </a:moveTo>
+                <a:lnTo>
+                  <a:pt x="4633677" y="0"/>
+                </a:lnTo>
+                <a:cubicBezTo>
+                  <a:pt x="4713043" y="0"/>
+                  <a:pt x="4777381" y="64338"/>
+                  <a:pt x="4777381" y="143704"/>
+                </a:cubicBezTo>
+                <a:lnTo>
+                  <a:pt x="4777381" y="5500090"/>
+                </a:lnTo>
+                <a:cubicBezTo>
+                  <a:pt x="4777381" y="5579456"/>
+                  <a:pt x="4713043" y="5643794"/>
+                  <a:pt x="4633677" y="5643794"/>
+                </a:cubicBezTo>
+                <a:lnTo>
+                  <a:pt x="143704" y="5643794"/>
+                </a:lnTo>
+                <a:cubicBezTo>
+                  <a:pt x="64338" y="5643794"/>
+                  <a:pt x="0" y="5579456"/>
+                  <a:pt x="0" y="5500090"/>
+                </a:cubicBezTo>
+                <a:lnTo>
+                  <a:pt x="0" y="143704"/>
+                </a:lnTo>
+                <a:cubicBezTo>
+                  <a:pt x="0" y="64338"/>
+                  <a:pt x="64338" y="0"/>
+                  <a:pt x="143704" y="0"/>
+                </a:cubicBezTo>
+                <a:close/>
+              </a:path>
+            </a:pathLst>
+          </a:custGeom>
+          <a:noFill/>
+          <a:extLst>
+            <a:ext uri="{909E8E84-426E-40DD-AFC4-6F175D3DCCD1}">
+              <a14:hiddenFill xmlns:a14="http://schemas.microsoft.com/office/drawing/2010/main">
+                <a:solidFill>
+                  <a:srgbClr val="FFFFFF"/>
+                </a:solidFill>
+              </a14:hiddenFill>
+            </a:ext>
+          </a:extLst>
+        </p:spPr>
+      </p:pic>
       <p:sp>
         <p:nvSpPr>
           <p:cNvPr id="3" name="Content Placeholder 2">
             <a:extLst>
               <a:ext uri="{FF2B5EF4-FFF2-40B4-BE49-F238E27FC236}">
-                <a16:creationId xmlns:a16="http://schemas.microsoft.com/office/drawing/2014/main" id="{AA03AE5F-BDF5-D7CE-D99E-1D1ADC825F33}"/>
+                <a16:creationId xmlns:a16="http://schemas.microsoft.com/office/drawing/2014/main" id="{B14CD684-1A93-22F8-D23C-ABC97CEE6B49}"/>
               </a:ext>
             </a:extLst>
           </p:cNvPr>
@@ -7058,65 +7582,187 @@
             <p:ph sz="half" idx="1"/>
           </p:nvPr>
         </p:nvSpPr>
-        <p:spPr/>
-        <p:txBody>
-          <a:bodyPr>
-            <a:normAutofit fontScale="85000" lnSpcReduction="10000"/>
+        <p:spPr>
+          <a:xfrm>
+            <a:off x="5894962" y="1984443"/>
+            <a:ext cx="5458838" cy="4192520"/>
+          </a:xfrm>
+        </p:spPr>
+        <p:txBody>
+          <a:bodyPr vert="horz" lIns="91440" tIns="45720" rIns="91440" bIns="45720" rtlCol="0">
+            <a:normAutofit/>
           </a:bodyPr>
           <a:lstStyle/>
           <a:p>
-            <a:r>
-              <a:rPr lang="en-US" dirty="0"/>
-              <a:t>Simple keyword analysis can indicate learning curve steepness </a:t>
-            </a:r>
-          </a:p>
-          <a:p>
-            <a:r>
-              <a:rPr lang="en-US" dirty="0"/>
-              <a:t>Data cleaning techniques focusing on relevant document parts can significantly impact performance </a:t>
-            </a:r>
-          </a:p>
-          <a:p>
-            <a:r>
-              <a:rPr lang="en-US" dirty="0"/>
-              <a:t>Understanding predictor-noise-AUC relationship can guide optimal sample size decisions </a:t>
-            </a:r>
-          </a:p>
-          <a:p>
-            <a:r>
-              <a:rPr lang="en-US" dirty="0"/>
-              <a:t>Quantitative guidelines can estimate potential improvements from data cleaning or additional data</a:t>
-            </a:r>
-            <a:endParaRPr lang="en-GB" dirty="0"/>
-          </a:p>
-        </p:txBody>
-      </p:sp>
-      <p:sp>
-        <p:nvSpPr>
-          <p:cNvPr id="4" name="Content Placeholder 3">
-            <a:extLst>
-              <a:ext uri="{FF2B5EF4-FFF2-40B4-BE49-F238E27FC236}">
-                <a16:creationId xmlns:a16="http://schemas.microsoft.com/office/drawing/2014/main" id="{352B026B-36D8-C7F5-EF24-AB17CD257FE1}"/>
-              </a:ext>
-            </a:extLst>
-          </p:cNvPr>
-          <p:cNvSpPr>
-            <a:spLocks noGrp="1"/>
-          </p:cNvSpPr>
-          <p:nvPr>
-            <p:ph sz="half" idx="2"/>
-          </p:nvPr>
-        </p:nvSpPr>
-        <p:spPr/>
-        <p:txBody>
-          <a:bodyPr>
-            <a:normAutofit fontScale="85000" lnSpcReduction="10000"/>
-          </a:bodyPr>
-          <a:lstStyle/>
-          <a:p>
-            <a:r>
-              <a:rPr lang="en-GB" dirty="0"/>
-              <a:t>Pics / diagrams</a:t>
+            <a:pPr marL="0" marR="0">
+              <a:spcBef>
+                <a:spcPts val="0"/>
+              </a:spcBef>
+              <a:spcAft>
+                <a:spcPts val="600"/>
+              </a:spcAft>
+            </a:pPr>
+            <a:r>
+              <a:rPr lang="en-US" sz="1500" dirty="0">
+                <a:effectLst/>
+              </a:rPr>
+              <a:t>Text is vectorized and transformed</a:t>
+            </a:r>
+          </a:p>
+          <a:p>
+            <a:pPr marL="0" marR="0">
+              <a:spcBef>
+                <a:spcPts val="0"/>
+              </a:spcBef>
+              <a:spcAft>
+                <a:spcPts val="600"/>
+              </a:spcAft>
+            </a:pPr>
+            <a:r>
+              <a:rPr lang="en-US" sz="1500" dirty="0">
+                <a:effectLst/>
+              </a:rPr>
+              <a:t>And then fit to a logistic regression model</a:t>
+            </a:r>
+          </a:p>
+          <a:p>
+            <a:pPr marL="0" marR="0">
+              <a:spcBef>
+                <a:spcPts val="0"/>
+              </a:spcBef>
+              <a:spcAft>
+                <a:spcPts val="600"/>
+              </a:spcAft>
+            </a:pPr>
+            <a:r>
+              <a:rPr lang="en-US" sz="1500" dirty="0">
+                <a:effectLst/>
+              </a:rPr>
+              <a:t>Coefficients of the features are extracted and plotted</a:t>
+            </a:r>
+          </a:p>
+          <a:p>
+            <a:pPr marL="0" marR="0">
+              <a:spcBef>
+                <a:spcPts val="0"/>
+              </a:spcBef>
+              <a:spcAft>
+                <a:spcPts val="600"/>
+              </a:spcAft>
+            </a:pPr>
+            <a:r>
+              <a:rPr lang="en-US" sz="1500" dirty="0">
+                <a:effectLst/>
+              </a:rPr>
+              <a:t>Set threshold of 0.1 and those above it are counted as high weight features. Total features counted as well.</a:t>
+            </a:r>
+          </a:p>
+          <a:p>
+            <a:pPr marL="0" marR="0">
+              <a:spcBef>
+                <a:spcPts val="0"/>
+              </a:spcBef>
+              <a:spcAft>
+                <a:spcPts val="600"/>
+              </a:spcAft>
+            </a:pPr>
+            <a:r>
+              <a:rPr lang="en-US" sz="1500" dirty="0">
+                <a:effectLst/>
+              </a:rPr>
+              <a:t> </a:t>
+            </a:r>
+          </a:p>
+          <a:p>
+            <a:pPr marL="0" marR="0">
+              <a:spcBef>
+                <a:spcPts val="0"/>
+              </a:spcBef>
+              <a:spcAft>
+                <a:spcPts val="600"/>
+              </a:spcAft>
+            </a:pPr>
+            <a:r>
+              <a:rPr lang="en-US" sz="1500" dirty="0">
+                <a:effectLst/>
+              </a:rPr>
+              <a:t>Then SHAP linear explainer used to calculate the contribution of each feature to the model's prediction</a:t>
+            </a:r>
+          </a:p>
+          <a:p>
+            <a:pPr marL="0" marR="0">
+              <a:spcBef>
+                <a:spcPts val="0"/>
+              </a:spcBef>
+              <a:spcAft>
+                <a:spcPts val="600"/>
+              </a:spcAft>
+            </a:pPr>
+            <a:r>
+              <a:rPr lang="en-US" sz="1500" dirty="0">
+                <a:effectLst/>
+              </a:rPr>
+              <a:t>Also visualized the impact of various features on each class and overall </a:t>
+            </a:r>
+            <a:r>
+              <a:rPr lang="en-US" sz="1500" dirty="0" err="1">
+                <a:effectLst/>
+              </a:rPr>
+              <a:t>usign</a:t>
+            </a:r>
+            <a:r>
+              <a:rPr lang="en-US" sz="1500" dirty="0">
+                <a:effectLst/>
+              </a:rPr>
+              <a:t> SHAP plots</a:t>
+            </a:r>
+          </a:p>
+          <a:p>
+            <a:pPr marL="0" marR="0">
+              <a:spcBef>
+                <a:spcPts val="0"/>
+              </a:spcBef>
+              <a:spcAft>
+                <a:spcPts val="600"/>
+              </a:spcAft>
+            </a:pPr>
+            <a:r>
+              <a:rPr lang="en-US" sz="1500" dirty="0">
+                <a:effectLst/>
+              </a:rPr>
+              <a:t> </a:t>
+            </a:r>
+          </a:p>
+          <a:p>
+            <a:pPr marL="0" marR="0">
+              <a:spcBef>
+                <a:spcPts val="0"/>
+              </a:spcBef>
+              <a:spcAft>
+                <a:spcPts val="600"/>
+              </a:spcAft>
+            </a:pPr>
+            <a:r>
+              <a:rPr lang="en-US" sz="1500" dirty="0">
+                <a:effectLst/>
+              </a:rPr>
+              <a:t>Histogram of coefficients plotted and counted number of non zero coefficients\</a:t>
+            </a:r>
+          </a:p>
+          <a:p>
+            <a:pPr marL="0" marR="0">
+              <a:spcBef>
+                <a:spcPts val="0"/>
+              </a:spcBef>
+              <a:spcAft>
+                <a:spcPts val="600"/>
+              </a:spcAft>
+            </a:pPr>
+            <a:r>
+              <a:rPr lang="en-US" sz="1500" dirty="0">
+                <a:effectLst/>
+              </a:rPr>
+              <a:t>Also used eli5 to identify features contributing to each class</a:t>
             </a:r>
           </a:p>
         </p:txBody>
@@ -7124,7 +7770,820 @@
     </p:spTree>
     <p:extLst>
       <p:ext uri="{BB962C8B-B14F-4D97-AF65-F5344CB8AC3E}">
-        <p14:creationId xmlns:p14="http://schemas.microsoft.com/office/powerpoint/2010/main" val="4144772600"/>
+        <p14:creationId xmlns:p14="http://schemas.microsoft.com/office/powerpoint/2010/main" val="2214348884"/>
+      </p:ext>
+    </p:extLst>
+  </p:cSld>
+  <p:clrMapOvr>
+    <a:masterClrMapping/>
+  </p:clrMapOvr>
+</p:sld>
+</file>
+
+<file path=ppt/slides/slide12.xml><?xml version="1.0" encoding="utf-8"?>
+<p:sld xmlns:a="http://schemas.openxmlformats.org/drawingml/2006/main" xmlns:r="http://schemas.openxmlformats.org/officeDocument/2006/relationships" xmlns:p="http://schemas.openxmlformats.org/presentationml/2006/main">
+  <p:cSld>
+    <p:bg>
+      <p:bgPr>
+        <a:solidFill>
+          <a:schemeClr val="bg1"/>
+        </a:solidFill>
+        <a:effectLst/>
+      </p:bgPr>
+    </p:bg>
+    <p:spTree>
+      <p:nvGrpSpPr>
+        <p:cNvPr id="1" name=""/>
+        <p:cNvGrpSpPr/>
+        <p:nvPr/>
+      </p:nvGrpSpPr>
+      <p:grpSpPr>
+        <a:xfrm>
+          <a:off x="0" y="0"/>
+          <a:ext cx="0" cy="0"/>
+          <a:chOff x="0" y="0"/>
+          <a:chExt cx="0" cy="0"/>
+        </a:xfrm>
+      </p:grpSpPr>
+      <p:sp useBgFill="1">
+        <p:nvSpPr>
+          <p:cNvPr id="4103" name="Rectangle 4102">
+            <a:extLst>
+              <a:ext uri="{FF2B5EF4-FFF2-40B4-BE49-F238E27FC236}">
+                <a16:creationId xmlns:a16="http://schemas.microsoft.com/office/drawing/2014/main" id="{8FC9BE17-9A7B-462D-AE50-3D8777387304}"/>
+              </a:ext>
+              <a:ext uri="{C183D7F6-B498-43B3-948B-1728B52AA6E4}">
+                <adec:decorative xmlns:adec="http://schemas.microsoft.com/office/drawing/2017/decorative" val="1"/>
+              </a:ext>
+            </a:extLst>
+          </p:cNvPr>
+          <p:cNvSpPr>
+            <a:spLocks noGrp="1" noRot="1" noChangeAspect="1" noMove="1" noResize="1" noEditPoints="1" noAdjustHandles="1" noChangeArrowheads="1" noChangeShapeType="1" noTextEdit="1"/>
+          </p:cNvSpPr>
+          <p:nvPr>
+            <p:extLst>
+              <p:ext uri="{386F3935-93C4-4BCD-93E2-E3B085C9AB24}">
+                <p16:designElem xmlns:p16="http://schemas.microsoft.com/office/powerpoint/2015/main" val="1"/>
+              </p:ext>
+            </p:extLst>
+          </p:nvPr>
+        </p:nvSpPr>
+        <p:spPr>
+          <a:xfrm>
+            <a:off x="0" y="0"/>
+            <a:ext cx="12192000" cy="6858000"/>
+          </a:xfrm>
+          <a:prstGeom prst="rect">
+            <a:avLst/>
+          </a:prstGeom>
+          <a:ln>
+            <a:noFill/>
+          </a:ln>
+        </p:spPr>
+        <p:style>
+          <a:lnRef idx="2">
+            <a:schemeClr val="accent1">
+              <a:shade val="50000"/>
+            </a:schemeClr>
+          </a:lnRef>
+          <a:fillRef idx="1">
+            <a:schemeClr val="accent1"/>
+          </a:fillRef>
+          <a:effectRef idx="0">
+            <a:schemeClr val="accent1"/>
+          </a:effectRef>
+          <a:fontRef idx="minor">
+            <a:schemeClr val="lt1"/>
+          </a:fontRef>
+        </p:style>
+        <p:txBody>
+          <a:bodyPr rtlCol="0" anchor="ctr"/>
+          <a:lstStyle/>
+          <a:p>
+            <a:pPr algn="ctr"/>
+            <a:endParaRPr lang="en-US"/>
+          </a:p>
+        </p:txBody>
+      </p:sp>
+      <p:pic>
+        <p:nvPicPr>
+          <p:cNvPr id="4098" name="Picture 2" descr="On J.R. Carpenter's Gorge, Part Two: Choosing the Words – Elle Thinks">
+            <a:extLst>
+              <a:ext uri="{FF2B5EF4-FFF2-40B4-BE49-F238E27FC236}">
+                <a16:creationId xmlns:a16="http://schemas.microsoft.com/office/drawing/2014/main" id="{71228A2B-D9AE-A64E-D713-A30A932B3CF6}"/>
+              </a:ext>
+            </a:extLst>
+          </p:cNvPr>
+          <p:cNvPicPr>
+            <a:picLocks noChangeAspect="1" noChangeArrowheads="1"/>
+          </p:cNvPicPr>
+          <p:nvPr/>
+        </p:nvPicPr>
+        <p:blipFill>
+          <a:blip r:embed="rId2">
+            <a:extLst>
+              <a:ext uri="{28A0092B-C50C-407E-A947-70E740481C1C}">
+                <a14:useLocalDpi xmlns:a14="http://schemas.microsoft.com/office/drawing/2010/main" val="0"/>
+              </a:ext>
+            </a:extLst>
+          </a:blip>
+          <a:srcRect t="9061" r="23585" b="30"/>
+          <a:stretch/>
+        </p:blipFill>
+        <p:spPr bwMode="auto">
+          <a:xfrm>
+            <a:off x="3523488" y="10"/>
+            <a:ext cx="8668512" cy="6857990"/>
+          </a:xfrm>
+          <a:prstGeom prst="rect">
+            <a:avLst/>
+          </a:prstGeom>
+          <a:noFill/>
+          <a:extLst>
+            <a:ext uri="{909E8E84-426E-40DD-AFC4-6F175D3DCCD1}">
+              <a14:hiddenFill xmlns:a14="http://schemas.microsoft.com/office/drawing/2010/main">
+                <a:solidFill>
+                  <a:srgbClr val="FFFFFF"/>
+                </a:solidFill>
+              </a14:hiddenFill>
+            </a:ext>
+          </a:extLst>
+        </p:spPr>
+      </p:pic>
+      <p:sp>
+        <p:nvSpPr>
+          <p:cNvPr id="4105" name="Rectangle 4104">
+            <a:extLst>
+              <a:ext uri="{FF2B5EF4-FFF2-40B4-BE49-F238E27FC236}">
+                <a16:creationId xmlns:a16="http://schemas.microsoft.com/office/drawing/2014/main" id="{3EBE8569-6AEC-4B8C-8D53-2DE337CDBA65}"/>
+              </a:ext>
+              <a:ext uri="{C183D7F6-B498-43B3-948B-1728B52AA6E4}">
+                <adec:decorative xmlns:adec="http://schemas.microsoft.com/office/drawing/2017/decorative" val="1"/>
+              </a:ext>
+            </a:extLst>
+          </p:cNvPr>
+          <p:cNvSpPr>
+            <a:spLocks noGrp="1" noRot="1" noChangeAspect="1" noMove="1" noResize="1" noEditPoints="1" noAdjustHandles="1" noChangeArrowheads="1" noChangeShapeType="1" noTextEdit="1"/>
+          </p:cNvSpPr>
+          <p:nvPr>
+            <p:extLst>
+              <p:ext uri="{386F3935-93C4-4BCD-93E2-E3B085C9AB24}">
+                <p16:designElem xmlns:p16="http://schemas.microsoft.com/office/powerpoint/2015/main" val="1"/>
+              </p:ext>
+            </p:extLst>
+          </p:nvPr>
+        </p:nvSpPr>
+        <p:spPr>
+          <a:xfrm>
+            <a:off x="2" y="0"/>
+            <a:ext cx="9756601" cy="6858000"/>
+          </a:xfrm>
+          <a:prstGeom prst="rect">
+            <a:avLst/>
+          </a:prstGeom>
+          <a:gradFill>
+            <a:gsLst>
+              <a:gs pos="58000">
+                <a:schemeClr val="bg1"/>
+              </a:gs>
+              <a:gs pos="35000">
+                <a:schemeClr val="bg1">
+                  <a:alpha val="78000"/>
+                </a:schemeClr>
+              </a:gs>
+              <a:gs pos="19000">
+                <a:schemeClr val="bg1">
+                  <a:alpha val="38000"/>
+                </a:schemeClr>
+              </a:gs>
+              <a:gs pos="0">
+                <a:schemeClr val="bg1">
+                  <a:alpha val="0"/>
+                </a:schemeClr>
+              </a:gs>
+              <a:gs pos="100000">
+                <a:schemeClr val="bg1"/>
+              </a:gs>
+            </a:gsLst>
+            <a:lin ang="10800000" scaled="0"/>
+          </a:gradFill>
+          <a:ln>
+            <a:noFill/>
+          </a:ln>
+        </p:spPr>
+        <p:style>
+          <a:lnRef idx="2">
+            <a:schemeClr val="accent1">
+              <a:shade val="50000"/>
+            </a:schemeClr>
+          </a:lnRef>
+          <a:fillRef idx="1">
+            <a:schemeClr val="accent1"/>
+          </a:fillRef>
+          <a:effectRef idx="0">
+            <a:schemeClr val="accent1"/>
+          </a:effectRef>
+          <a:fontRef idx="minor">
+            <a:schemeClr val="lt1"/>
+          </a:fontRef>
+        </p:style>
+        <p:txBody>
+          <a:bodyPr rtlCol="0" anchor="ctr"/>
+          <a:lstStyle/>
+          <a:p>
+            <a:pPr algn="ctr"/>
+            <a:endParaRPr lang="en-US" dirty="0"/>
+          </a:p>
+        </p:txBody>
+      </p:sp>
+      <p:sp>
+        <p:nvSpPr>
+          <p:cNvPr id="2" name="Title 1">
+            <a:extLst>
+              <a:ext uri="{FF2B5EF4-FFF2-40B4-BE49-F238E27FC236}">
+                <a16:creationId xmlns:a16="http://schemas.microsoft.com/office/drawing/2014/main" id="{56B1CCF1-8447-FC9B-9389-44457F6D057B}"/>
+              </a:ext>
+            </a:extLst>
+          </p:cNvPr>
+          <p:cNvSpPr>
+            <a:spLocks noGrp="1"/>
+          </p:cNvSpPr>
+          <p:nvPr>
+            <p:ph type="title"/>
+          </p:nvPr>
+        </p:nvSpPr>
+        <p:spPr>
+          <a:xfrm>
+            <a:off x="371094" y="1161288"/>
+            <a:ext cx="3438144" cy="1124712"/>
+          </a:xfrm>
+        </p:spPr>
+        <p:txBody>
+          <a:bodyPr vert="horz" lIns="91440" tIns="45720" rIns="91440" bIns="45720" rtlCol="0" anchor="b">
+            <a:normAutofit/>
+          </a:bodyPr>
+          <a:lstStyle/>
+          <a:p>
+            <a:r>
+              <a:rPr lang="en-US" sz="2800"/>
+              <a:t>Vocab size</a:t>
+            </a:r>
+          </a:p>
+        </p:txBody>
+      </p:sp>
+      <p:sp>
+        <p:nvSpPr>
+          <p:cNvPr id="4107" name="Rectangle 4106">
+            <a:extLst>
+              <a:ext uri="{FF2B5EF4-FFF2-40B4-BE49-F238E27FC236}">
+                <a16:creationId xmlns:a16="http://schemas.microsoft.com/office/drawing/2014/main" id="{55D4142C-5077-457F-A6AD-3FECFDB39685}"/>
+              </a:ext>
+              <a:ext uri="{C183D7F6-B498-43B3-948B-1728B52AA6E4}">
+                <adec:decorative xmlns:adec="http://schemas.microsoft.com/office/drawing/2017/decorative" val="1"/>
+              </a:ext>
+            </a:extLst>
+          </p:cNvPr>
+          <p:cNvSpPr>
+            <a:spLocks noGrp="1" noRot="1" noChangeAspect="1" noMove="1" noResize="1" noEditPoints="1" noAdjustHandles="1" noChangeArrowheads="1" noChangeShapeType="1" noTextEdit="1"/>
+          </p:cNvSpPr>
+          <p:nvPr>
+            <p:extLst>
+              <p:ext uri="{386F3935-93C4-4BCD-93E2-E3B085C9AB24}">
+                <p16:designElem xmlns:p16="http://schemas.microsoft.com/office/powerpoint/2015/main" val="1"/>
+              </p:ext>
+            </p:extLst>
+          </p:nvPr>
+        </p:nvSpPr>
+        <p:spPr>
+          <a:xfrm rot="5400000">
+            <a:off x="662559" y="605790"/>
+            <a:ext cx="73152" cy="548640"/>
+          </a:xfrm>
+          <a:prstGeom prst="rect">
+            <a:avLst/>
+          </a:prstGeom>
+          <a:solidFill>
+            <a:schemeClr val="accent2"/>
+          </a:solidFill>
+          <a:ln>
+            <a:noFill/>
+          </a:ln>
+        </p:spPr>
+        <p:style>
+          <a:lnRef idx="2">
+            <a:schemeClr val="accent1">
+              <a:shade val="50000"/>
+            </a:schemeClr>
+          </a:lnRef>
+          <a:fillRef idx="1">
+            <a:schemeClr val="accent1"/>
+          </a:fillRef>
+          <a:effectRef idx="0">
+            <a:schemeClr val="accent1"/>
+          </a:effectRef>
+          <a:fontRef idx="minor">
+            <a:schemeClr val="lt1"/>
+          </a:fontRef>
+        </p:style>
+        <p:txBody>
+          <a:bodyPr rtlCol="0" anchor="ctr"/>
+          <a:lstStyle/>
+          <a:p>
+            <a:pPr algn="ctr"/>
+            <a:endParaRPr lang="en-US">
+              <a:solidFill>
+                <a:prstClr val="white"/>
+              </a:solidFill>
+              <a:latin typeface="Calibri" panose="020F0502020204030204"/>
+            </a:endParaRPr>
+          </a:p>
+        </p:txBody>
+      </p:sp>
+      <p:sp>
+        <p:nvSpPr>
+          <p:cNvPr id="4109" name="Rectangle 4108">
+            <a:extLst>
+              <a:ext uri="{FF2B5EF4-FFF2-40B4-BE49-F238E27FC236}">
+                <a16:creationId xmlns:a16="http://schemas.microsoft.com/office/drawing/2014/main" id="{7A5F0580-5EE9-419F-96EE-B6529EF6E7D0}"/>
+              </a:ext>
+              <a:ext uri="{C183D7F6-B498-43B3-948B-1728B52AA6E4}">
+                <adec:decorative xmlns:adec="http://schemas.microsoft.com/office/drawing/2017/decorative" val="1"/>
+              </a:ext>
+            </a:extLst>
+          </p:cNvPr>
+          <p:cNvSpPr>
+            <a:spLocks noGrp="1" noRot="1" noChangeAspect="1" noMove="1" noResize="1" noEditPoints="1" noAdjustHandles="1" noChangeArrowheads="1" noChangeShapeType="1" noTextEdit="1"/>
+          </p:cNvSpPr>
+          <p:nvPr>
+            <p:extLst>
+              <p:ext uri="{386F3935-93C4-4BCD-93E2-E3B085C9AB24}">
+                <p16:designElem xmlns:p16="http://schemas.microsoft.com/office/powerpoint/2015/main" val="1"/>
+              </p:ext>
+            </p:extLst>
+          </p:nvPr>
+        </p:nvSpPr>
+        <p:spPr>
+          <a:xfrm>
+            <a:off x="428244" y="2443480"/>
+            <a:ext cx="3300984" cy="9144"/>
+          </a:xfrm>
+          <a:prstGeom prst="rect">
+            <a:avLst/>
+          </a:prstGeom>
+          <a:solidFill>
+            <a:srgbClr val="D5D5D5"/>
+          </a:solidFill>
+          <a:ln w="3175">
+            <a:solidFill>
+              <a:srgbClr val="D5D5D5"/>
+            </a:solidFill>
+          </a:ln>
+          <a:effectLst/>
+        </p:spPr>
+        <p:style>
+          <a:lnRef idx="2">
+            <a:schemeClr val="accent1">
+              <a:shade val="50000"/>
+            </a:schemeClr>
+          </a:lnRef>
+          <a:fillRef idx="1">
+            <a:schemeClr val="accent1"/>
+          </a:fillRef>
+          <a:effectRef idx="0">
+            <a:schemeClr val="accent1"/>
+          </a:effectRef>
+          <a:fontRef idx="minor">
+            <a:schemeClr val="lt1"/>
+          </a:fontRef>
+        </p:style>
+        <p:txBody>
+          <a:bodyPr rtlCol="0" anchor="ctr"/>
+          <a:lstStyle/>
+          <a:p>
+            <a:pPr marL="0" marR="0" lvl="0" indent="0" algn="ctr" defTabSz="914400" rtl="0" eaLnBrk="1" fontAlgn="auto" latinLnBrk="0" hangingPunct="1">
+              <a:lnSpc>
+                <a:spcPct val="100000"/>
+              </a:lnSpc>
+              <a:spcBef>
+                <a:spcPts val="0"/>
+              </a:spcBef>
+              <a:spcAft>
+                <a:spcPts val="0"/>
+              </a:spcAft>
+              <a:buClrTx/>
+              <a:buSzTx/>
+              <a:buFontTx/>
+              <a:buNone/>
+              <a:tabLst/>
+              <a:defRPr/>
+            </a:pPr>
+            <a:endParaRPr kumimoji="0" lang="en-US" sz="1800" b="0" i="0" u="none" strike="noStrike" kern="1200" cap="none" spc="0" normalizeH="0" baseline="0" noProof="0">
+              <a:ln>
+                <a:noFill/>
+              </a:ln>
+              <a:solidFill>
+                <a:prstClr val="white"/>
+              </a:solidFill>
+              <a:effectLst/>
+              <a:uLnTx/>
+              <a:uFillTx/>
+              <a:latin typeface="Calibri" panose="020F0502020204030204"/>
+              <a:ea typeface="+mn-ea"/>
+              <a:cs typeface="+mn-cs"/>
+            </a:endParaRPr>
+          </a:p>
+        </p:txBody>
+      </p:sp>
+      <p:sp>
+        <p:nvSpPr>
+          <p:cNvPr id="3" name="Content Placeholder 2">
+            <a:extLst>
+              <a:ext uri="{FF2B5EF4-FFF2-40B4-BE49-F238E27FC236}">
+                <a16:creationId xmlns:a16="http://schemas.microsoft.com/office/drawing/2014/main" id="{F7F8ED2A-979C-3043-5DB1-0DBBDAC7C5FA}"/>
+              </a:ext>
+            </a:extLst>
+          </p:cNvPr>
+          <p:cNvSpPr>
+            <a:spLocks noGrp="1"/>
+          </p:cNvSpPr>
+          <p:nvPr>
+            <p:ph sz="half" idx="1"/>
+          </p:nvPr>
+        </p:nvSpPr>
+        <p:spPr>
+          <a:xfrm>
+            <a:off x="371094" y="2718054"/>
+            <a:ext cx="3438906" cy="3207258"/>
+          </a:xfrm>
+        </p:spPr>
+        <p:txBody>
+          <a:bodyPr vert="horz" lIns="91440" tIns="45720" rIns="91440" bIns="45720" rtlCol="0" anchor="t">
+            <a:normAutofit/>
+          </a:bodyPr>
+          <a:lstStyle/>
+          <a:p>
+            <a:r>
+              <a:rPr lang="en-US" sz="2000" dirty="0">
+                <a:effectLst/>
+              </a:rPr>
+              <a:t>For vocab size- documents were tokenized and lower cased - split by label and counted</a:t>
+            </a:r>
+          </a:p>
+          <a:p>
+            <a:endParaRPr lang="en-US" sz="1700" dirty="0"/>
+          </a:p>
+        </p:txBody>
+      </p:sp>
+    </p:spTree>
+    <p:extLst>
+      <p:ext uri="{BB962C8B-B14F-4D97-AF65-F5344CB8AC3E}">
+        <p14:creationId xmlns:p14="http://schemas.microsoft.com/office/powerpoint/2010/main" val="251651283"/>
+      </p:ext>
+    </p:extLst>
+  </p:cSld>
+  <p:clrMapOvr>
+    <a:masterClrMapping/>
+  </p:clrMapOvr>
+</p:sld>
+</file>
+
+<file path=ppt/slides/slide13.xml><?xml version="1.0" encoding="utf-8"?>
+<p:sld xmlns:a="http://schemas.openxmlformats.org/drawingml/2006/main" xmlns:r="http://schemas.openxmlformats.org/officeDocument/2006/relationships" xmlns:p="http://schemas.openxmlformats.org/presentationml/2006/main">
+  <p:cSld>
+    <p:bg>
+      <p:bgPr>
+        <a:solidFill>
+          <a:schemeClr val="bg1"/>
+        </a:solidFill>
+        <a:effectLst/>
+      </p:bgPr>
+    </p:bg>
+    <p:spTree>
+      <p:nvGrpSpPr>
+        <p:cNvPr id="1" name=""/>
+        <p:cNvGrpSpPr/>
+        <p:nvPr/>
+      </p:nvGrpSpPr>
+      <p:grpSpPr>
+        <a:xfrm>
+          <a:off x="0" y="0"/>
+          <a:ext cx="0" cy="0"/>
+          <a:chOff x="0" y="0"/>
+          <a:chExt cx="0" cy="0"/>
+        </a:xfrm>
+      </p:grpSpPr>
+      <p:sp useBgFill="1">
+        <p:nvSpPr>
+          <p:cNvPr id="5135" name="Rectangle 5134">
+            <a:extLst>
+              <a:ext uri="{FF2B5EF4-FFF2-40B4-BE49-F238E27FC236}">
+                <a16:creationId xmlns:a16="http://schemas.microsoft.com/office/drawing/2014/main" id="{68AF5748-FED8-45BA-8631-26D1D10F3246}"/>
+              </a:ext>
+              <a:ext uri="{C183D7F6-B498-43B3-948B-1728B52AA6E4}">
+                <adec:decorative xmlns:adec="http://schemas.microsoft.com/office/drawing/2017/decorative" val="1"/>
+              </a:ext>
+            </a:extLst>
+          </p:cNvPr>
+          <p:cNvSpPr>
+            <a:spLocks noGrp="1" noRot="1" noChangeAspect="1" noMove="1" noResize="1" noEditPoints="1" noAdjustHandles="1" noChangeArrowheads="1" noChangeShapeType="1" noTextEdit="1"/>
+          </p:cNvSpPr>
+          <p:nvPr>
+            <p:extLst>
+              <p:ext uri="{386F3935-93C4-4BCD-93E2-E3B085C9AB24}">
+                <p16:designElem xmlns:p16="http://schemas.microsoft.com/office/powerpoint/2015/main" val="1"/>
+              </p:ext>
+            </p:extLst>
+          </p:nvPr>
+        </p:nvSpPr>
+        <p:spPr>
+          <a:xfrm>
+            <a:off x="0" y="0"/>
+            <a:ext cx="12192000" cy="6858000"/>
+          </a:xfrm>
+          <a:prstGeom prst="rect">
+            <a:avLst/>
+          </a:prstGeom>
+          <a:ln>
+            <a:noFill/>
+          </a:ln>
+        </p:spPr>
+        <p:style>
+          <a:lnRef idx="2">
+            <a:schemeClr val="accent1">
+              <a:shade val="50000"/>
+            </a:schemeClr>
+          </a:lnRef>
+          <a:fillRef idx="1">
+            <a:schemeClr val="accent1"/>
+          </a:fillRef>
+          <a:effectRef idx="0">
+            <a:schemeClr val="accent1"/>
+          </a:effectRef>
+          <a:fontRef idx="minor">
+            <a:schemeClr val="lt1"/>
+          </a:fontRef>
+        </p:style>
+        <p:txBody>
+          <a:bodyPr rtlCol="0" anchor="ctr"/>
+          <a:lstStyle/>
+          <a:p>
+            <a:pPr algn="ctr"/>
+            <a:endParaRPr lang="en-US"/>
+          </a:p>
+        </p:txBody>
+      </p:sp>
+      <p:sp>
+        <p:nvSpPr>
+          <p:cNvPr id="2" name="Title 1">
+            <a:extLst>
+              <a:ext uri="{FF2B5EF4-FFF2-40B4-BE49-F238E27FC236}">
+                <a16:creationId xmlns:a16="http://schemas.microsoft.com/office/drawing/2014/main" id="{0401E6A3-1068-3A1B-A5B4-5E2F819EE17C}"/>
+              </a:ext>
+            </a:extLst>
+          </p:cNvPr>
+          <p:cNvSpPr>
+            <a:spLocks noGrp="1"/>
+          </p:cNvSpPr>
+          <p:nvPr>
+            <p:ph type="title"/>
+          </p:nvPr>
+        </p:nvSpPr>
+        <p:spPr>
+          <a:xfrm>
+            <a:off x="477981" y="1122363"/>
+            <a:ext cx="4023360" cy="3204134"/>
+          </a:xfrm>
+        </p:spPr>
+        <p:txBody>
+          <a:bodyPr vert="horz" lIns="91440" tIns="45720" rIns="91440" bIns="45720" rtlCol="0" anchor="b">
+            <a:normAutofit/>
+          </a:bodyPr>
+          <a:lstStyle/>
+          <a:p>
+            <a:r>
+              <a:rPr lang="en-US" sz="4800" kern="1200">
+                <a:solidFill>
+                  <a:schemeClr val="tx1"/>
+                </a:solidFill>
+                <a:latin typeface="+mj-lt"/>
+                <a:ea typeface="+mj-ea"/>
+                <a:cs typeface="+mj-cs"/>
+              </a:rPr>
+              <a:t>Diagnosis codes used</a:t>
+            </a:r>
+          </a:p>
+        </p:txBody>
+      </p:sp>
+      <p:sp>
+        <p:nvSpPr>
+          <p:cNvPr id="5137" name="Rectangle 5136">
+            <a:extLst>
+              <a:ext uri="{FF2B5EF4-FFF2-40B4-BE49-F238E27FC236}">
+                <a16:creationId xmlns:a16="http://schemas.microsoft.com/office/drawing/2014/main" id="{AF2F604E-43BE-4DC3-B983-E071523364F8}"/>
+              </a:ext>
+              <a:ext uri="{C183D7F6-B498-43B3-948B-1728B52AA6E4}">
+                <adec:decorative xmlns:adec="http://schemas.microsoft.com/office/drawing/2017/decorative" val="1"/>
+              </a:ext>
+            </a:extLst>
+          </p:cNvPr>
+          <p:cNvSpPr>
+            <a:spLocks noGrp="1" noRot="1" noChangeAspect="1" noMove="1" noResize="1" noEditPoints="1" noAdjustHandles="1" noChangeArrowheads="1" noChangeShapeType="1" noTextEdit="1"/>
+          </p:cNvSpPr>
+          <p:nvPr>
+            <p:extLst>
+              <p:ext uri="{386F3935-93C4-4BCD-93E2-E3B085C9AB24}">
+                <p16:designElem xmlns:p16="http://schemas.microsoft.com/office/powerpoint/2015/main" val="1"/>
+              </p:ext>
+            </p:extLst>
+          </p:nvPr>
+        </p:nvSpPr>
+        <p:spPr>
+          <a:xfrm rot="5400000">
+            <a:off x="759921" y="346791"/>
+            <a:ext cx="146304" cy="704088"/>
+          </a:xfrm>
+          <a:prstGeom prst="rect">
+            <a:avLst/>
+          </a:prstGeom>
+          <a:solidFill>
+            <a:schemeClr val="accent2"/>
+          </a:solidFill>
+          <a:ln>
+            <a:noFill/>
+          </a:ln>
+        </p:spPr>
+        <p:style>
+          <a:lnRef idx="2">
+            <a:schemeClr val="accent1">
+              <a:shade val="50000"/>
+            </a:schemeClr>
+          </a:lnRef>
+          <a:fillRef idx="1">
+            <a:schemeClr val="accent1"/>
+          </a:fillRef>
+          <a:effectRef idx="0">
+            <a:schemeClr val="accent1"/>
+          </a:effectRef>
+          <a:fontRef idx="minor">
+            <a:schemeClr val="lt1"/>
+          </a:fontRef>
+        </p:style>
+        <p:txBody>
+          <a:bodyPr rtlCol="0" anchor="ctr"/>
+          <a:lstStyle/>
+          <a:p>
+            <a:pPr marL="0" marR="0" lvl="0" indent="0" algn="ctr" defTabSz="914400" rtl="0" eaLnBrk="1" fontAlgn="auto" latinLnBrk="0" hangingPunct="1">
+              <a:lnSpc>
+                <a:spcPct val="100000"/>
+              </a:lnSpc>
+              <a:spcBef>
+                <a:spcPts val="0"/>
+              </a:spcBef>
+              <a:spcAft>
+                <a:spcPts val="0"/>
+              </a:spcAft>
+              <a:buClrTx/>
+              <a:buSzTx/>
+              <a:buFontTx/>
+              <a:buNone/>
+              <a:tabLst/>
+              <a:defRPr/>
+            </a:pPr>
+            <a:endParaRPr kumimoji="0" lang="en-US" sz="1800" b="0" i="0" u="none" strike="noStrike" kern="1200" cap="none" spc="0" normalizeH="0" baseline="0" noProof="0">
+              <a:ln>
+                <a:noFill/>
+              </a:ln>
+              <a:solidFill>
+                <a:prstClr val="white"/>
+              </a:solidFill>
+              <a:effectLst/>
+              <a:uLnTx/>
+              <a:uFillTx/>
+              <a:latin typeface="Calibri" panose="020F0502020204030204"/>
+              <a:ea typeface="+mn-ea"/>
+              <a:cs typeface="+mn-cs"/>
+            </a:endParaRPr>
+          </a:p>
+        </p:txBody>
+      </p:sp>
+      <p:sp>
+        <p:nvSpPr>
+          <p:cNvPr id="5139" name="Rectangle 5138">
+            <a:extLst>
+              <a:ext uri="{FF2B5EF4-FFF2-40B4-BE49-F238E27FC236}">
+                <a16:creationId xmlns:a16="http://schemas.microsoft.com/office/drawing/2014/main" id="{08C9B587-E65E-4B52-B37C-ABEBB6E87928}"/>
+              </a:ext>
+              <a:ext uri="{C183D7F6-B498-43B3-948B-1728B52AA6E4}">
+                <adec:decorative xmlns:adec="http://schemas.microsoft.com/office/drawing/2017/decorative" val="1"/>
+              </a:ext>
+            </a:extLst>
+          </p:cNvPr>
+          <p:cNvSpPr>
+            <a:spLocks noGrp="1" noRot="1" noChangeAspect="1" noMove="1" noResize="1" noEditPoints="1" noAdjustHandles="1" noChangeArrowheads="1" noChangeShapeType="1" noTextEdit="1"/>
+          </p:cNvSpPr>
+          <p:nvPr>
+            <p:extLst>
+              <p:ext uri="{386F3935-93C4-4BCD-93E2-E3B085C9AB24}">
+                <p16:designElem xmlns:p16="http://schemas.microsoft.com/office/powerpoint/2015/main" val="1"/>
+              </p:ext>
+            </p:extLst>
+          </p:nvPr>
+        </p:nvSpPr>
+        <p:spPr>
+          <a:xfrm>
+            <a:off x="481029" y="4546920"/>
+            <a:ext cx="4023360" cy="18288"/>
+          </a:xfrm>
+          <a:prstGeom prst="rect">
+            <a:avLst/>
+          </a:prstGeom>
+          <a:solidFill>
+            <a:srgbClr val="D5D5D5"/>
+          </a:solidFill>
+          <a:ln w="3175">
+            <a:noFill/>
+          </a:ln>
+          <a:effectLst/>
+        </p:spPr>
+        <p:style>
+          <a:lnRef idx="2">
+            <a:schemeClr val="accent1">
+              <a:shade val="50000"/>
+            </a:schemeClr>
+          </a:lnRef>
+          <a:fillRef idx="1">
+            <a:schemeClr val="accent1"/>
+          </a:fillRef>
+          <a:effectRef idx="0">
+            <a:schemeClr val="accent1"/>
+          </a:effectRef>
+          <a:fontRef idx="minor">
+            <a:schemeClr val="lt1"/>
+          </a:fontRef>
+        </p:style>
+        <p:txBody>
+          <a:bodyPr rtlCol="0" anchor="ctr"/>
+          <a:lstStyle/>
+          <a:p>
+            <a:pPr algn="ctr"/>
+            <a:endParaRPr lang="en-US">
+              <a:solidFill>
+                <a:prstClr val="white"/>
+              </a:solidFill>
+              <a:latin typeface="Calibri" panose="020F0502020204030204"/>
+            </a:endParaRPr>
+          </a:p>
+        </p:txBody>
+      </p:sp>
+      <p:pic>
+        <p:nvPicPr>
+          <p:cNvPr id="5121" name="Picture 1" descr="HTN &#10;esophegeal reflux &#10;acute respiratory failure &#10;atrial fibrillation &#10;coronary atherosclerosis &#10;type 2 DM without comp &#10;UTI &#10;acute kidney failure &#10;congestive heart failure u &#10;unspecified HTN &#10;hyperlipidemia &#10;orignial &#10;53081 &#10;51881 &#10;42731 &#10;41401 &#10;25000 &#10;5990 &#10;5849 &#10;4280 &#10;4019 &#10;2724 &#10;outcome &#10;1 &#10;2 &#10;3 &#10;4 &#10;5 &#10;6 &#10;7 &#10;8 &#10;9 &#10;10 &#10;11 ">
+            <a:extLst>
+              <a:ext uri="{FF2B5EF4-FFF2-40B4-BE49-F238E27FC236}">
+                <a16:creationId xmlns:a16="http://schemas.microsoft.com/office/drawing/2014/main" id="{0E098AE9-8AA4-2F11-0812-4EC3E7D5BBE7}"/>
+              </a:ext>
+            </a:extLst>
+          </p:cNvPr>
+          <p:cNvPicPr>
+            <a:picLocks noChangeAspect="1" noChangeArrowheads="1"/>
+          </p:cNvPicPr>
+          <p:nvPr/>
+        </p:nvPicPr>
+        <p:blipFill rotWithShape="1">
+          <a:blip r:embed="rId2">
+            <a:extLst>
+              <a:ext uri="{28A0092B-C50C-407E-A947-70E740481C1C}">
+                <a14:useLocalDpi xmlns:a14="http://schemas.microsoft.com/office/drawing/2010/main" val="0"/>
+              </a:ext>
+            </a:extLst>
+          </a:blip>
+          <a:srcRect l="1331" r="23955"/>
+          <a:stretch/>
+        </p:blipFill>
+        <p:spPr bwMode="auto">
+          <a:xfrm>
+            <a:off x="5702993" y="625683"/>
+            <a:ext cx="5169593" cy="5455380"/>
+          </a:xfrm>
+          <a:prstGeom prst="rect">
+            <a:avLst/>
+          </a:prstGeom>
+          <a:noFill/>
+          <a:extLst>
+            <a:ext uri="{909E8E84-426E-40DD-AFC4-6F175D3DCCD1}">
+              <a14:hiddenFill xmlns:a14="http://schemas.microsoft.com/office/drawing/2010/main">
+                <a:solidFill>
+                  <a:srgbClr val="FFFFFF"/>
+                </a:solidFill>
+              </a14:hiddenFill>
+            </a:ext>
+          </a:extLst>
+        </p:spPr>
+      </p:pic>
+    </p:spTree>
+    <p:extLst>
+      <p:ext uri="{BB962C8B-B14F-4D97-AF65-F5344CB8AC3E}">
+        <p14:creationId xmlns:p14="http://schemas.microsoft.com/office/powerpoint/2010/main" val="2701716090"/>
       </p:ext>
     </p:extLst>
   </p:cSld>
@@ -7174,7 +8633,7 @@
           <a:p>
             <a:r>
               <a:rPr lang="en-GB" dirty="0"/>
-              <a:t>Future work and limitations</a:t>
+              <a:t>Results</a:t>
             </a:r>
           </a:p>
         </p:txBody>
@@ -7197,65 +8656,84 @@
         </p:nvSpPr>
         <p:spPr/>
         <p:txBody>
-          <a:bodyPr/>
-          <a:lstStyle/>
+          <a:bodyPr>
+            <a:normAutofit fontScale="92500" lnSpcReduction="20000"/>
+          </a:bodyPr>
+          <a:lstStyle/>
+          <a:p>
+            <a:r>
+              <a:rPr lang="en-US" b="0" i="0" dirty="0">
+                <a:solidFill>
+                  <a:srgbClr val="3D3929"/>
+                </a:solidFill>
+                <a:effectLst/>
+                <a:latin typeface="__styreneB_5d855b"/>
+              </a:rPr>
+              <a:t>learning curves of the classification models of different diagnoses varied significantly, despite them using the same underlying preprocessing methods and models. </a:t>
+            </a:r>
+          </a:p>
           <a:p>
             <a:r>
               <a:rPr lang="en-US" dirty="0"/>
-              <a:t>Ongoing analysis of text properties underlying learning curve differences </a:t>
-            </a:r>
-          </a:p>
+              <a:t>Vocabulary complexity analysis inconclusive in explaining differences</a:t>
+            </a:r>
+          </a:p>
+          <a:p>
+            <a:r>
+              <a:rPr lang="en-US" b="0" i="0" dirty="0">
+                <a:solidFill>
+                  <a:srgbClr val="3D3929"/>
+                </a:solidFill>
+                <a:effectLst/>
+                <a:latin typeface="__styreneB_5d855b"/>
+              </a:rPr>
+              <a:t>Half of the modelled outcomes did not reach accuracy of 0.70 or above even with the 10,800 documents (the maximum training size in the experiments).</a:t>
+            </a:r>
+            <a:endParaRPr lang="en-GB" dirty="0"/>
+          </a:p>
+        </p:txBody>
+      </p:sp>
+      <p:sp>
+        <p:nvSpPr>
+          <p:cNvPr id="4" name="Content Placeholder 3">
+            <a:extLst>
+              <a:ext uri="{FF2B5EF4-FFF2-40B4-BE49-F238E27FC236}">
+                <a16:creationId xmlns:a16="http://schemas.microsoft.com/office/drawing/2014/main" id="{352B026B-36D8-C7F5-EF24-AB17CD257FE1}"/>
+              </a:ext>
+            </a:extLst>
+          </p:cNvPr>
+          <p:cNvSpPr>
+            <a:spLocks noGrp="1"/>
+          </p:cNvSpPr>
+          <p:nvPr>
+            <p:ph sz="half" idx="2"/>
+          </p:nvPr>
+        </p:nvSpPr>
+        <p:spPr/>
+        <p:txBody>
+          <a:bodyPr>
+            <a:normAutofit fontScale="92500" lnSpcReduction="20000"/>
+          </a:bodyPr>
+          <a:lstStyle/>
           <a:p>
             <a:r>
               <a:rPr lang="en-US" dirty="0"/>
-              <a:t>Exploring key word frequencies and distances in LLM document representations </a:t>
+              <a:t>Performance plateaued at sample sizes between 1,000-5,000 documents</a:t>
             </a:r>
           </a:p>
           <a:p>
             <a:r>
               <a:rPr lang="en-US" dirty="0"/>
-              <a:t>Modern generative methods for increasing training data not explored (out of scope)</a:t>
+              <a:t>For 10 out of 11 diagnoses, n=600 achieved 95% of performance possible with n=10,000</a:t>
             </a:r>
             <a:endParaRPr lang="en-GB" dirty="0"/>
-          </a:p>
-        </p:txBody>
-      </p:sp>
-      <p:sp>
-        <p:nvSpPr>
-          <p:cNvPr id="4" name="Content Placeholder 3">
-            <a:extLst>
-              <a:ext uri="{FF2B5EF4-FFF2-40B4-BE49-F238E27FC236}">
-                <a16:creationId xmlns:a16="http://schemas.microsoft.com/office/drawing/2014/main" id="{352B026B-36D8-C7F5-EF24-AB17CD257FE1}"/>
-              </a:ext>
-            </a:extLst>
-          </p:cNvPr>
-          <p:cNvSpPr>
-            <a:spLocks noGrp="1"/>
-          </p:cNvSpPr>
-          <p:nvPr>
-            <p:ph sz="half" idx="2"/>
-          </p:nvPr>
-        </p:nvSpPr>
-        <p:spPr/>
-        <p:txBody>
-          <a:bodyPr/>
-          <a:lstStyle/>
-          <a:p>
-            <a:pPr>
-              <a:buFont typeface="Arial" panose="020B0604020202020204" pitchFamily="34" charset="0"/>
-              <a:buChar char="•"/>
-            </a:pPr>
-            <a:r>
-              <a:rPr lang="en-US" dirty="0"/>
-              <a:t>Future directions to investigate more sophisticated text analysis techniques</a:t>
-            </a:r>
           </a:p>
         </p:txBody>
       </p:sp>
     </p:spTree>
     <p:extLst>
       <p:ext uri="{BB962C8B-B14F-4D97-AF65-F5344CB8AC3E}">
-        <p14:creationId xmlns:p14="http://schemas.microsoft.com/office/powerpoint/2010/main" val="3954035274"/>
+        <p14:creationId xmlns:p14="http://schemas.microsoft.com/office/powerpoint/2010/main" val="1109732945"/>
       </p:ext>
     </p:extLst>
   </p:cSld>
@@ -7266,6 +8744,162 @@
 </file>
 
 <file path=ppt/slides/slide15.xml><?xml version="1.0" encoding="utf-8"?>
+<p:sld xmlns:a="http://schemas.openxmlformats.org/drawingml/2006/main" xmlns:r="http://schemas.openxmlformats.org/officeDocument/2006/relationships" xmlns:p="http://schemas.openxmlformats.org/presentationml/2006/main">
+  <p:cSld>
+    <p:spTree>
+      <p:nvGrpSpPr>
+        <p:cNvPr id="1" name="">
+          <a:extLst>
+            <a:ext uri="{FF2B5EF4-FFF2-40B4-BE49-F238E27FC236}">
+              <a16:creationId xmlns:a16="http://schemas.microsoft.com/office/drawing/2014/main" id="{2DF6B459-295B-34CD-9FDA-730841D070E8}"/>
+            </a:ext>
+          </a:extLst>
+        </p:cNvPr>
+        <p:cNvGrpSpPr/>
+        <p:nvPr/>
+      </p:nvGrpSpPr>
+      <p:grpSpPr>
+        <a:xfrm>
+          <a:off x="0" y="0"/>
+          <a:ext cx="0" cy="0"/>
+          <a:chOff x="0" y="0"/>
+          <a:chExt cx="0" cy="0"/>
+        </a:xfrm>
+      </p:grpSpPr>
+      <p:sp>
+        <p:nvSpPr>
+          <p:cNvPr id="2" name="Title 1">
+            <a:extLst>
+              <a:ext uri="{FF2B5EF4-FFF2-40B4-BE49-F238E27FC236}">
+                <a16:creationId xmlns:a16="http://schemas.microsoft.com/office/drawing/2014/main" id="{E5975903-F488-20CB-D9E8-958BA7370BD5}"/>
+              </a:ext>
+            </a:extLst>
+          </p:cNvPr>
+          <p:cNvSpPr>
+            <a:spLocks noGrp="1"/>
+          </p:cNvSpPr>
+          <p:nvPr>
+            <p:ph type="title"/>
+          </p:nvPr>
+        </p:nvSpPr>
+        <p:spPr/>
+        <p:txBody>
+          <a:bodyPr/>
+          <a:lstStyle/>
+          <a:p>
+            <a:r>
+              <a:rPr lang="en-GB" dirty="0"/>
+              <a:t>Results</a:t>
+            </a:r>
+          </a:p>
+        </p:txBody>
+      </p:sp>
+      <p:sp>
+        <p:nvSpPr>
+          <p:cNvPr id="3" name="Content Placeholder 2">
+            <a:extLst>
+              <a:ext uri="{FF2B5EF4-FFF2-40B4-BE49-F238E27FC236}">
+                <a16:creationId xmlns:a16="http://schemas.microsoft.com/office/drawing/2014/main" id="{DBF7124B-5027-42F1-D078-0A80DA5882BC}"/>
+              </a:ext>
+            </a:extLst>
+          </p:cNvPr>
+          <p:cNvSpPr>
+            <a:spLocks noGrp="1"/>
+          </p:cNvSpPr>
+          <p:nvPr>
+            <p:ph sz="half" idx="1"/>
+          </p:nvPr>
+        </p:nvSpPr>
+        <p:spPr/>
+        <p:txBody>
+          <a:bodyPr>
+            <a:normAutofit/>
+          </a:bodyPr>
+          <a:lstStyle/>
+          <a:p>
+            <a:r>
+              <a:rPr lang="en-US" dirty="0"/>
+              <a:t>'Original' dataset showed unusually steep learning curve (outlier)</a:t>
+            </a:r>
+          </a:p>
+          <a:p>
+            <a:r>
+              <a:rPr lang="en-US" dirty="0"/>
+              <a:t>Less noisy texts consistently showed strong predictors</a:t>
+            </a:r>
+          </a:p>
+          <a:p>
+            <a:r>
+              <a:rPr lang="en-US" dirty="0"/>
+              <a:t>Clear pattern of more strong predictors and fewer noisy predictors associated with higher AUC-max</a:t>
+            </a:r>
+            <a:endParaRPr lang="en-GB" dirty="0"/>
+          </a:p>
+        </p:txBody>
+      </p:sp>
+      <p:sp>
+        <p:nvSpPr>
+          <p:cNvPr id="4" name="Content Placeholder 3">
+            <a:extLst>
+              <a:ext uri="{FF2B5EF4-FFF2-40B4-BE49-F238E27FC236}">
+                <a16:creationId xmlns:a16="http://schemas.microsoft.com/office/drawing/2014/main" id="{A235880F-D127-C926-F762-CB0554BE6B91}"/>
+              </a:ext>
+            </a:extLst>
+          </p:cNvPr>
+          <p:cNvSpPr>
+            <a:spLocks noGrp="1"/>
+          </p:cNvSpPr>
+          <p:nvPr>
+            <p:ph sz="half" idx="2"/>
+          </p:nvPr>
+        </p:nvSpPr>
+        <p:spPr/>
+        <p:txBody>
+          <a:bodyPr>
+            <a:normAutofit/>
+          </a:bodyPr>
+          <a:lstStyle/>
+          <a:p>
+            <a:r>
+              <a:rPr lang="en-US" b="0" i="0" dirty="0">
+                <a:solidFill>
+                  <a:srgbClr val="3D3929"/>
+                </a:solidFill>
+                <a:effectLst/>
+                <a:latin typeface="__styreneB_5d855b"/>
+              </a:rPr>
+              <a:t>an increase of 100 noisy words corresponds to a decrease of approximately 0.02 in AUC-max</a:t>
+            </a:r>
+          </a:p>
+          <a:p>
+            <a:r>
+              <a:rPr lang="en-US" b="0" i="0" dirty="0">
+                <a:solidFill>
+                  <a:srgbClr val="3D3929"/>
+                </a:solidFill>
+                <a:effectLst/>
+                <a:latin typeface="__styreneB_5d855b"/>
+              </a:rPr>
+              <a:t>an increase of 100 strong predictors corresponds to an increase of approximately 0.04 in AUC-max.</a:t>
+            </a:r>
+            <a:endParaRPr lang="en-GB" dirty="0"/>
+          </a:p>
+        </p:txBody>
+      </p:sp>
+    </p:spTree>
+    <p:extLst>
+      <p:ext uri="{BB962C8B-B14F-4D97-AF65-F5344CB8AC3E}">
+        <p14:creationId xmlns:p14="http://schemas.microsoft.com/office/powerpoint/2010/main" val="4198482480"/>
+      </p:ext>
+    </p:extLst>
+  </p:cSld>
+  <p:clrMapOvr>
+    <a:masterClrMapping/>
+  </p:clrMapOvr>
+</p:sld>
+</file>
+
+<file path=ppt/slides/slide16.xml><?xml version="1.0" encoding="utf-8"?>
 <p:sld xmlns:a="http://schemas.openxmlformats.org/drawingml/2006/main" xmlns:r="http://schemas.openxmlformats.org/officeDocument/2006/relationships" xmlns:p="http://schemas.openxmlformats.org/presentationml/2006/main">
   <p:cSld>
     <p:spTree>
@@ -7305,6 +8939,274 @@
           <a:p>
             <a:r>
               <a:rPr lang="en-GB" dirty="0"/>
+              <a:t>Implications</a:t>
+            </a:r>
+          </a:p>
+        </p:txBody>
+      </p:sp>
+      <p:sp>
+        <p:nvSpPr>
+          <p:cNvPr id="3" name="Content Placeholder 2">
+            <a:extLst>
+              <a:ext uri="{FF2B5EF4-FFF2-40B4-BE49-F238E27FC236}">
+                <a16:creationId xmlns:a16="http://schemas.microsoft.com/office/drawing/2014/main" id="{AA03AE5F-BDF5-D7CE-D99E-1D1ADC825F33}"/>
+              </a:ext>
+            </a:extLst>
+          </p:cNvPr>
+          <p:cNvSpPr>
+            <a:spLocks noGrp="1"/>
+          </p:cNvSpPr>
+          <p:nvPr>
+            <p:ph sz="half" idx="1"/>
+          </p:nvPr>
+        </p:nvSpPr>
+        <p:spPr/>
+        <p:txBody>
+          <a:bodyPr>
+            <a:normAutofit fontScale="85000" lnSpcReduction="10000"/>
+          </a:bodyPr>
+          <a:lstStyle/>
+          <a:p>
+            <a:r>
+              <a:rPr lang="en-US" dirty="0"/>
+              <a:t>Simple keyword analysis can indicate learning curve steepness </a:t>
+            </a:r>
+          </a:p>
+          <a:p>
+            <a:r>
+              <a:rPr lang="en-US" dirty="0"/>
+              <a:t>Data cleaning techniques focusing on relevant document parts can significantly impact performance </a:t>
+            </a:r>
+          </a:p>
+          <a:p>
+            <a:r>
+              <a:rPr lang="en-US" dirty="0"/>
+              <a:t>Understanding predictor-noise-AUC relationship can guide optimal sample size decisions </a:t>
+            </a:r>
+          </a:p>
+          <a:p>
+            <a:r>
+              <a:rPr lang="en-US" dirty="0"/>
+              <a:t>Quantitative guidelines can estimate potential improvements from data cleaning or additional data</a:t>
+            </a:r>
+            <a:endParaRPr lang="en-GB" dirty="0"/>
+          </a:p>
+        </p:txBody>
+      </p:sp>
+      <p:sp>
+        <p:nvSpPr>
+          <p:cNvPr id="4" name="Content Placeholder 3">
+            <a:extLst>
+              <a:ext uri="{FF2B5EF4-FFF2-40B4-BE49-F238E27FC236}">
+                <a16:creationId xmlns:a16="http://schemas.microsoft.com/office/drawing/2014/main" id="{352B026B-36D8-C7F5-EF24-AB17CD257FE1}"/>
+              </a:ext>
+            </a:extLst>
+          </p:cNvPr>
+          <p:cNvSpPr>
+            <a:spLocks noGrp="1"/>
+          </p:cNvSpPr>
+          <p:nvPr>
+            <p:ph sz="half" idx="2"/>
+          </p:nvPr>
+        </p:nvSpPr>
+        <p:spPr/>
+        <p:txBody>
+          <a:bodyPr>
+            <a:normAutofit fontScale="85000" lnSpcReduction="10000"/>
+          </a:bodyPr>
+          <a:lstStyle/>
+          <a:p>
+            <a:r>
+              <a:rPr lang="en-GB" dirty="0"/>
+              <a:t>Pics / diagrams</a:t>
+            </a:r>
+          </a:p>
+        </p:txBody>
+      </p:sp>
+    </p:spTree>
+    <p:extLst>
+      <p:ext uri="{BB962C8B-B14F-4D97-AF65-F5344CB8AC3E}">
+        <p14:creationId xmlns:p14="http://schemas.microsoft.com/office/powerpoint/2010/main" val="4144772600"/>
+      </p:ext>
+    </p:extLst>
+  </p:cSld>
+  <p:clrMapOvr>
+    <a:masterClrMapping/>
+  </p:clrMapOvr>
+</p:sld>
+</file>
+
+<file path=ppt/slides/slide17.xml><?xml version="1.0" encoding="utf-8"?>
+<p:sld xmlns:a="http://schemas.openxmlformats.org/drawingml/2006/main" xmlns:r="http://schemas.openxmlformats.org/officeDocument/2006/relationships" xmlns:p="http://schemas.openxmlformats.org/presentationml/2006/main">
+  <p:cSld>
+    <p:spTree>
+      <p:nvGrpSpPr>
+        <p:cNvPr id="1" name=""/>
+        <p:cNvGrpSpPr/>
+        <p:nvPr/>
+      </p:nvGrpSpPr>
+      <p:grpSpPr>
+        <a:xfrm>
+          <a:off x="0" y="0"/>
+          <a:ext cx="0" cy="0"/>
+          <a:chOff x="0" y="0"/>
+          <a:chExt cx="0" cy="0"/>
+        </a:xfrm>
+      </p:grpSpPr>
+      <p:sp>
+        <p:nvSpPr>
+          <p:cNvPr id="2" name="Title 1">
+            <a:extLst>
+              <a:ext uri="{FF2B5EF4-FFF2-40B4-BE49-F238E27FC236}">
+                <a16:creationId xmlns:a16="http://schemas.microsoft.com/office/drawing/2014/main" id="{355A15E5-8BCB-9CDA-A766-382FABDFE98F}"/>
+              </a:ext>
+            </a:extLst>
+          </p:cNvPr>
+          <p:cNvSpPr>
+            <a:spLocks noGrp="1"/>
+          </p:cNvSpPr>
+          <p:nvPr>
+            <p:ph type="title"/>
+          </p:nvPr>
+        </p:nvSpPr>
+        <p:spPr/>
+        <p:txBody>
+          <a:bodyPr/>
+          <a:lstStyle/>
+          <a:p>
+            <a:r>
+              <a:rPr lang="en-GB" dirty="0"/>
+              <a:t>Future work and limitations</a:t>
+            </a:r>
+          </a:p>
+        </p:txBody>
+      </p:sp>
+      <p:sp>
+        <p:nvSpPr>
+          <p:cNvPr id="3" name="Content Placeholder 2">
+            <a:extLst>
+              <a:ext uri="{FF2B5EF4-FFF2-40B4-BE49-F238E27FC236}">
+                <a16:creationId xmlns:a16="http://schemas.microsoft.com/office/drawing/2014/main" id="{AA03AE5F-BDF5-D7CE-D99E-1D1ADC825F33}"/>
+              </a:ext>
+            </a:extLst>
+          </p:cNvPr>
+          <p:cNvSpPr>
+            <a:spLocks noGrp="1"/>
+          </p:cNvSpPr>
+          <p:nvPr>
+            <p:ph sz="half" idx="1"/>
+          </p:nvPr>
+        </p:nvSpPr>
+        <p:spPr/>
+        <p:txBody>
+          <a:bodyPr/>
+          <a:lstStyle/>
+          <a:p>
+            <a:r>
+              <a:rPr lang="en-US" dirty="0"/>
+              <a:t>Ongoing analysis of text properties underlying learning curve differences </a:t>
+            </a:r>
+          </a:p>
+          <a:p>
+            <a:r>
+              <a:rPr lang="en-US" dirty="0"/>
+              <a:t>Exploring key word frequencies and distances in LLM document representations </a:t>
+            </a:r>
+          </a:p>
+          <a:p>
+            <a:r>
+              <a:rPr lang="en-US" dirty="0"/>
+              <a:t>Modern generative methods for increasing training data not explored (out of scope)</a:t>
+            </a:r>
+            <a:endParaRPr lang="en-GB" dirty="0"/>
+          </a:p>
+        </p:txBody>
+      </p:sp>
+      <p:sp>
+        <p:nvSpPr>
+          <p:cNvPr id="4" name="Content Placeholder 3">
+            <a:extLst>
+              <a:ext uri="{FF2B5EF4-FFF2-40B4-BE49-F238E27FC236}">
+                <a16:creationId xmlns:a16="http://schemas.microsoft.com/office/drawing/2014/main" id="{352B026B-36D8-C7F5-EF24-AB17CD257FE1}"/>
+              </a:ext>
+            </a:extLst>
+          </p:cNvPr>
+          <p:cNvSpPr>
+            <a:spLocks noGrp="1"/>
+          </p:cNvSpPr>
+          <p:nvPr>
+            <p:ph sz="half" idx="2"/>
+          </p:nvPr>
+        </p:nvSpPr>
+        <p:spPr/>
+        <p:txBody>
+          <a:bodyPr/>
+          <a:lstStyle/>
+          <a:p>
+            <a:pPr>
+              <a:buFont typeface="Arial" panose="020B0604020202020204" pitchFamily="34" charset="0"/>
+              <a:buChar char="•"/>
+            </a:pPr>
+            <a:r>
+              <a:rPr lang="en-US" dirty="0"/>
+              <a:t>Future directions to investigate more sophisticated text analysis techniques</a:t>
+            </a:r>
+          </a:p>
+        </p:txBody>
+      </p:sp>
+    </p:spTree>
+    <p:extLst>
+      <p:ext uri="{BB962C8B-B14F-4D97-AF65-F5344CB8AC3E}">
+        <p14:creationId xmlns:p14="http://schemas.microsoft.com/office/powerpoint/2010/main" val="3954035274"/>
+      </p:ext>
+    </p:extLst>
+  </p:cSld>
+  <p:clrMapOvr>
+    <a:masterClrMapping/>
+  </p:clrMapOvr>
+</p:sld>
+</file>
+
+<file path=ppt/slides/slide18.xml><?xml version="1.0" encoding="utf-8"?>
+<p:sld xmlns:a="http://schemas.openxmlformats.org/drawingml/2006/main" xmlns:r="http://schemas.openxmlformats.org/officeDocument/2006/relationships" xmlns:p="http://schemas.openxmlformats.org/presentationml/2006/main">
+  <p:cSld>
+    <p:spTree>
+      <p:nvGrpSpPr>
+        <p:cNvPr id="1" name=""/>
+        <p:cNvGrpSpPr/>
+        <p:nvPr/>
+      </p:nvGrpSpPr>
+      <p:grpSpPr>
+        <a:xfrm>
+          <a:off x="0" y="0"/>
+          <a:ext cx="0" cy="0"/>
+          <a:chOff x="0" y="0"/>
+          <a:chExt cx="0" cy="0"/>
+        </a:xfrm>
+      </p:grpSpPr>
+      <p:sp>
+        <p:nvSpPr>
+          <p:cNvPr id="2" name="Title 1">
+            <a:extLst>
+              <a:ext uri="{FF2B5EF4-FFF2-40B4-BE49-F238E27FC236}">
+                <a16:creationId xmlns:a16="http://schemas.microsoft.com/office/drawing/2014/main" id="{355A15E5-8BCB-9CDA-A766-382FABDFE98F}"/>
+              </a:ext>
+            </a:extLst>
+          </p:cNvPr>
+          <p:cNvSpPr>
+            <a:spLocks noGrp="1"/>
+          </p:cNvSpPr>
+          <p:nvPr>
+            <p:ph type="title"/>
+          </p:nvPr>
+        </p:nvSpPr>
+        <p:spPr/>
+        <p:txBody>
+          <a:bodyPr/>
+          <a:lstStyle/>
+          <a:p>
+            <a:r>
+              <a:rPr lang="en-GB" dirty="0"/>
               <a:t>Conclusions  </a:t>
             </a:r>
           </a:p>
@@ -7376,7 +9278,7 @@
 </p:sld>
 </file>
 
-<file path=ppt/slides/slide16.xml><?xml version="1.0" encoding="utf-8"?>
+<file path=ppt/slides/slide19.xml><?xml version="1.0" encoding="utf-8"?>
 <p:sld xmlns:a="http://schemas.openxmlformats.org/drawingml/2006/main" xmlns:r="http://schemas.openxmlformats.org/officeDocument/2006/relationships" xmlns:p="http://schemas.openxmlformats.org/presentationml/2006/main">
   <p:cSld>
     <p:spTree>
@@ -7483,6 +9385,277 @@
               <a:rPr lang="en-GB" dirty="0"/>
               <a:t>https://github.com/dianashams/NLP_sample_size_simulation_study</a:t>
             </a:r>
+          </a:p>
+        </p:txBody>
+      </p:sp>
+      <p:sp>
+        <p:nvSpPr>
+          <p:cNvPr id="3" name="TextBox 2">
+            <a:extLst>
+              <a:ext uri="{FF2B5EF4-FFF2-40B4-BE49-F238E27FC236}">
+                <a16:creationId xmlns:a16="http://schemas.microsoft.com/office/drawing/2014/main" id="{A54CE38C-AA39-B5FB-EE70-3E27F819F06E}"/>
+              </a:ext>
+            </a:extLst>
+          </p:cNvPr>
+          <p:cNvSpPr txBox="1"/>
+          <p:nvPr/>
+        </p:nvSpPr>
+        <p:spPr>
+          <a:xfrm>
+            <a:off x="579120" y="1691123"/>
+            <a:ext cx="11364137" cy="1477328"/>
+          </a:xfrm>
+          <a:prstGeom prst="rect">
+            <a:avLst/>
+          </a:prstGeom>
+          <a:noFill/>
+        </p:spPr>
+        <p:txBody>
+          <a:bodyPr wrap="none" rtlCol="0">
+            <a:spAutoFit/>
+          </a:bodyPr>
+          <a:lstStyle/>
+          <a:p>
+            <a:pPr algn="l"/>
+            <a:r>
+              <a:rPr lang="en-US" b="0" i="0" dirty="0">
+                <a:solidFill>
+                  <a:srgbClr val="1F2328"/>
+                </a:solidFill>
+                <a:effectLst/>
+                <a:latin typeface="-apple-system"/>
+              </a:rPr>
+              <a:t>Diana Shamsutdinova</a:t>
+            </a:r>
+            <a:r>
+              <a:rPr lang="en-US" b="0" i="0" baseline="30000" dirty="0">
+                <a:solidFill>
+                  <a:srgbClr val="1F2328"/>
+                </a:solidFill>
+                <a:effectLst/>
+                <a:latin typeface="-apple-system"/>
+              </a:rPr>
+              <a:t>1</a:t>
+            </a:r>
+            <a:r>
+              <a:rPr lang="en-US" b="0" i="0" dirty="0">
+                <a:solidFill>
+                  <a:srgbClr val="1F2328"/>
+                </a:solidFill>
+                <a:effectLst/>
+                <a:latin typeface="-apple-system"/>
+              </a:rPr>
+              <a:t>, Jaya Chaturvedi</a:t>
+            </a:r>
+            <a:r>
+              <a:rPr lang="en-US" b="0" i="0" baseline="30000" dirty="0">
+                <a:solidFill>
+                  <a:srgbClr val="1F2328"/>
+                </a:solidFill>
+                <a:effectLst/>
+                <a:latin typeface="-apple-system"/>
+              </a:rPr>
+              <a:t>1</a:t>
+            </a:r>
+            <a:r>
+              <a:rPr lang="en-US" b="0" i="0" dirty="0">
+                <a:solidFill>
+                  <a:srgbClr val="1F2328"/>
+                </a:solidFill>
+                <a:effectLst/>
+                <a:latin typeface="-apple-system"/>
+              </a:rPr>
+              <a:t>, Saniya Desphande</a:t>
+            </a:r>
+            <a:r>
+              <a:rPr lang="en-US" b="0" i="0" baseline="30000" dirty="0">
+                <a:solidFill>
+                  <a:srgbClr val="1F2328"/>
+                </a:solidFill>
+                <a:effectLst/>
+                <a:latin typeface="-apple-system"/>
+              </a:rPr>
+              <a:t>1</a:t>
+            </a:r>
+            <a:r>
+              <a:rPr lang="en-US" b="0" i="0" dirty="0">
+                <a:solidFill>
+                  <a:srgbClr val="1F2328"/>
+                </a:solidFill>
+                <a:effectLst/>
+                <a:latin typeface="-apple-system"/>
+              </a:rPr>
+              <a:t>, </a:t>
+            </a:r>
+            <a:r>
+              <a:rPr lang="en-US" b="0" i="0" dirty="0" err="1">
+                <a:solidFill>
+                  <a:srgbClr val="1F2328"/>
+                </a:solidFill>
+                <a:effectLst/>
+                <a:latin typeface="-apple-system"/>
+              </a:rPr>
+              <a:t>Chankai</a:t>
+            </a:r>
+            <a:r>
+              <a:rPr lang="en-US" b="0" i="0" dirty="0">
+                <a:solidFill>
+                  <a:srgbClr val="1F2328"/>
+                </a:solidFill>
+                <a:effectLst/>
+                <a:latin typeface="-apple-system"/>
+              </a:rPr>
+              <a:t> Ma</a:t>
+            </a:r>
+            <a:r>
+              <a:rPr lang="en-US" b="0" i="0" baseline="30000" dirty="0">
+                <a:solidFill>
+                  <a:srgbClr val="1F2328"/>
+                </a:solidFill>
+                <a:effectLst/>
+                <a:latin typeface="-apple-system"/>
+              </a:rPr>
+              <a:t>3</a:t>
+            </a:r>
+            <a:r>
+              <a:rPr lang="en-US" b="0" i="0" dirty="0">
+                <a:solidFill>
+                  <a:srgbClr val="1F2328"/>
+                </a:solidFill>
+                <a:effectLst/>
+                <a:latin typeface="-apple-system"/>
+              </a:rPr>
+              <a:t>, Robert Cobb</a:t>
+            </a:r>
+            <a:r>
+              <a:rPr lang="en-US" b="0" i="0" baseline="30000" dirty="0">
+                <a:solidFill>
+                  <a:srgbClr val="1F2328"/>
+                </a:solidFill>
+                <a:effectLst/>
+                <a:latin typeface="-apple-system"/>
+              </a:rPr>
+              <a:t>3</a:t>
+            </a:r>
+            <a:r>
+              <a:rPr lang="en-US" b="0" i="0" dirty="0">
+                <a:solidFill>
+                  <a:srgbClr val="1F2328"/>
+                </a:solidFill>
+                <a:effectLst/>
+                <a:latin typeface="-apple-system"/>
+              </a:rPr>
+              <a:t>, Angus Roberts</a:t>
+            </a:r>
+            <a:r>
+              <a:rPr lang="en-US" b="0" i="0" baseline="30000" dirty="0">
+                <a:solidFill>
+                  <a:srgbClr val="1F2328"/>
+                </a:solidFill>
+                <a:effectLst/>
+                <a:latin typeface="-apple-system"/>
+              </a:rPr>
+              <a:t>1</a:t>
+            </a:r>
+            <a:r>
+              <a:rPr lang="en-US" b="0" i="0" dirty="0">
+                <a:solidFill>
+                  <a:srgbClr val="1F2328"/>
+                </a:solidFill>
+                <a:effectLst/>
+                <a:latin typeface="-apple-system"/>
+              </a:rPr>
+              <a:t>, Daniel Stahl</a:t>
+            </a:r>
+            <a:r>
+              <a:rPr lang="en-US" b="0" i="0" baseline="30000" dirty="0">
+                <a:solidFill>
+                  <a:srgbClr val="1F2328"/>
+                </a:solidFill>
+                <a:effectLst/>
+                <a:latin typeface="-apple-system"/>
+              </a:rPr>
+              <a:t>1</a:t>
+            </a:r>
+            <a:endParaRPr lang="en-US" b="0" i="0" dirty="0">
+              <a:solidFill>
+                <a:srgbClr val="1F2328"/>
+              </a:solidFill>
+              <a:effectLst/>
+              <a:latin typeface="-apple-system"/>
+            </a:endParaRPr>
+          </a:p>
+          <a:p>
+            <a:pPr algn="l"/>
+            <a:r>
+              <a:rPr lang="en-US" b="0" i="0" baseline="30000" dirty="0">
+                <a:solidFill>
+                  <a:srgbClr val="1F2328"/>
+                </a:solidFill>
+                <a:effectLst/>
+                <a:latin typeface="-apple-system"/>
+              </a:rPr>
+              <a:t>1</a:t>
+            </a:r>
+            <a:r>
+              <a:rPr lang="en-US" b="0" i="0" dirty="0">
+                <a:solidFill>
+                  <a:srgbClr val="1F2328"/>
+                </a:solidFill>
+                <a:effectLst/>
+                <a:latin typeface="-apple-system"/>
+              </a:rPr>
+              <a:t>Department of Biostatistics and Health Informatics, IoPPN;</a:t>
+            </a:r>
+          </a:p>
+          <a:p>
+            <a:pPr algn="l"/>
+            <a:r>
+              <a:rPr lang="en-US" b="0" i="0" baseline="30000" dirty="0">
+                <a:solidFill>
+                  <a:srgbClr val="1F2328"/>
+                </a:solidFill>
+                <a:effectLst/>
+                <a:latin typeface="-apple-system"/>
+              </a:rPr>
+              <a:t>2</a:t>
+            </a:r>
+            <a:r>
+              <a:rPr lang="en-US" b="0" i="0" dirty="0">
+                <a:solidFill>
+                  <a:srgbClr val="1F2328"/>
+                </a:solidFill>
+                <a:effectLst/>
+                <a:latin typeface="-apple-system"/>
+              </a:rPr>
+              <a:t>Department of Informatics, King's College London;</a:t>
+            </a:r>
+          </a:p>
+          <a:p>
+            <a:pPr algn="l"/>
+            <a:r>
+              <a:rPr lang="en-US" b="0" i="0" baseline="30000" dirty="0">
+                <a:solidFill>
+                  <a:srgbClr val="1F2328"/>
+                </a:solidFill>
+                <a:effectLst/>
+                <a:latin typeface="-apple-system"/>
+              </a:rPr>
+              <a:t>3</a:t>
+            </a:r>
+            <a:r>
+              <a:rPr lang="en-US" b="0" i="0" dirty="0">
+                <a:solidFill>
+                  <a:srgbClr val="1F2328"/>
+                </a:solidFill>
+                <a:effectLst/>
+                <a:latin typeface="-apple-system"/>
+              </a:rPr>
+              <a:t>Department of Biomedical Engineering, King's College London</a:t>
+            </a:r>
+          </a:p>
+          <a:p>
+            <a:endParaRPr lang="en-US" dirty="0"/>
           </a:p>
         </p:txBody>
       </p:sp>
@@ -8200,138 +10373,14 @@
 <file path=ppt/slides/slide8.xml><?xml version="1.0" encoding="utf-8"?>
 <p:sld xmlns:a="http://schemas.openxmlformats.org/drawingml/2006/main" xmlns:r="http://schemas.openxmlformats.org/officeDocument/2006/relationships" xmlns:p="http://schemas.openxmlformats.org/presentationml/2006/main">
   <p:cSld>
-    <p:spTree>
-      <p:nvGrpSpPr>
-        <p:cNvPr id="1" name=""/>
-        <p:cNvGrpSpPr/>
-        <p:nvPr/>
-      </p:nvGrpSpPr>
-      <p:grpSpPr>
-        <a:xfrm>
-          <a:off x="0" y="0"/>
-          <a:ext cx="0" cy="0"/>
-          <a:chOff x="0" y="0"/>
-          <a:chExt cx="0" cy="0"/>
-        </a:xfrm>
-      </p:grpSpPr>
-      <p:sp>
-        <p:nvSpPr>
-          <p:cNvPr id="2" name="Title 1">
-            <a:extLst>
-              <a:ext uri="{FF2B5EF4-FFF2-40B4-BE49-F238E27FC236}">
-                <a16:creationId xmlns:a16="http://schemas.microsoft.com/office/drawing/2014/main" id="{355A15E5-8BCB-9CDA-A766-382FABDFE98F}"/>
-              </a:ext>
-            </a:extLst>
-          </p:cNvPr>
-          <p:cNvSpPr>
-            <a:spLocks noGrp="1"/>
-          </p:cNvSpPr>
-          <p:nvPr>
-            <p:ph type="title"/>
-          </p:nvPr>
-        </p:nvSpPr>
-        <p:spPr/>
-        <p:txBody>
-          <a:bodyPr/>
-          <a:lstStyle/>
-          <a:p>
-            <a:r>
-              <a:rPr lang="en-GB" dirty="0"/>
-              <a:t>Methods</a:t>
-            </a:r>
-          </a:p>
-        </p:txBody>
-      </p:sp>
-      <p:sp>
-        <p:nvSpPr>
-          <p:cNvPr id="3" name="Content Placeholder 2">
-            <a:extLst>
-              <a:ext uri="{FF2B5EF4-FFF2-40B4-BE49-F238E27FC236}">
-                <a16:creationId xmlns:a16="http://schemas.microsoft.com/office/drawing/2014/main" id="{AA03AE5F-BDF5-D7CE-D99E-1D1ADC825F33}"/>
-              </a:ext>
-            </a:extLst>
-          </p:cNvPr>
-          <p:cNvSpPr>
-            <a:spLocks noGrp="1"/>
-          </p:cNvSpPr>
-          <p:nvPr>
-            <p:ph sz="half" idx="1"/>
-          </p:nvPr>
-        </p:nvSpPr>
-        <p:spPr/>
-        <p:txBody>
-          <a:bodyPr/>
-          <a:lstStyle/>
-          <a:p>
-            <a:r>
-              <a:rPr lang="en-GB" dirty="0"/>
-              <a:t>Data</a:t>
-            </a:r>
-          </a:p>
-          <a:p>
-            <a:r>
-              <a:rPr lang="en-GB" dirty="0"/>
-              <a:t>Pre-processing</a:t>
-            </a:r>
-          </a:p>
-          <a:p>
-            <a:r>
-              <a:rPr lang="en-GB" dirty="0"/>
-              <a:t>Simulations and evaluation</a:t>
-            </a:r>
-          </a:p>
-          <a:p>
-            <a:r>
-              <a:rPr lang="en-GB" dirty="0"/>
-              <a:t>Models (LLMs and others)</a:t>
-            </a:r>
-          </a:p>
-        </p:txBody>
-      </p:sp>
-      <p:sp>
-        <p:nvSpPr>
-          <p:cNvPr id="4" name="Content Placeholder 3">
-            <a:extLst>
-              <a:ext uri="{FF2B5EF4-FFF2-40B4-BE49-F238E27FC236}">
-                <a16:creationId xmlns:a16="http://schemas.microsoft.com/office/drawing/2014/main" id="{352B026B-36D8-C7F5-EF24-AB17CD257FE1}"/>
-              </a:ext>
-            </a:extLst>
-          </p:cNvPr>
-          <p:cNvSpPr>
-            <a:spLocks noGrp="1"/>
-          </p:cNvSpPr>
-          <p:nvPr>
-            <p:ph sz="half" idx="2"/>
-          </p:nvPr>
-        </p:nvSpPr>
-        <p:spPr/>
-        <p:txBody>
-          <a:bodyPr/>
-          <a:lstStyle/>
-          <a:p>
-            <a:r>
-              <a:rPr lang="en-GB" dirty="0"/>
-              <a:t>Pics / diagrams</a:t>
-            </a:r>
-          </a:p>
-        </p:txBody>
-      </p:sp>
-    </p:spTree>
-    <p:extLst>
-      <p:ext uri="{BB962C8B-B14F-4D97-AF65-F5344CB8AC3E}">
-        <p14:creationId xmlns:p14="http://schemas.microsoft.com/office/powerpoint/2010/main" val="1793532753"/>
-      </p:ext>
-    </p:extLst>
-  </p:cSld>
-  <p:clrMapOvr>
-    <a:masterClrMapping/>
-  </p:clrMapOvr>
-</p:sld>
-</file>
-
-<file path=ppt/slides/slide9.xml><?xml version="1.0" encoding="utf-8"?>
-<p:sld xmlns:a="http://schemas.openxmlformats.org/drawingml/2006/main" xmlns:r="http://schemas.openxmlformats.org/officeDocument/2006/relationships" xmlns:p="http://schemas.openxmlformats.org/presentationml/2006/main">
-  <p:cSld>
+    <p:bg>
+      <p:bgPr>
+        <a:solidFill>
+          <a:schemeClr val="bg1"/>
+        </a:solidFill>
+        <a:effectLst/>
+      </p:bgPr>
+    </p:bg>
     <p:spTree>
       <p:nvGrpSpPr>
         <p:cNvPr id="1" name="">
@@ -8352,6 +10401,181 @@
           <a:chExt cx="0" cy="0"/>
         </a:xfrm>
       </p:grpSpPr>
+      <p:sp useBgFill="1">
+        <p:nvSpPr>
+          <p:cNvPr id="16" name="Rectangle 15">
+            <a:extLst>
+              <a:ext uri="{FF2B5EF4-FFF2-40B4-BE49-F238E27FC236}">
+                <a16:creationId xmlns:a16="http://schemas.microsoft.com/office/drawing/2014/main" id="{04812C46-200A-4DEB-A05E-3ED6C68C2387}"/>
+              </a:ext>
+              <a:ext uri="{C183D7F6-B498-43B3-948B-1728B52AA6E4}">
+                <adec:decorative xmlns:adec="http://schemas.microsoft.com/office/drawing/2017/decorative" val="1"/>
+              </a:ext>
+            </a:extLst>
+          </p:cNvPr>
+          <p:cNvSpPr>
+            <a:spLocks noGrp="1" noRot="1" noChangeAspect="1" noMove="1" noResize="1" noEditPoints="1" noAdjustHandles="1" noChangeArrowheads="1" noChangeShapeType="1" noTextEdit="1"/>
+          </p:cNvSpPr>
+          <p:nvPr>
+            <p:extLst>
+              <p:ext uri="{386F3935-93C4-4BCD-93E2-E3B085C9AB24}">
+                <p16:designElem xmlns:p16="http://schemas.microsoft.com/office/powerpoint/2015/main" val="1"/>
+              </p:ext>
+            </p:extLst>
+          </p:nvPr>
+        </p:nvSpPr>
+        <p:spPr>
+          <a:xfrm>
+            <a:off x="3049" y="0"/>
+            <a:ext cx="12188952" cy="6858000"/>
+          </a:xfrm>
+          <a:prstGeom prst="rect">
+            <a:avLst/>
+          </a:prstGeom>
+          <a:ln>
+            <a:noFill/>
+          </a:ln>
+        </p:spPr>
+        <p:style>
+          <a:lnRef idx="2">
+            <a:schemeClr val="accent1">
+              <a:shade val="50000"/>
+            </a:schemeClr>
+          </a:lnRef>
+          <a:fillRef idx="1">
+            <a:schemeClr val="accent1"/>
+          </a:fillRef>
+          <a:effectRef idx="0">
+            <a:schemeClr val="accent1"/>
+          </a:effectRef>
+          <a:fontRef idx="minor">
+            <a:schemeClr val="lt1"/>
+          </a:fontRef>
+        </p:style>
+        <p:txBody>
+          <a:bodyPr rtlCol="0" anchor="ctr"/>
+          <a:lstStyle/>
+          <a:p>
+            <a:pPr algn="ctr"/>
+            <a:endParaRPr lang="en-US"/>
+          </a:p>
+        </p:txBody>
+      </p:sp>
+      <p:pic>
+        <p:nvPicPr>
+          <p:cNvPr id="5" name="Picture 4" descr="Magnifying glass showing decling performance">
+            <a:extLst>
+              <a:ext uri="{FF2B5EF4-FFF2-40B4-BE49-F238E27FC236}">
+                <a16:creationId xmlns:a16="http://schemas.microsoft.com/office/drawing/2014/main" id="{70A5E30F-A5A6-19A6-ACC6-2EA5CC2BCC06}"/>
+              </a:ext>
+            </a:extLst>
+          </p:cNvPr>
+          <p:cNvPicPr>
+            <a:picLocks noChangeAspect="1"/>
+          </p:cNvPicPr>
+          <p:nvPr/>
+        </p:nvPicPr>
+        <p:blipFill>
+          <a:blip r:embed="rId3"/>
+          <a:srcRect r="5882" b="-1"/>
+          <a:stretch/>
+        </p:blipFill>
+        <p:spPr>
+          <a:xfrm>
+            <a:off x="2522356" y="10"/>
+            <a:ext cx="9669642" cy="6857990"/>
+          </a:xfrm>
+          <a:prstGeom prst="rect">
+            <a:avLst/>
+          </a:prstGeom>
+        </p:spPr>
+      </p:pic>
+      <p:sp>
+        <p:nvSpPr>
+          <p:cNvPr id="18" name="Rectangle 17">
+            <a:extLst>
+              <a:ext uri="{FF2B5EF4-FFF2-40B4-BE49-F238E27FC236}">
+                <a16:creationId xmlns:a16="http://schemas.microsoft.com/office/drawing/2014/main" id="{D1EA859B-E555-4109-94F3-6700E046E008}"/>
+              </a:ext>
+              <a:ext uri="{C183D7F6-B498-43B3-948B-1728B52AA6E4}">
+                <adec:decorative xmlns:adec="http://schemas.microsoft.com/office/drawing/2017/decorative" val="1"/>
+              </a:ext>
+            </a:extLst>
+          </p:cNvPr>
+          <p:cNvSpPr>
+            <a:spLocks noGrp="1" noRot="1" noChangeAspect="1" noMove="1" noResize="1" noEditPoints="1" noAdjustHandles="1" noChangeArrowheads="1" noChangeShapeType="1" noTextEdit="1"/>
+          </p:cNvSpPr>
+          <p:nvPr>
+            <p:extLst>
+              <p:ext uri="{386F3935-93C4-4BCD-93E2-E3B085C9AB24}">
+                <p16:designElem xmlns:p16="http://schemas.microsoft.com/office/powerpoint/2015/main" val="1"/>
+              </p:ext>
+            </p:extLst>
+          </p:nvPr>
+        </p:nvSpPr>
+        <p:spPr>
+          <a:xfrm>
+            <a:off x="-1" y="0"/>
+            <a:ext cx="7390263" cy="6858000"/>
+          </a:xfrm>
+          <a:prstGeom prst="rect">
+            <a:avLst/>
+          </a:prstGeom>
+          <a:gradFill>
+            <a:gsLst>
+              <a:gs pos="48000">
+                <a:schemeClr val="bg1"/>
+              </a:gs>
+              <a:gs pos="35000">
+                <a:schemeClr val="bg1">
+                  <a:alpha val="77000"/>
+                </a:schemeClr>
+              </a:gs>
+              <a:gs pos="19000">
+                <a:schemeClr val="bg1">
+                  <a:alpha val="38000"/>
+                </a:schemeClr>
+              </a:gs>
+              <a:gs pos="0">
+                <a:schemeClr val="bg1">
+                  <a:alpha val="0"/>
+                </a:schemeClr>
+              </a:gs>
+              <a:gs pos="100000">
+                <a:schemeClr val="bg1"/>
+              </a:gs>
+            </a:gsLst>
+            <a:lin ang="10800000" scaled="0"/>
+          </a:gradFill>
+          <a:ln>
+            <a:noFill/>
+          </a:ln>
+        </p:spPr>
+        <p:style>
+          <a:lnRef idx="2">
+            <a:schemeClr val="accent1">
+              <a:shade val="50000"/>
+            </a:schemeClr>
+          </a:lnRef>
+          <a:fillRef idx="1">
+            <a:schemeClr val="accent1"/>
+          </a:fillRef>
+          <a:effectRef idx="0">
+            <a:schemeClr val="accent1"/>
+          </a:effectRef>
+          <a:fontRef idx="minor">
+            <a:schemeClr val="lt1"/>
+          </a:fontRef>
+        </p:style>
+        <p:txBody>
+          <a:bodyPr rtlCol="0" anchor="ctr"/>
+          <a:lstStyle/>
+          <a:p>
+            <a:pPr algn="ctr"/>
+            <a:endParaRPr lang="en-US" dirty="0"/>
+          </a:p>
+        </p:txBody>
+      </p:sp>
       <p:sp>
         <p:nvSpPr>
           <p:cNvPr id="2" name="Title 1">
@@ -8368,13 +10592,20 @@
             <p:ph type="title"/>
           </p:nvPr>
         </p:nvSpPr>
-        <p:spPr/>
-        <p:txBody>
-          <a:bodyPr/>
-          <a:lstStyle/>
-          <a:p>
-            <a:r>
-              <a:rPr lang="en-GB" dirty="0"/>
+        <p:spPr>
+          <a:xfrm>
+            <a:off x="838200" y="365125"/>
+            <a:ext cx="3822189" cy="1899912"/>
+          </a:xfrm>
+        </p:spPr>
+        <p:txBody>
+          <a:bodyPr vert="horz" lIns="91440" tIns="45720" rIns="91440" bIns="45720" rtlCol="0" anchor="ctr">
+            <a:normAutofit/>
+          </a:bodyPr>
+          <a:lstStyle/>
+          <a:p>
+            <a:r>
+              <a:rPr lang="en-US" sz="4000"/>
               <a:t>Methods</a:t>
             </a:r>
           </a:p>
@@ -8396,72 +10627,45 @@
             <p:ph sz="half" idx="1"/>
           </p:nvPr>
         </p:nvSpPr>
-        <p:spPr/>
-        <p:txBody>
-          <a:bodyPr>
-            <a:normAutofit fontScale="92500"/>
+        <p:spPr>
+          <a:xfrm>
+            <a:off x="838200" y="2434201"/>
+            <a:ext cx="4754880" cy="3742762"/>
+          </a:xfrm>
+        </p:spPr>
+        <p:txBody>
+          <a:bodyPr vert="horz" lIns="91440" tIns="45720" rIns="91440" bIns="45720" rtlCol="0">
+            <a:normAutofit/>
           </a:bodyPr>
           <a:lstStyle/>
           <a:p>
             <a:r>
-              <a:rPr lang="en-GB" dirty="0"/>
+              <a:rPr lang="en-US" sz="2000" dirty="0"/>
               <a:t>Dataset used: publicly available MIMIC-III dataset</a:t>
             </a:r>
           </a:p>
           <a:p>
             <a:r>
-              <a:rPr lang="en-GB" dirty="0"/>
+              <a:rPr lang="en-US" sz="2000" dirty="0"/>
               <a:t>Pre-processing: lowercasing, remove symbols</a:t>
             </a:r>
           </a:p>
           <a:p>
             <a:r>
-              <a:rPr lang="en-GB" dirty="0"/>
+              <a:rPr lang="en-US" sz="2000" dirty="0"/>
               <a:t>Training: binary classification task to identify diagnosis code</a:t>
             </a:r>
           </a:p>
           <a:p>
             <a:r>
-              <a:rPr lang="en-US" dirty="0"/>
+              <a:rPr lang="en-US" sz="2000" dirty="0"/>
               <a:t>Varied training corpus size to investigate learning curves</a:t>
             </a:r>
-            <a:endParaRPr lang="en-GB" dirty="0"/>
-          </a:p>
-          <a:p>
-            <a:r>
-              <a:rPr lang="en-US" dirty="0"/>
+          </a:p>
+          <a:p>
+            <a:r>
+              <a:rPr lang="en-US" sz="2000" dirty="0"/>
               <a:t>Examined impact of vocabulary properties on learning curves</a:t>
-            </a:r>
-            <a:endParaRPr lang="en-GB" dirty="0"/>
-          </a:p>
-        </p:txBody>
-      </p:sp>
-      <p:sp>
-        <p:nvSpPr>
-          <p:cNvPr id="4" name="Content Placeholder 3">
-            <a:extLst>
-              <a:ext uri="{FF2B5EF4-FFF2-40B4-BE49-F238E27FC236}">
-                <a16:creationId xmlns:a16="http://schemas.microsoft.com/office/drawing/2014/main" id="{2A8C713A-956C-F5FC-4912-C2DA0C2F0FD4}"/>
-              </a:ext>
-            </a:extLst>
-          </p:cNvPr>
-          <p:cNvSpPr>
-            <a:spLocks noGrp="1"/>
-          </p:cNvSpPr>
-          <p:nvPr>
-            <p:ph sz="half" idx="2"/>
-          </p:nvPr>
-        </p:nvSpPr>
-        <p:spPr/>
-        <p:txBody>
-          <a:bodyPr>
-            <a:normAutofit fontScale="92500"/>
-          </a:bodyPr>
-          <a:lstStyle/>
-          <a:p>
-            <a:r>
-              <a:rPr lang="en-GB" dirty="0"/>
-              <a:t>Pics / diagrams</a:t>
             </a:r>
           </a:p>
         </p:txBody>
@@ -8470,6 +10674,555 @@
     <p:extLst>
       <p:ext uri="{BB962C8B-B14F-4D97-AF65-F5344CB8AC3E}">
         <p14:creationId xmlns:p14="http://schemas.microsoft.com/office/powerpoint/2010/main" val="1576291092"/>
+      </p:ext>
+    </p:extLst>
+  </p:cSld>
+  <p:clrMapOvr>
+    <a:masterClrMapping/>
+  </p:clrMapOvr>
+</p:sld>
+</file>
+
+<file path=ppt/slides/slide9.xml><?xml version="1.0" encoding="utf-8"?>
+<p:sld xmlns:a="http://schemas.openxmlformats.org/drawingml/2006/main" xmlns:r="http://schemas.openxmlformats.org/officeDocument/2006/relationships" xmlns:p="http://schemas.openxmlformats.org/presentationml/2006/main">
+  <p:cSld>
+    <p:bg>
+      <p:bgPr>
+        <a:solidFill>
+          <a:schemeClr val="bg1"/>
+        </a:solidFill>
+        <a:effectLst/>
+      </p:bgPr>
+    </p:bg>
+    <p:spTree>
+      <p:nvGrpSpPr>
+        <p:cNvPr id="1" name="">
+          <a:extLst>
+            <a:ext uri="{FF2B5EF4-FFF2-40B4-BE49-F238E27FC236}">
+              <a16:creationId xmlns:a16="http://schemas.microsoft.com/office/drawing/2014/main" id="{E1DA1596-C954-9883-C7FA-6CA2D5B4B003}"/>
+            </a:ext>
+          </a:extLst>
+        </p:cNvPr>
+        <p:cNvGrpSpPr/>
+        <p:nvPr/>
+      </p:nvGrpSpPr>
+      <p:grpSpPr>
+        <a:xfrm>
+          <a:off x="0" y="0"/>
+          <a:ext cx="0" cy="0"/>
+          <a:chOff x="0" y="0"/>
+          <a:chExt cx="0" cy="0"/>
+        </a:xfrm>
+      </p:grpSpPr>
+      <p:sp useBgFill="1">
+        <p:nvSpPr>
+          <p:cNvPr id="1046" name="Rectangle 1045">
+            <a:extLst>
+              <a:ext uri="{FF2B5EF4-FFF2-40B4-BE49-F238E27FC236}">
+                <a16:creationId xmlns:a16="http://schemas.microsoft.com/office/drawing/2014/main" id="{D3E17859-C5F0-476F-A082-A4CB8841DB24}"/>
+              </a:ext>
+              <a:ext uri="{C183D7F6-B498-43B3-948B-1728B52AA6E4}">
+                <adec:decorative xmlns:adec="http://schemas.microsoft.com/office/drawing/2017/decorative" val="1"/>
+              </a:ext>
+            </a:extLst>
+          </p:cNvPr>
+          <p:cNvSpPr>
+            <a:spLocks noGrp="1" noRot="1" noChangeAspect="1" noMove="1" noResize="1" noEditPoints="1" noAdjustHandles="1" noChangeArrowheads="1" noChangeShapeType="1" noTextEdit="1"/>
+          </p:cNvSpPr>
+          <p:nvPr>
+            <p:extLst>
+              <p:ext uri="{386F3935-93C4-4BCD-93E2-E3B085C9AB24}">
+                <p16:designElem xmlns:p16="http://schemas.microsoft.com/office/powerpoint/2015/main" val="1"/>
+              </p:ext>
+            </p:extLst>
+          </p:nvPr>
+        </p:nvSpPr>
+        <p:spPr bwMode="white">
+          <a:xfrm>
+            <a:off x="0" y="4375"/>
+            <a:ext cx="12192000" cy="6858000"/>
+          </a:xfrm>
+          <a:prstGeom prst="rect">
+            <a:avLst/>
+          </a:prstGeom>
+          <a:ln>
+            <a:noFill/>
+          </a:ln>
+        </p:spPr>
+        <p:style>
+          <a:lnRef idx="2">
+            <a:schemeClr val="accent1">
+              <a:shade val="50000"/>
+            </a:schemeClr>
+          </a:lnRef>
+          <a:fillRef idx="1">
+            <a:schemeClr val="accent1"/>
+          </a:fillRef>
+          <a:effectRef idx="0">
+            <a:schemeClr val="accent1"/>
+          </a:effectRef>
+          <a:fontRef idx="minor">
+            <a:schemeClr val="lt1"/>
+          </a:fontRef>
+        </p:style>
+        <p:txBody>
+          <a:bodyPr rtlCol="0" anchor="ctr"/>
+          <a:lstStyle>
+            <a:defPPr>
+              <a:defRPr lang="en-US"/>
+            </a:defPPr>
+            <a:lvl1pPr marL="0" algn="l" defTabSz="914400" rtl="0" eaLnBrk="1" latinLnBrk="0" hangingPunct="1">
+              <a:defRPr sz="1800" kern="1200">
+                <a:solidFill>
+                  <a:schemeClr val="lt1"/>
+                </a:solidFill>
+                <a:latin typeface="+mn-lt"/>
+                <a:ea typeface="+mn-ea"/>
+                <a:cs typeface="+mn-cs"/>
+              </a:defRPr>
+            </a:lvl1pPr>
+            <a:lvl2pPr marL="457200" algn="l" defTabSz="914400" rtl="0" eaLnBrk="1" latinLnBrk="0" hangingPunct="1">
+              <a:defRPr sz="1800" kern="1200">
+                <a:solidFill>
+                  <a:schemeClr val="lt1"/>
+                </a:solidFill>
+                <a:latin typeface="+mn-lt"/>
+                <a:ea typeface="+mn-ea"/>
+                <a:cs typeface="+mn-cs"/>
+              </a:defRPr>
+            </a:lvl2pPr>
+            <a:lvl3pPr marL="914400" algn="l" defTabSz="914400" rtl="0" eaLnBrk="1" latinLnBrk="0" hangingPunct="1">
+              <a:defRPr sz="1800" kern="1200">
+                <a:solidFill>
+                  <a:schemeClr val="lt1"/>
+                </a:solidFill>
+                <a:latin typeface="+mn-lt"/>
+                <a:ea typeface="+mn-ea"/>
+                <a:cs typeface="+mn-cs"/>
+              </a:defRPr>
+            </a:lvl3pPr>
+            <a:lvl4pPr marL="1371600" algn="l" defTabSz="914400" rtl="0" eaLnBrk="1" latinLnBrk="0" hangingPunct="1">
+              <a:defRPr sz="1800" kern="1200">
+                <a:solidFill>
+                  <a:schemeClr val="lt1"/>
+                </a:solidFill>
+                <a:latin typeface="+mn-lt"/>
+                <a:ea typeface="+mn-ea"/>
+                <a:cs typeface="+mn-cs"/>
+              </a:defRPr>
+            </a:lvl4pPr>
+            <a:lvl5pPr marL="1828800" algn="l" defTabSz="914400" rtl="0" eaLnBrk="1" latinLnBrk="0" hangingPunct="1">
+              <a:defRPr sz="1800" kern="1200">
+                <a:solidFill>
+                  <a:schemeClr val="lt1"/>
+                </a:solidFill>
+                <a:latin typeface="+mn-lt"/>
+                <a:ea typeface="+mn-ea"/>
+                <a:cs typeface="+mn-cs"/>
+              </a:defRPr>
+            </a:lvl5pPr>
+            <a:lvl6pPr marL="2286000" algn="l" defTabSz="914400" rtl="0" eaLnBrk="1" latinLnBrk="0" hangingPunct="1">
+              <a:defRPr sz="1800" kern="1200">
+                <a:solidFill>
+                  <a:schemeClr val="lt1"/>
+                </a:solidFill>
+                <a:latin typeface="+mn-lt"/>
+                <a:ea typeface="+mn-ea"/>
+                <a:cs typeface="+mn-cs"/>
+              </a:defRPr>
+            </a:lvl6pPr>
+            <a:lvl7pPr marL="2743200" algn="l" defTabSz="914400" rtl="0" eaLnBrk="1" latinLnBrk="0" hangingPunct="1">
+              <a:defRPr sz="1800" kern="1200">
+                <a:solidFill>
+                  <a:schemeClr val="lt1"/>
+                </a:solidFill>
+                <a:latin typeface="+mn-lt"/>
+                <a:ea typeface="+mn-ea"/>
+                <a:cs typeface="+mn-cs"/>
+              </a:defRPr>
+            </a:lvl7pPr>
+            <a:lvl8pPr marL="3200400" algn="l" defTabSz="914400" rtl="0" eaLnBrk="1" latinLnBrk="0" hangingPunct="1">
+              <a:defRPr sz="1800" kern="1200">
+                <a:solidFill>
+                  <a:schemeClr val="lt1"/>
+                </a:solidFill>
+                <a:latin typeface="+mn-lt"/>
+                <a:ea typeface="+mn-ea"/>
+                <a:cs typeface="+mn-cs"/>
+              </a:defRPr>
+            </a:lvl8pPr>
+            <a:lvl9pPr marL="3657600" algn="l" defTabSz="914400" rtl="0" eaLnBrk="1" latinLnBrk="0" hangingPunct="1">
+              <a:defRPr sz="1800" kern="1200">
+                <a:solidFill>
+                  <a:schemeClr val="lt1"/>
+                </a:solidFill>
+                <a:latin typeface="+mn-lt"/>
+                <a:ea typeface="+mn-ea"/>
+                <a:cs typeface="+mn-cs"/>
+              </a:defRPr>
+            </a:lvl9pPr>
+          </a:lstStyle>
+          <a:p>
+            <a:pPr algn="ctr"/>
+            <a:endParaRPr lang="en-US"/>
+          </a:p>
+        </p:txBody>
+      </p:sp>
+      <p:sp>
+        <p:nvSpPr>
+          <p:cNvPr id="2" name="Title 1">
+            <a:extLst>
+              <a:ext uri="{FF2B5EF4-FFF2-40B4-BE49-F238E27FC236}">
+                <a16:creationId xmlns:a16="http://schemas.microsoft.com/office/drawing/2014/main" id="{55DC88A7-8B45-7E8B-3C34-1DA9CD1DBAF0}"/>
+              </a:ext>
+            </a:extLst>
+          </p:cNvPr>
+          <p:cNvSpPr>
+            <a:spLocks noGrp="1"/>
+          </p:cNvSpPr>
+          <p:nvPr>
+            <p:ph type="title"/>
+          </p:nvPr>
+        </p:nvSpPr>
+        <p:spPr>
+          <a:xfrm>
+            <a:off x="838200" y="365125"/>
+            <a:ext cx="10515599" cy="1325563"/>
+          </a:xfrm>
+        </p:spPr>
+        <p:txBody>
+          <a:bodyPr vert="horz" lIns="91440" tIns="45720" rIns="91440" bIns="45720" rtlCol="0" anchor="ctr">
+            <a:normAutofit/>
+          </a:bodyPr>
+          <a:lstStyle/>
+          <a:p>
+            <a:r>
+              <a:rPr lang="en-US"/>
+              <a:t>Methods</a:t>
+            </a:r>
+          </a:p>
+        </p:txBody>
+      </p:sp>
+      <p:sp>
+        <p:nvSpPr>
+          <p:cNvPr id="3" name="Content Placeholder 2">
+            <a:extLst>
+              <a:ext uri="{FF2B5EF4-FFF2-40B4-BE49-F238E27FC236}">
+                <a16:creationId xmlns:a16="http://schemas.microsoft.com/office/drawing/2014/main" id="{DF35B0C2-FFEE-65A0-B108-03C72D8B5446}"/>
+              </a:ext>
+            </a:extLst>
+          </p:cNvPr>
+          <p:cNvSpPr>
+            <a:spLocks noGrp="1"/>
+          </p:cNvSpPr>
+          <p:nvPr>
+            <p:ph sz="half" idx="1"/>
+          </p:nvPr>
+        </p:nvSpPr>
+        <p:spPr>
+          <a:xfrm>
+            <a:off x="838200" y="1825625"/>
+            <a:ext cx="5393361" cy="4351338"/>
+          </a:xfrm>
+        </p:spPr>
+        <p:txBody>
+          <a:bodyPr vert="horz" lIns="91440" tIns="45720" rIns="91440" bIns="45720" rtlCol="0">
+            <a:normAutofit/>
+          </a:bodyPr>
+          <a:lstStyle/>
+          <a:p>
+            <a:r>
+              <a:rPr lang="en-US" sz="2000" dirty="0"/>
+              <a:t>Other tasks:</a:t>
+            </a:r>
+          </a:p>
+          <a:p>
+            <a:pPr lvl="1"/>
+            <a:r>
+              <a:rPr lang="en-US" sz="2000" dirty="0"/>
+              <a:t>Tested question-answering with LLMs (name the models..)</a:t>
+            </a:r>
+          </a:p>
+          <a:p>
+            <a:r>
+              <a:rPr lang="en-US" sz="2000" dirty="0"/>
+              <a:t>Compared vocabulary sizes for each class (0 vs 1)</a:t>
+            </a:r>
+          </a:p>
+          <a:p>
+            <a:r>
+              <a:rPr lang="en-US" sz="2000" dirty="0"/>
+              <a:t>Analyzed n-grams and vectorized data using TF-IDF</a:t>
+            </a:r>
+          </a:p>
+          <a:p>
+            <a:r>
+              <a:rPr lang="en-US" sz="2000" dirty="0"/>
+              <a:t>Ran logistic regression to identify predictive words</a:t>
+            </a:r>
+          </a:p>
+          <a:p>
+            <a:pPr lvl="1"/>
+            <a:r>
+              <a:rPr lang="en-US" sz="2000" dirty="0"/>
+              <a:t>Extracted feature names and coefficients</a:t>
+            </a:r>
+          </a:p>
+          <a:p>
+            <a:pPr lvl="1"/>
+            <a:r>
+              <a:rPr lang="en-US" sz="2000" dirty="0"/>
+              <a:t>Plotted model coefficients</a:t>
+            </a:r>
+          </a:p>
+          <a:p>
+            <a:pPr lvl="1"/>
+            <a:r>
+              <a:rPr lang="en-US" sz="2000" dirty="0"/>
+              <a:t>Applied SHAP for model interpretation</a:t>
+            </a:r>
+          </a:p>
+        </p:txBody>
+      </p:sp>
+      <p:pic>
+        <p:nvPicPr>
+          <p:cNvPr id="1026" name="Picture 2" descr="Best 10 Primary &amp; Secondary Market Research Methods - Miquido Blog">
+            <a:extLst>
+              <a:ext uri="{FF2B5EF4-FFF2-40B4-BE49-F238E27FC236}">
+                <a16:creationId xmlns:a16="http://schemas.microsoft.com/office/drawing/2014/main" id="{3AEE7C5C-818A-5EC9-B25C-FC13C3812BF9}"/>
+              </a:ext>
+            </a:extLst>
+          </p:cNvPr>
+          <p:cNvPicPr>
+            <a:picLocks noChangeAspect="1" noChangeArrowheads="1"/>
+          </p:cNvPicPr>
+          <p:nvPr/>
+        </p:nvPicPr>
+        <p:blipFill>
+          <a:blip r:embed="rId3">
+            <a:extLst>
+              <a:ext uri="{28A0092B-C50C-407E-A947-70E740481C1C}">
+                <a14:useLocalDpi xmlns:a14="http://schemas.microsoft.com/office/drawing/2010/main" val="0"/>
+              </a:ext>
+            </a:extLst>
+          </a:blip>
+          <a:srcRect l="29310" r="3939" b="-1"/>
+          <a:stretch/>
+        </p:blipFill>
+        <p:spPr bwMode="auto">
+          <a:xfrm>
+            <a:off x="6848918" y="1771078"/>
+            <a:ext cx="4504881" cy="4504881"/>
+          </a:xfrm>
+          <a:custGeom>
+            <a:avLst/>
+            <a:gdLst/>
+            <a:ahLst/>
+            <a:cxnLst/>
+            <a:rect l="l" t="t" r="r" b="b"/>
+            <a:pathLst>
+              <a:path w="2663168" h="2663168">
+                <a:moveTo>
+                  <a:pt x="1331584" y="0"/>
+                </a:moveTo>
+                <a:cubicBezTo>
+                  <a:pt x="2066998" y="0"/>
+                  <a:pt x="2663168" y="596170"/>
+                  <a:pt x="2663168" y="1331584"/>
+                </a:cubicBezTo>
+                <a:cubicBezTo>
+                  <a:pt x="2663168" y="2066998"/>
+                  <a:pt x="2066998" y="2663168"/>
+                  <a:pt x="1331584" y="2663168"/>
+                </a:cubicBezTo>
+                <a:cubicBezTo>
+                  <a:pt x="596170" y="2663168"/>
+                  <a:pt x="0" y="2066998"/>
+                  <a:pt x="0" y="1331584"/>
+                </a:cubicBezTo>
+                <a:cubicBezTo>
+                  <a:pt x="0" y="596170"/>
+                  <a:pt x="596170" y="0"/>
+                  <a:pt x="1331584" y="0"/>
+                </a:cubicBezTo>
+                <a:close/>
+              </a:path>
+            </a:pathLst>
+          </a:custGeom>
+          <a:noFill/>
+          <a:extLst>
+            <a:ext uri="{909E8E84-426E-40DD-AFC4-6F175D3DCCD1}">
+              <a14:hiddenFill xmlns:a14="http://schemas.microsoft.com/office/drawing/2010/main">
+                <a:solidFill>
+                  <a:srgbClr val="FFFFFF"/>
+                </a:solidFill>
+              </a14:hiddenFill>
+            </a:ext>
+          </a:extLst>
+        </p:spPr>
+      </p:pic>
+      <p:sp>
+        <p:nvSpPr>
+          <p:cNvPr id="1048" name="!!Arc">
+            <a:extLst>
+              <a:ext uri="{FF2B5EF4-FFF2-40B4-BE49-F238E27FC236}">
+                <a16:creationId xmlns:a16="http://schemas.microsoft.com/office/drawing/2014/main" id="{70BEB1E7-2F88-40BC-B73D-42E5B6F80BFC}"/>
+              </a:ext>
+              <a:ext uri="{C183D7F6-B498-43B3-948B-1728B52AA6E4}">
+                <adec:decorative xmlns:adec="http://schemas.microsoft.com/office/drawing/2017/decorative" val="1"/>
+              </a:ext>
+            </a:extLst>
+          </p:cNvPr>
+          <p:cNvSpPr>
+            <a:spLocks noGrp="1" noRot="1" noChangeAspect="1" noMove="1" noResize="1" noEditPoints="1" noAdjustHandles="1" noChangeArrowheads="1" noChangeShapeType="1" noTextEdit="1"/>
+          </p:cNvSpPr>
+          <p:nvPr>
+            <p:extLst>
+              <p:ext uri="{386F3935-93C4-4BCD-93E2-E3B085C9AB24}">
+                <p16:designElem xmlns:p16="http://schemas.microsoft.com/office/powerpoint/2015/main" val="1"/>
+              </p:ext>
+            </p:extLst>
+          </p:nvPr>
+        </p:nvSpPr>
+        <p:spPr>
+          <a:xfrm rot="21189197" flipV="1">
+            <a:off x="6980527" y="1929807"/>
+            <a:ext cx="4556632" cy="4556632"/>
+          </a:xfrm>
+          <a:prstGeom prst="arc">
+            <a:avLst>
+              <a:gd name="adj1" fmla="val 16200000"/>
+              <a:gd name="adj2" fmla="val 20093138"/>
+            </a:avLst>
+          </a:prstGeom>
+          <a:ln w="127000" cap="rnd">
+            <a:solidFill>
+              <a:schemeClr val="accent4">
+                <a:alpha val="95000"/>
+              </a:schemeClr>
+            </a:solidFill>
+            <a:prstDash val="dash"/>
+          </a:ln>
+        </p:spPr>
+        <p:style>
+          <a:lnRef idx="1">
+            <a:schemeClr val="accent1"/>
+          </a:lnRef>
+          <a:fillRef idx="0">
+            <a:schemeClr val="accent1"/>
+          </a:fillRef>
+          <a:effectRef idx="0">
+            <a:schemeClr val="accent1"/>
+          </a:effectRef>
+          <a:fontRef idx="minor">
+            <a:schemeClr val="tx1"/>
+          </a:fontRef>
+        </p:style>
+        <p:txBody>
+          <a:bodyPr rtlCol="0" anchor="ctr"/>
+          <a:lstStyle/>
+          <a:p>
+            <a:pPr algn="ctr"/>
+            <a:endParaRPr lang="en-US" dirty="0"/>
+          </a:p>
+        </p:txBody>
+      </p:sp>
+      <p:sp>
+        <p:nvSpPr>
+          <p:cNvPr id="1050" name="!!Oval">
+            <a:extLst>
+              <a:ext uri="{FF2B5EF4-FFF2-40B4-BE49-F238E27FC236}">
+                <a16:creationId xmlns:a16="http://schemas.microsoft.com/office/drawing/2014/main" id="{A7B99495-F43F-4D80-A44F-2CB4764EB90B}"/>
+              </a:ext>
+              <a:ext uri="{C183D7F6-B498-43B3-948B-1728B52AA6E4}">
+                <adec:decorative xmlns:adec="http://schemas.microsoft.com/office/drawing/2017/decorative" val="1"/>
+              </a:ext>
+            </a:extLst>
+          </p:cNvPr>
+          <p:cNvSpPr>
+            <a:spLocks noGrp="1" noRot="1" noChangeAspect="1" noMove="1" noResize="1" noEditPoints="1" noAdjustHandles="1" noChangeArrowheads="1" noChangeShapeType="1" noTextEdit="1"/>
+          </p:cNvSpPr>
+          <p:nvPr>
+            <p:extLst>
+              <p:ext uri="{386F3935-93C4-4BCD-93E2-E3B085C9AB24}">
+                <p16:designElem xmlns:p16="http://schemas.microsoft.com/office/powerpoint/2015/main" val="1"/>
+              </p:ext>
+            </p:extLst>
+          </p:nvPr>
+        </p:nvSpPr>
+        <p:spPr>
+          <a:xfrm>
+            <a:off x="10300988" y="1969050"/>
+            <a:ext cx="666675" cy="648590"/>
+          </a:xfrm>
+          <a:prstGeom prst="ellipse">
+            <a:avLst/>
+          </a:prstGeom>
+          <a:solidFill>
+            <a:schemeClr val="accent2"/>
+          </a:solidFill>
+          <a:ln>
+            <a:noFill/>
+          </a:ln>
+        </p:spPr>
+        <p:style>
+          <a:lnRef idx="2">
+            <a:schemeClr val="accent1">
+              <a:shade val="50000"/>
+            </a:schemeClr>
+          </a:lnRef>
+          <a:fillRef idx="1">
+            <a:schemeClr val="accent1"/>
+          </a:fillRef>
+          <a:effectRef idx="0">
+            <a:schemeClr val="accent1"/>
+          </a:effectRef>
+          <a:fontRef idx="minor">
+            <a:schemeClr val="lt1"/>
+          </a:fontRef>
+        </p:style>
+        <p:txBody>
+          <a:bodyPr rtlCol="0" anchor="ctr"/>
+          <a:lstStyle/>
+          <a:p>
+            <a:pPr marL="0" marR="0" lvl="0" indent="0" algn="ctr" defTabSz="914400" rtl="0" eaLnBrk="1" fontAlgn="auto" latinLnBrk="0" hangingPunct="1">
+              <a:lnSpc>
+                <a:spcPct val="100000"/>
+              </a:lnSpc>
+              <a:spcBef>
+                <a:spcPts val="0"/>
+              </a:spcBef>
+              <a:spcAft>
+                <a:spcPts val="0"/>
+              </a:spcAft>
+              <a:buClrTx/>
+              <a:buSzTx/>
+              <a:buFontTx/>
+              <a:buNone/>
+              <a:tabLst/>
+              <a:defRPr/>
+            </a:pPr>
+            <a:endParaRPr kumimoji="0" lang="en-US" sz="1800" b="0" i="0" u="none" strike="noStrike" kern="1200" cap="none" spc="0" normalizeH="0" baseline="0" noProof="0">
+              <a:ln>
+                <a:noFill/>
+              </a:ln>
+              <a:solidFill>
+                <a:srgbClr val="FFFFFF"/>
+              </a:solidFill>
+              <a:effectLst/>
+              <a:uLnTx/>
+              <a:uFillTx/>
+              <a:latin typeface="Calibri" panose="020F0502020204030204"/>
+              <a:ea typeface="+mn-ea"/>
+              <a:cs typeface="+mn-cs"/>
+            </a:endParaRPr>
+          </a:p>
+        </p:txBody>
+      </p:sp>
+    </p:spTree>
+    <p:extLst>
+      <p:ext uri="{BB962C8B-B14F-4D97-AF65-F5344CB8AC3E}">
+        <p14:creationId xmlns:p14="http://schemas.microsoft.com/office/powerpoint/2010/main" val="428903400"/>
       </p:ext>
     </p:extLst>
   </p:cSld>

</xml_diff>